<commit_message>
agregado que diablos es git
</commit_message>
<xml_diff>
--- a/Presentation/Git Gud 2.pptx
+++ b/Presentation/Git Gud 2.pptx
@@ -106,6 +106,11 @@
       </a:defRPr>
     </a:lvl9pPr>
   </p:defaultTextStyle>
+  <p:extLst>
+    <p:ext uri="{EFAFB233-063F-42B5-8137-9DF3F51BA10A}">
+      <p15:sldGuideLst xmlns:p15="http://schemas.microsoft.com/office/powerpoint/2012/main"/>
+    </p:ext>
+  </p:extLst>
 </p:presentation>
 </file>
 
@@ -3987,35 +3992,180 @@
           <a:lstStyle/>
           <a:p>
             <a:r>
+              <a:rPr lang="en-US"/>
+              <a:t>Que diablos es Git?</a:t>
+            </a:r>
+            <a:endParaRPr lang="es-419" dirty="0"/>
+          </a:p>
+        </p:txBody>
+      </p:sp>
+      <p:sp>
+        <p:nvSpPr>
+          <p:cNvPr id="3" name="Content Placeholder 2">
+            <a:extLst>
+              <a:ext uri="{FF2B5EF4-FFF2-40B4-BE49-F238E27FC236}">
+                <a16:creationId xmlns:a16="http://schemas.microsoft.com/office/drawing/2014/main" id="{41A110BD-6FF3-4FD1-8DCB-47173E51DCAC}"/>
+              </a:ext>
+            </a:extLst>
+          </p:cNvPr>
+          <p:cNvSpPr>
+            <a:spLocks noGrp="1"/>
+          </p:cNvSpPr>
+          <p:nvPr>
+            <p:ph idx="1"/>
+          </p:nvPr>
+        </p:nvSpPr>
+        <p:spPr>
+          <a:xfrm>
+            <a:off x="838200" y="1554519"/>
+            <a:ext cx="9031013" cy="2010651"/>
+          </a:xfrm>
+        </p:spPr>
+        <p:txBody>
+          <a:bodyPr>
+            <a:normAutofit/>
+          </a:bodyPr>
+          <a:lstStyle/>
+          <a:p>
+            <a:r>
+              <a:rPr lang="en-US" sz="1800" dirty="0"/>
+              <a:t>Sistema de control de </a:t>
+            </a:r>
+            <a:r>
+              <a:rPr lang="en-US" sz="1800" dirty="0" err="1"/>
+              <a:t>versiones</a:t>
+            </a:r>
+            <a:endParaRPr lang="en-US" sz="1800" dirty="0"/>
+          </a:p>
+          <a:p>
+            <a:r>
+              <a:rPr lang="en-US" sz="1800" dirty="0" err="1"/>
+              <a:t>Creado</a:t>
+            </a:r>
+            <a:r>
+              <a:rPr lang="en-US" sz="1800" dirty="0"/>
+              <a:t> por San Linus Torvalds (</a:t>
+            </a:r>
+            <a:r>
+              <a:rPr lang="en-US" sz="1800" dirty="0" err="1"/>
+              <a:t>Creador</a:t>
+            </a:r>
+            <a:r>
+              <a:rPr lang="en-US" sz="1800" dirty="0"/>
+              <a:t> de </a:t>
+            </a:r>
+            <a:r>
+              <a:rPr lang="en-US" sz="1800" dirty="0" err="1"/>
+              <a:t>linux</a:t>
+            </a:r>
+            <a:r>
+              <a:rPr lang="en-US" sz="1800" dirty="0"/>
+              <a:t> y el pan con queso)</a:t>
+            </a:r>
+          </a:p>
+          <a:p>
+            <a:r>
+              <a:rPr lang="es-419" sz="1800" dirty="0"/>
+              <a:t>Creado con odio puro para reemplazar </a:t>
+            </a:r>
+            <a:r>
+              <a:rPr lang="es-419" sz="1800" dirty="0" err="1"/>
+              <a:t>BitKeeper</a:t>
+            </a:r>
+            <a:endParaRPr lang="es-419" sz="1800" dirty="0"/>
+          </a:p>
+          <a:p>
+            <a:r>
+              <a:rPr lang="es-419" sz="1800" dirty="0"/>
+              <a:t>Git significa ‘persona desagradable’ en British English </a:t>
+            </a:r>
+            <a:r>
+              <a:rPr lang="es-419" sz="1800" dirty="0" err="1"/>
+              <a:t>Slang</a:t>
+            </a:r>
+            <a:endParaRPr lang="es-419" sz="1800" dirty="0"/>
+          </a:p>
+          <a:p>
+            <a:endParaRPr lang="es-419" sz="1800" dirty="0"/>
+          </a:p>
+        </p:txBody>
+      </p:sp>
+      <p:pic>
+        <p:nvPicPr>
+          <p:cNvPr id="4" name="Picture 3">
+            <a:extLst>
+              <a:ext uri="{FF2B5EF4-FFF2-40B4-BE49-F238E27FC236}">
+                <a16:creationId xmlns:a16="http://schemas.microsoft.com/office/drawing/2014/main" id="{07C1555E-864A-4136-8737-4BC35C6BB46C}"/>
+              </a:ext>
+            </a:extLst>
+          </p:cNvPr>
+          <p:cNvPicPr>
+            <a:picLocks noChangeAspect="1"/>
+          </p:cNvPicPr>
+          <p:nvPr/>
+        </p:nvPicPr>
+        <p:blipFill>
+          <a:blip r:embed="rId2"/>
+          <a:stretch>
+            <a:fillRect/>
+          </a:stretch>
+        </p:blipFill>
+        <p:spPr>
+          <a:xfrm>
+            <a:off x="7129608" y="3429000"/>
+            <a:ext cx="4953691" cy="3248478"/>
+          </a:xfrm>
+          <a:prstGeom prst="rect">
+            <a:avLst/>
+          </a:prstGeom>
+        </p:spPr>
+      </p:pic>
+      <p:sp>
+        <p:nvSpPr>
+          <p:cNvPr id="5" name="TextBox 4">
+            <a:extLst>
+              <a:ext uri="{FF2B5EF4-FFF2-40B4-BE49-F238E27FC236}">
+                <a16:creationId xmlns:a16="http://schemas.microsoft.com/office/drawing/2014/main" id="{1216288E-CC82-4D4A-B888-E310C3AC3AC7}"/>
+              </a:ext>
+            </a:extLst>
+          </p:cNvPr>
+          <p:cNvSpPr txBox="1"/>
+          <p:nvPr/>
+        </p:nvSpPr>
+        <p:spPr>
+          <a:xfrm>
+            <a:off x="838200" y="5754148"/>
+            <a:ext cx="5486400" cy="1200329"/>
+          </a:xfrm>
+          <a:prstGeom prst="rect">
+            <a:avLst/>
+          </a:prstGeom>
+          <a:noFill/>
+        </p:spPr>
+        <p:txBody>
+          <a:bodyPr wrap="square" rtlCol="0">
+            <a:spAutoFit/>
+          </a:bodyPr>
+          <a:lstStyle/>
+          <a:p>
+            <a:r>
               <a:rPr lang="en-US" dirty="0"/>
-              <a:t>Que diablos es Git?</a:t>
-            </a:r>
+              <a:t>"I'm an egotistical bastard, and I name all my projects after myself. First ‘Linux', now 'git’.”</a:t>
+            </a:r>
+            <a:r>
+              <a:rPr lang="es-419" dirty="0"/>
+              <a:t> </a:t>
+            </a:r>
+          </a:p>
+          <a:p>
+            <a:r>
+              <a:rPr lang="es-419" dirty="0"/>
+              <a:t>- Linus Torvalds</a:t>
+            </a:r>
+            <a:endParaRPr lang="en-US" dirty="0"/>
+          </a:p>
+          <a:p>
             <a:endParaRPr lang="es-419" dirty="0"/>
-          </a:p>
-        </p:txBody>
-      </p:sp>
-      <p:sp>
-        <p:nvSpPr>
-          <p:cNvPr id="3" name="Content Placeholder 2">
-            <a:extLst>
-              <a:ext uri="{FF2B5EF4-FFF2-40B4-BE49-F238E27FC236}">
-                <a16:creationId xmlns:a16="http://schemas.microsoft.com/office/drawing/2014/main" id="{41A110BD-6FF3-4FD1-8DCB-47173E51DCAC}"/>
-              </a:ext>
-            </a:extLst>
-          </p:cNvPr>
-          <p:cNvSpPr>
-            <a:spLocks noGrp="1"/>
-          </p:cNvSpPr>
-          <p:nvPr>
-            <p:ph idx="1"/>
-          </p:nvPr>
-        </p:nvSpPr>
-        <p:spPr/>
-        <p:txBody>
-          <a:bodyPr/>
-          <a:lstStyle/>
-          <a:p>
-            <a:endParaRPr lang="es-419"/>
           </a:p>
         </p:txBody>
       </p:sp>

</xml_diff>

<commit_message>
arreglada ortografia en diapo 2
</commit_message>
<xml_diff>
--- a/Presentation/Git Gud 2.pptx
+++ b/Presentation/Git Gud 2.pptx
@@ -3992,8 +3992,16 @@
           <a:lstStyle/>
           <a:p>
             <a:r>
-              <a:rPr lang="en-US"/>
-              <a:t>Que diablos es Git?</a:t>
+              <a:rPr lang="en-US" dirty="0"/>
+              <a:t>¿Qu</a:t>
+            </a:r>
+            <a:r>
+              <a:rPr lang="es-419" dirty="0"/>
+              <a:t>é</a:t>
+            </a:r>
+            <a:r>
+              <a:rPr lang="en-US" dirty="0"/>
+              <a:t> diablos es Git?</a:t>
             </a:r>
             <a:endParaRPr lang="es-419" dirty="0"/>
           </a:p>

</xml_diff>

<commit_message>
Agregados diapos de conceptos claves vacias
</commit_message>
<xml_diff>
--- a/Presentation/Git Gud 2.pptx
+++ b/Presentation/Git Gud 2.pptx
@@ -8,6 +8,12 @@
     <p:sldId id="256" r:id="rId2"/>
     <p:sldId id="257" r:id="rId3"/>
     <p:sldId id="258" r:id="rId4"/>
+    <p:sldId id="263" r:id="rId5"/>
+    <p:sldId id="259" r:id="rId6"/>
+    <p:sldId id="260" r:id="rId7"/>
+    <p:sldId id="261" r:id="rId8"/>
+    <p:sldId id="262" r:id="rId9"/>
+    <p:sldId id="264" r:id="rId10"/>
   </p:sldIdLst>
   <p:sldSz cx="12192000" cy="6858000"/>
   <p:notesSz cx="6858000" cy="9144000"/>
@@ -4228,7 +4234,23 @@
           <a:bodyPr/>
           <a:lstStyle/>
           <a:p>
-            <a:endParaRPr lang="es-419"/>
+            <a:r>
+              <a:rPr lang="es-419" dirty="0"/>
+              <a:t>Conceptos clave</a:t>
+            </a:r>
+            <a:r>
+              <a:rPr lang="en-US" dirty="0"/>
+              <a:t>: </a:t>
+            </a:r>
+            <a:r>
+              <a:rPr lang="en-US" dirty="0" err="1"/>
+              <a:t>Versi</a:t>
+            </a:r>
+            <a:r>
+              <a:rPr lang="es-419" dirty="0" err="1"/>
+              <a:t>ón</a:t>
+            </a:r>
+            <a:endParaRPr lang="es-419" dirty="0"/>
           </a:p>
         </p:txBody>
       </p:sp>
@@ -4253,7 +4275,13 @@
           <a:bodyPr/>
           <a:lstStyle/>
           <a:p>
-            <a:endParaRPr lang="es-419"/>
+            <a:pPr marL="0" indent="0">
+              <a:buNone/>
+            </a:pPr>
+            <a:r>
+              <a:rPr lang="es-419" dirty="0"/>
+              <a:t> </a:t>
+            </a:r>
           </a:p>
         </p:txBody>
       </p:sp>
@@ -4261,6 +4289,578 @@
     <p:extLst>
       <p:ext uri="{BB962C8B-B14F-4D97-AF65-F5344CB8AC3E}">
         <p14:creationId xmlns:p14="http://schemas.microsoft.com/office/powerpoint/2010/main" val="726517786"/>
+      </p:ext>
+    </p:extLst>
+  </p:cSld>
+  <p:clrMapOvr>
+    <a:masterClrMapping/>
+  </p:clrMapOvr>
+</p:sld>
+</file>
+
+<file path=ppt/slides/slide4.xml><?xml version="1.0" encoding="utf-8"?>
+<p:sld xmlns:a="http://schemas.openxmlformats.org/drawingml/2006/main" xmlns:r="http://schemas.openxmlformats.org/officeDocument/2006/relationships" xmlns:p="http://schemas.openxmlformats.org/presentationml/2006/main">
+  <p:cSld>
+    <p:spTree>
+      <p:nvGrpSpPr>
+        <p:cNvPr id="1" name=""/>
+        <p:cNvGrpSpPr/>
+        <p:nvPr/>
+      </p:nvGrpSpPr>
+      <p:grpSpPr>
+        <a:xfrm>
+          <a:off x="0" y="0"/>
+          <a:ext cx="0" cy="0"/>
+          <a:chOff x="0" y="0"/>
+          <a:chExt cx="0" cy="0"/>
+        </a:xfrm>
+      </p:grpSpPr>
+      <p:sp>
+        <p:nvSpPr>
+          <p:cNvPr id="2" name="Title 1">
+            <a:extLst>
+              <a:ext uri="{FF2B5EF4-FFF2-40B4-BE49-F238E27FC236}">
+                <a16:creationId xmlns:a16="http://schemas.microsoft.com/office/drawing/2014/main" id="{E94C24EB-7ECC-4ECF-9E67-D3422B6EC4F8}"/>
+              </a:ext>
+            </a:extLst>
+          </p:cNvPr>
+          <p:cNvSpPr>
+            <a:spLocks noGrp="1"/>
+          </p:cNvSpPr>
+          <p:nvPr>
+            <p:ph type="title"/>
+          </p:nvPr>
+        </p:nvSpPr>
+        <p:spPr/>
+        <p:txBody>
+          <a:bodyPr/>
+          <a:lstStyle/>
+          <a:p>
+            <a:r>
+              <a:rPr lang="es-419" dirty="0"/>
+              <a:t>Conceptos clave</a:t>
+            </a:r>
+            <a:r>
+              <a:rPr lang="en-US" dirty="0"/>
+              <a:t>: </a:t>
+            </a:r>
+            <a:r>
+              <a:rPr lang="en-US" dirty="0" err="1"/>
+              <a:t>Repositorio</a:t>
+            </a:r>
+            <a:endParaRPr lang="es-419" dirty="0"/>
+          </a:p>
+        </p:txBody>
+      </p:sp>
+      <p:sp>
+        <p:nvSpPr>
+          <p:cNvPr id="3" name="Content Placeholder 2">
+            <a:extLst>
+              <a:ext uri="{FF2B5EF4-FFF2-40B4-BE49-F238E27FC236}">
+                <a16:creationId xmlns:a16="http://schemas.microsoft.com/office/drawing/2014/main" id="{4C8A22F4-750C-4E9A-B539-BC08DBA1AC78}"/>
+              </a:ext>
+            </a:extLst>
+          </p:cNvPr>
+          <p:cNvSpPr>
+            <a:spLocks noGrp="1"/>
+          </p:cNvSpPr>
+          <p:nvPr>
+            <p:ph idx="1"/>
+          </p:nvPr>
+        </p:nvSpPr>
+        <p:spPr/>
+        <p:txBody>
+          <a:bodyPr/>
+          <a:lstStyle/>
+          <a:p>
+            <a:pPr marL="0" indent="0">
+              <a:buNone/>
+            </a:pPr>
+            <a:r>
+              <a:rPr lang="es-419" dirty="0"/>
+              <a:t> </a:t>
+            </a:r>
+          </a:p>
+        </p:txBody>
+      </p:sp>
+    </p:spTree>
+    <p:extLst>
+      <p:ext uri="{BB962C8B-B14F-4D97-AF65-F5344CB8AC3E}">
+        <p14:creationId xmlns:p14="http://schemas.microsoft.com/office/powerpoint/2010/main" val="2716738770"/>
+      </p:ext>
+    </p:extLst>
+  </p:cSld>
+  <p:clrMapOvr>
+    <a:masterClrMapping/>
+  </p:clrMapOvr>
+</p:sld>
+</file>
+
+<file path=ppt/slides/slide5.xml><?xml version="1.0" encoding="utf-8"?>
+<p:sld xmlns:a="http://schemas.openxmlformats.org/drawingml/2006/main" xmlns:r="http://schemas.openxmlformats.org/officeDocument/2006/relationships" xmlns:p="http://schemas.openxmlformats.org/presentationml/2006/main">
+  <p:cSld>
+    <p:spTree>
+      <p:nvGrpSpPr>
+        <p:cNvPr id="1" name=""/>
+        <p:cNvGrpSpPr/>
+        <p:nvPr/>
+      </p:nvGrpSpPr>
+      <p:grpSpPr>
+        <a:xfrm>
+          <a:off x="0" y="0"/>
+          <a:ext cx="0" cy="0"/>
+          <a:chOff x="0" y="0"/>
+          <a:chExt cx="0" cy="0"/>
+        </a:xfrm>
+      </p:grpSpPr>
+      <p:sp>
+        <p:nvSpPr>
+          <p:cNvPr id="2" name="Title 1">
+            <a:extLst>
+              <a:ext uri="{FF2B5EF4-FFF2-40B4-BE49-F238E27FC236}">
+                <a16:creationId xmlns:a16="http://schemas.microsoft.com/office/drawing/2014/main" id="{E94C24EB-7ECC-4ECF-9E67-D3422B6EC4F8}"/>
+              </a:ext>
+            </a:extLst>
+          </p:cNvPr>
+          <p:cNvSpPr>
+            <a:spLocks noGrp="1"/>
+          </p:cNvSpPr>
+          <p:nvPr>
+            <p:ph type="title"/>
+          </p:nvPr>
+        </p:nvSpPr>
+        <p:spPr/>
+        <p:txBody>
+          <a:bodyPr/>
+          <a:lstStyle/>
+          <a:p>
+            <a:r>
+              <a:rPr lang="es-419" dirty="0"/>
+              <a:t>Conceptos clave</a:t>
+            </a:r>
+            <a:r>
+              <a:rPr lang="en-US" dirty="0"/>
+              <a:t>: Control de </a:t>
+            </a:r>
+            <a:r>
+              <a:rPr lang="en-US" dirty="0" err="1"/>
+              <a:t>Versiones</a:t>
+            </a:r>
+            <a:endParaRPr lang="es-419" dirty="0"/>
+          </a:p>
+        </p:txBody>
+      </p:sp>
+      <p:sp>
+        <p:nvSpPr>
+          <p:cNvPr id="3" name="Content Placeholder 2">
+            <a:extLst>
+              <a:ext uri="{FF2B5EF4-FFF2-40B4-BE49-F238E27FC236}">
+                <a16:creationId xmlns:a16="http://schemas.microsoft.com/office/drawing/2014/main" id="{4C8A22F4-750C-4E9A-B539-BC08DBA1AC78}"/>
+              </a:ext>
+            </a:extLst>
+          </p:cNvPr>
+          <p:cNvSpPr>
+            <a:spLocks noGrp="1"/>
+          </p:cNvSpPr>
+          <p:nvPr>
+            <p:ph idx="1"/>
+          </p:nvPr>
+        </p:nvSpPr>
+        <p:spPr/>
+        <p:txBody>
+          <a:bodyPr/>
+          <a:lstStyle/>
+          <a:p>
+            <a:pPr marL="0" indent="0">
+              <a:buNone/>
+            </a:pPr>
+            <a:r>
+              <a:rPr lang="es-419" dirty="0"/>
+              <a:t> </a:t>
+            </a:r>
+          </a:p>
+        </p:txBody>
+      </p:sp>
+    </p:spTree>
+    <p:extLst>
+      <p:ext uri="{BB962C8B-B14F-4D97-AF65-F5344CB8AC3E}">
+        <p14:creationId xmlns:p14="http://schemas.microsoft.com/office/powerpoint/2010/main" val="3403797311"/>
+      </p:ext>
+    </p:extLst>
+  </p:cSld>
+  <p:clrMapOvr>
+    <a:masterClrMapping/>
+  </p:clrMapOvr>
+</p:sld>
+</file>
+
+<file path=ppt/slides/slide6.xml><?xml version="1.0" encoding="utf-8"?>
+<p:sld xmlns:a="http://schemas.openxmlformats.org/drawingml/2006/main" xmlns:r="http://schemas.openxmlformats.org/officeDocument/2006/relationships" xmlns:p="http://schemas.openxmlformats.org/presentationml/2006/main">
+  <p:cSld>
+    <p:spTree>
+      <p:nvGrpSpPr>
+        <p:cNvPr id="1" name=""/>
+        <p:cNvGrpSpPr/>
+        <p:nvPr/>
+      </p:nvGrpSpPr>
+      <p:grpSpPr>
+        <a:xfrm>
+          <a:off x="0" y="0"/>
+          <a:ext cx="0" cy="0"/>
+          <a:chOff x="0" y="0"/>
+          <a:chExt cx="0" cy="0"/>
+        </a:xfrm>
+      </p:grpSpPr>
+      <p:sp>
+        <p:nvSpPr>
+          <p:cNvPr id="2" name="Title 1">
+            <a:extLst>
+              <a:ext uri="{FF2B5EF4-FFF2-40B4-BE49-F238E27FC236}">
+                <a16:creationId xmlns:a16="http://schemas.microsoft.com/office/drawing/2014/main" id="{E94C24EB-7ECC-4ECF-9E67-D3422B6EC4F8}"/>
+              </a:ext>
+            </a:extLst>
+          </p:cNvPr>
+          <p:cNvSpPr>
+            <a:spLocks noGrp="1"/>
+          </p:cNvSpPr>
+          <p:nvPr>
+            <p:ph type="title"/>
+          </p:nvPr>
+        </p:nvSpPr>
+        <p:spPr/>
+        <p:txBody>
+          <a:bodyPr/>
+          <a:lstStyle/>
+          <a:p>
+            <a:r>
+              <a:rPr lang="es-419" dirty="0"/>
+              <a:t>Conceptos clave</a:t>
+            </a:r>
+            <a:r>
+              <a:rPr lang="en-US" dirty="0"/>
+              <a:t>: Commit</a:t>
+            </a:r>
+            <a:endParaRPr lang="es-419" dirty="0"/>
+          </a:p>
+        </p:txBody>
+      </p:sp>
+      <p:sp>
+        <p:nvSpPr>
+          <p:cNvPr id="3" name="Content Placeholder 2">
+            <a:extLst>
+              <a:ext uri="{FF2B5EF4-FFF2-40B4-BE49-F238E27FC236}">
+                <a16:creationId xmlns:a16="http://schemas.microsoft.com/office/drawing/2014/main" id="{4C8A22F4-750C-4E9A-B539-BC08DBA1AC78}"/>
+              </a:ext>
+            </a:extLst>
+          </p:cNvPr>
+          <p:cNvSpPr>
+            <a:spLocks noGrp="1"/>
+          </p:cNvSpPr>
+          <p:nvPr>
+            <p:ph idx="1"/>
+          </p:nvPr>
+        </p:nvSpPr>
+        <p:spPr/>
+        <p:txBody>
+          <a:bodyPr/>
+          <a:lstStyle/>
+          <a:p>
+            <a:pPr marL="0" indent="0">
+              <a:buNone/>
+            </a:pPr>
+            <a:r>
+              <a:rPr lang="es-419" dirty="0"/>
+              <a:t> </a:t>
+            </a:r>
+          </a:p>
+        </p:txBody>
+      </p:sp>
+    </p:spTree>
+    <p:extLst>
+      <p:ext uri="{BB962C8B-B14F-4D97-AF65-F5344CB8AC3E}">
+        <p14:creationId xmlns:p14="http://schemas.microsoft.com/office/powerpoint/2010/main" val="1752529886"/>
+      </p:ext>
+    </p:extLst>
+  </p:cSld>
+  <p:clrMapOvr>
+    <a:masterClrMapping/>
+  </p:clrMapOvr>
+</p:sld>
+</file>
+
+<file path=ppt/slides/slide7.xml><?xml version="1.0" encoding="utf-8"?>
+<p:sld xmlns:a="http://schemas.openxmlformats.org/drawingml/2006/main" xmlns:r="http://schemas.openxmlformats.org/officeDocument/2006/relationships" xmlns:p="http://schemas.openxmlformats.org/presentationml/2006/main">
+  <p:cSld>
+    <p:spTree>
+      <p:nvGrpSpPr>
+        <p:cNvPr id="1" name=""/>
+        <p:cNvGrpSpPr/>
+        <p:nvPr/>
+      </p:nvGrpSpPr>
+      <p:grpSpPr>
+        <a:xfrm>
+          <a:off x="0" y="0"/>
+          <a:ext cx="0" cy="0"/>
+          <a:chOff x="0" y="0"/>
+          <a:chExt cx="0" cy="0"/>
+        </a:xfrm>
+      </p:grpSpPr>
+      <p:sp>
+        <p:nvSpPr>
+          <p:cNvPr id="2" name="Title 1">
+            <a:extLst>
+              <a:ext uri="{FF2B5EF4-FFF2-40B4-BE49-F238E27FC236}">
+                <a16:creationId xmlns:a16="http://schemas.microsoft.com/office/drawing/2014/main" id="{E94C24EB-7ECC-4ECF-9E67-D3422B6EC4F8}"/>
+              </a:ext>
+            </a:extLst>
+          </p:cNvPr>
+          <p:cNvSpPr>
+            <a:spLocks noGrp="1"/>
+          </p:cNvSpPr>
+          <p:nvPr>
+            <p:ph type="title"/>
+          </p:nvPr>
+        </p:nvSpPr>
+        <p:spPr/>
+        <p:txBody>
+          <a:bodyPr/>
+          <a:lstStyle/>
+          <a:p>
+            <a:r>
+              <a:rPr lang="es-419" dirty="0"/>
+              <a:t>Conceptos clave</a:t>
+            </a:r>
+            <a:r>
+              <a:rPr lang="en-US" dirty="0"/>
+              <a:t>: Push/Pull</a:t>
+            </a:r>
+            <a:endParaRPr lang="es-419" dirty="0"/>
+          </a:p>
+        </p:txBody>
+      </p:sp>
+      <p:sp>
+        <p:nvSpPr>
+          <p:cNvPr id="3" name="Content Placeholder 2">
+            <a:extLst>
+              <a:ext uri="{FF2B5EF4-FFF2-40B4-BE49-F238E27FC236}">
+                <a16:creationId xmlns:a16="http://schemas.microsoft.com/office/drawing/2014/main" id="{4C8A22F4-750C-4E9A-B539-BC08DBA1AC78}"/>
+              </a:ext>
+            </a:extLst>
+          </p:cNvPr>
+          <p:cNvSpPr>
+            <a:spLocks noGrp="1"/>
+          </p:cNvSpPr>
+          <p:nvPr>
+            <p:ph idx="1"/>
+          </p:nvPr>
+        </p:nvSpPr>
+        <p:spPr/>
+        <p:txBody>
+          <a:bodyPr/>
+          <a:lstStyle/>
+          <a:p>
+            <a:pPr marL="0" indent="0">
+              <a:buNone/>
+            </a:pPr>
+            <a:r>
+              <a:rPr lang="es-419" dirty="0"/>
+              <a:t> </a:t>
+            </a:r>
+          </a:p>
+        </p:txBody>
+      </p:sp>
+    </p:spTree>
+    <p:extLst>
+      <p:ext uri="{BB962C8B-B14F-4D97-AF65-F5344CB8AC3E}">
+        <p14:creationId xmlns:p14="http://schemas.microsoft.com/office/powerpoint/2010/main" val="2560665782"/>
+      </p:ext>
+    </p:extLst>
+  </p:cSld>
+  <p:clrMapOvr>
+    <a:masterClrMapping/>
+  </p:clrMapOvr>
+</p:sld>
+</file>
+
+<file path=ppt/slides/slide8.xml><?xml version="1.0" encoding="utf-8"?>
+<p:sld xmlns:a="http://schemas.openxmlformats.org/drawingml/2006/main" xmlns:r="http://schemas.openxmlformats.org/officeDocument/2006/relationships" xmlns:p="http://schemas.openxmlformats.org/presentationml/2006/main">
+  <p:cSld>
+    <p:spTree>
+      <p:nvGrpSpPr>
+        <p:cNvPr id="1" name=""/>
+        <p:cNvGrpSpPr/>
+        <p:nvPr/>
+      </p:nvGrpSpPr>
+      <p:grpSpPr>
+        <a:xfrm>
+          <a:off x="0" y="0"/>
+          <a:ext cx="0" cy="0"/>
+          <a:chOff x="0" y="0"/>
+          <a:chExt cx="0" cy="0"/>
+        </a:xfrm>
+      </p:grpSpPr>
+      <p:sp>
+        <p:nvSpPr>
+          <p:cNvPr id="2" name="Title 1">
+            <a:extLst>
+              <a:ext uri="{FF2B5EF4-FFF2-40B4-BE49-F238E27FC236}">
+                <a16:creationId xmlns:a16="http://schemas.microsoft.com/office/drawing/2014/main" id="{E94C24EB-7ECC-4ECF-9E67-D3422B6EC4F8}"/>
+              </a:ext>
+            </a:extLst>
+          </p:cNvPr>
+          <p:cNvSpPr>
+            <a:spLocks noGrp="1"/>
+          </p:cNvSpPr>
+          <p:nvPr>
+            <p:ph type="title"/>
+          </p:nvPr>
+        </p:nvSpPr>
+        <p:spPr/>
+        <p:txBody>
+          <a:bodyPr/>
+          <a:lstStyle/>
+          <a:p>
+            <a:r>
+              <a:rPr lang="es-419" dirty="0"/>
+              <a:t>Conceptos clave</a:t>
+            </a:r>
+            <a:r>
+              <a:rPr lang="en-US" dirty="0"/>
+              <a:t>: Branch</a:t>
+            </a:r>
+            <a:endParaRPr lang="es-419" dirty="0"/>
+          </a:p>
+        </p:txBody>
+      </p:sp>
+      <p:sp>
+        <p:nvSpPr>
+          <p:cNvPr id="3" name="Content Placeholder 2">
+            <a:extLst>
+              <a:ext uri="{FF2B5EF4-FFF2-40B4-BE49-F238E27FC236}">
+                <a16:creationId xmlns:a16="http://schemas.microsoft.com/office/drawing/2014/main" id="{4C8A22F4-750C-4E9A-B539-BC08DBA1AC78}"/>
+              </a:ext>
+            </a:extLst>
+          </p:cNvPr>
+          <p:cNvSpPr>
+            <a:spLocks noGrp="1"/>
+          </p:cNvSpPr>
+          <p:nvPr>
+            <p:ph idx="1"/>
+          </p:nvPr>
+        </p:nvSpPr>
+        <p:spPr/>
+        <p:txBody>
+          <a:bodyPr/>
+          <a:lstStyle/>
+          <a:p>
+            <a:pPr marL="0" indent="0">
+              <a:buNone/>
+            </a:pPr>
+            <a:r>
+              <a:rPr lang="es-419" dirty="0"/>
+              <a:t> </a:t>
+            </a:r>
+          </a:p>
+        </p:txBody>
+      </p:sp>
+    </p:spTree>
+    <p:extLst>
+      <p:ext uri="{BB962C8B-B14F-4D97-AF65-F5344CB8AC3E}">
+        <p14:creationId xmlns:p14="http://schemas.microsoft.com/office/powerpoint/2010/main" val="3816666332"/>
+      </p:ext>
+    </p:extLst>
+  </p:cSld>
+  <p:clrMapOvr>
+    <a:masterClrMapping/>
+  </p:clrMapOvr>
+</p:sld>
+</file>
+
+<file path=ppt/slides/slide9.xml><?xml version="1.0" encoding="utf-8"?>
+<p:sld xmlns:a="http://schemas.openxmlformats.org/drawingml/2006/main" xmlns:r="http://schemas.openxmlformats.org/officeDocument/2006/relationships" xmlns:p="http://schemas.openxmlformats.org/presentationml/2006/main">
+  <p:cSld>
+    <p:spTree>
+      <p:nvGrpSpPr>
+        <p:cNvPr id="1" name=""/>
+        <p:cNvGrpSpPr/>
+        <p:nvPr/>
+      </p:nvGrpSpPr>
+      <p:grpSpPr>
+        <a:xfrm>
+          <a:off x="0" y="0"/>
+          <a:ext cx="0" cy="0"/>
+          <a:chOff x="0" y="0"/>
+          <a:chExt cx="0" cy="0"/>
+        </a:xfrm>
+      </p:grpSpPr>
+      <p:sp>
+        <p:nvSpPr>
+          <p:cNvPr id="2" name="Title 1">
+            <a:extLst>
+              <a:ext uri="{FF2B5EF4-FFF2-40B4-BE49-F238E27FC236}">
+                <a16:creationId xmlns:a16="http://schemas.microsoft.com/office/drawing/2014/main" id="{E94C24EB-7ECC-4ECF-9E67-D3422B6EC4F8}"/>
+              </a:ext>
+            </a:extLst>
+          </p:cNvPr>
+          <p:cNvSpPr>
+            <a:spLocks noGrp="1"/>
+          </p:cNvSpPr>
+          <p:nvPr>
+            <p:ph type="title"/>
+          </p:nvPr>
+        </p:nvSpPr>
+        <p:spPr/>
+        <p:txBody>
+          <a:bodyPr/>
+          <a:lstStyle/>
+          <a:p>
+            <a:r>
+              <a:rPr lang="es-419" dirty="0"/>
+              <a:t>Conceptos clave</a:t>
+            </a:r>
+            <a:r>
+              <a:rPr lang="en-US" dirty="0"/>
+              <a:t>: Merge/Conflict</a:t>
+            </a:r>
+            <a:endParaRPr lang="es-419" dirty="0"/>
+          </a:p>
+        </p:txBody>
+      </p:sp>
+      <p:sp>
+        <p:nvSpPr>
+          <p:cNvPr id="3" name="Content Placeholder 2">
+            <a:extLst>
+              <a:ext uri="{FF2B5EF4-FFF2-40B4-BE49-F238E27FC236}">
+                <a16:creationId xmlns:a16="http://schemas.microsoft.com/office/drawing/2014/main" id="{4C8A22F4-750C-4E9A-B539-BC08DBA1AC78}"/>
+              </a:ext>
+            </a:extLst>
+          </p:cNvPr>
+          <p:cNvSpPr>
+            <a:spLocks noGrp="1"/>
+          </p:cNvSpPr>
+          <p:nvPr>
+            <p:ph idx="1"/>
+          </p:nvPr>
+        </p:nvSpPr>
+        <p:spPr/>
+        <p:txBody>
+          <a:bodyPr/>
+          <a:lstStyle/>
+          <a:p>
+            <a:pPr marL="0" indent="0">
+              <a:buNone/>
+            </a:pPr>
+            <a:r>
+              <a:rPr lang="es-419" dirty="0"/>
+              <a:t> </a:t>
+            </a:r>
+          </a:p>
+        </p:txBody>
+      </p:sp>
+    </p:spTree>
+    <p:extLst>
+      <p:ext uri="{BB962C8B-B14F-4D97-AF65-F5344CB8AC3E}">
+        <p14:creationId xmlns:p14="http://schemas.microsoft.com/office/powerpoint/2010/main" val="1882495817"/>
       </p:ext>
     </p:extLst>
   </p:cSld>

</xml_diff>

<commit_message>
completada plantilla de presentacion
</commit_message>
<xml_diff>
--- a/Presentation/Git Gud 2.pptx
+++ b/Presentation/Git Gud 2.pptx
@@ -14,6 +14,15 @@
     <p:sldId id="261" r:id="rId8"/>
     <p:sldId id="262" r:id="rId9"/>
     <p:sldId id="264" r:id="rId10"/>
+    <p:sldId id="265" r:id="rId11"/>
+    <p:sldId id="266" r:id="rId12"/>
+    <p:sldId id="267" r:id="rId13"/>
+    <p:sldId id="268" r:id="rId14"/>
+    <p:sldId id="269" r:id="rId15"/>
+    <p:sldId id="270" r:id="rId16"/>
+    <p:sldId id="271" r:id="rId17"/>
+    <p:sldId id="274" r:id="rId18"/>
+    <p:sldId id="273" r:id="rId19"/>
   </p:sldIdLst>
   <p:sldSz cx="12192000" cy="6858000"/>
   <p:notesSz cx="6858000" cy="9144000"/>
@@ -3959,6 +3968,1048 @@
 </p:sld>
 </file>
 
+<file path=ppt/slides/slide10.xml><?xml version="1.0" encoding="utf-8"?>
+<p:sld xmlns:a="http://schemas.openxmlformats.org/drawingml/2006/main" xmlns:r="http://schemas.openxmlformats.org/officeDocument/2006/relationships" xmlns:p="http://schemas.openxmlformats.org/presentationml/2006/main">
+  <p:cSld>
+    <p:spTree>
+      <p:nvGrpSpPr>
+        <p:cNvPr id="1" name=""/>
+        <p:cNvGrpSpPr/>
+        <p:nvPr/>
+      </p:nvGrpSpPr>
+      <p:grpSpPr>
+        <a:xfrm>
+          <a:off x="0" y="0"/>
+          <a:ext cx="0" cy="0"/>
+          <a:chOff x="0" y="0"/>
+          <a:chExt cx="0" cy="0"/>
+        </a:xfrm>
+      </p:grpSpPr>
+      <p:sp>
+        <p:nvSpPr>
+          <p:cNvPr id="2" name="Title 1">
+            <a:extLst>
+              <a:ext uri="{FF2B5EF4-FFF2-40B4-BE49-F238E27FC236}">
+                <a16:creationId xmlns:a16="http://schemas.microsoft.com/office/drawing/2014/main" id="{E94C24EB-7ECC-4ECF-9E67-D3422B6EC4F8}"/>
+              </a:ext>
+            </a:extLst>
+          </p:cNvPr>
+          <p:cNvSpPr>
+            <a:spLocks noGrp="1"/>
+          </p:cNvSpPr>
+          <p:nvPr>
+            <p:ph type="title"/>
+          </p:nvPr>
+        </p:nvSpPr>
+        <p:spPr/>
+        <p:txBody>
+          <a:bodyPr/>
+          <a:lstStyle/>
+          <a:p>
+            <a:r>
+              <a:rPr lang="es-419" dirty="0"/>
+              <a:t>Conceptos clave</a:t>
+            </a:r>
+            <a:r>
+              <a:rPr lang="en-US" dirty="0"/>
+              <a:t>: Merge/Conflict</a:t>
+            </a:r>
+            <a:endParaRPr lang="es-419" dirty="0"/>
+          </a:p>
+        </p:txBody>
+      </p:sp>
+      <p:sp>
+        <p:nvSpPr>
+          <p:cNvPr id="3" name="Content Placeholder 2">
+            <a:extLst>
+              <a:ext uri="{FF2B5EF4-FFF2-40B4-BE49-F238E27FC236}">
+                <a16:creationId xmlns:a16="http://schemas.microsoft.com/office/drawing/2014/main" id="{4C8A22F4-750C-4E9A-B539-BC08DBA1AC78}"/>
+              </a:ext>
+            </a:extLst>
+          </p:cNvPr>
+          <p:cNvSpPr>
+            <a:spLocks noGrp="1"/>
+          </p:cNvSpPr>
+          <p:nvPr>
+            <p:ph idx="1"/>
+          </p:nvPr>
+        </p:nvSpPr>
+        <p:spPr/>
+        <p:txBody>
+          <a:bodyPr/>
+          <a:lstStyle/>
+          <a:p>
+            <a:pPr marL="0" indent="0">
+              <a:buNone/>
+            </a:pPr>
+            <a:r>
+              <a:rPr lang="es-419" dirty="0"/>
+              <a:t> </a:t>
+            </a:r>
+          </a:p>
+        </p:txBody>
+      </p:sp>
+    </p:spTree>
+    <p:extLst>
+      <p:ext uri="{BB962C8B-B14F-4D97-AF65-F5344CB8AC3E}">
+        <p14:creationId xmlns:p14="http://schemas.microsoft.com/office/powerpoint/2010/main" val="2859493164"/>
+      </p:ext>
+    </p:extLst>
+  </p:cSld>
+  <p:clrMapOvr>
+    <a:masterClrMapping/>
+  </p:clrMapOvr>
+</p:sld>
+</file>
+
+<file path=ppt/slides/slide11.xml><?xml version="1.0" encoding="utf-8"?>
+<p:sld xmlns:a="http://schemas.openxmlformats.org/drawingml/2006/main" xmlns:r="http://schemas.openxmlformats.org/officeDocument/2006/relationships" xmlns:p="http://schemas.openxmlformats.org/presentationml/2006/main">
+  <p:cSld>
+    <p:spTree>
+      <p:nvGrpSpPr>
+        <p:cNvPr id="1" name=""/>
+        <p:cNvGrpSpPr/>
+        <p:nvPr/>
+      </p:nvGrpSpPr>
+      <p:grpSpPr>
+        <a:xfrm>
+          <a:off x="0" y="0"/>
+          <a:ext cx="0" cy="0"/>
+          <a:chOff x="0" y="0"/>
+          <a:chExt cx="0" cy="0"/>
+        </a:xfrm>
+      </p:grpSpPr>
+      <p:sp>
+        <p:nvSpPr>
+          <p:cNvPr id="2" name="Title 1">
+            <a:extLst>
+              <a:ext uri="{FF2B5EF4-FFF2-40B4-BE49-F238E27FC236}">
+                <a16:creationId xmlns:a16="http://schemas.microsoft.com/office/drawing/2014/main" id="{E94C24EB-7ECC-4ECF-9E67-D3422B6EC4F8}"/>
+              </a:ext>
+            </a:extLst>
+          </p:cNvPr>
+          <p:cNvSpPr>
+            <a:spLocks noGrp="1"/>
+          </p:cNvSpPr>
+          <p:nvPr>
+            <p:ph type="title"/>
+          </p:nvPr>
+        </p:nvSpPr>
+        <p:spPr/>
+        <p:txBody>
+          <a:bodyPr/>
+          <a:lstStyle/>
+          <a:p>
+            <a:r>
+              <a:rPr lang="en-US" dirty="0" err="1"/>
+              <a:t>Estructura</a:t>
+            </a:r>
+            <a:r>
+              <a:rPr lang="en-US" dirty="0"/>
+              <a:t> de un </a:t>
+            </a:r>
+            <a:r>
+              <a:rPr lang="en-US" dirty="0" err="1"/>
+              <a:t>Repositorio</a:t>
+            </a:r>
+            <a:endParaRPr lang="es-419" dirty="0"/>
+          </a:p>
+        </p:txBody>
+      </p:sp>
+      <p:sp>
+        <p:nvSpPr>
+          <p:cNvPr id="3" name="Content Placeholder 2">
+            <a:extLst>
+              <a:ext uri="{FF2B5EF4-FFF2-40B4-BE49-F238E27FC236}">
+                <a16:creationId xmlns:a16="http://schemas.microsoft.com/office/drawing/2014/main" id="{4C8A22F4-750C-4E9A-B539-BC08DBA1AC78}"/>
+              </a:ext>
+            </a:extLst>
+          </p:cNvPr>
+          <p:cNvSpPr>
+            <a:spLocks noGrp="1"/>
+          </p:cNvSpPr>
+          <p:nvPr>
+            <p:ph idx="1"/>
+          </p:nvPr>
+        </p:nvSpPr>
+        <p:spPr/>
+        <p:txBody>
+          <a:bodyPr/>
+          <a:lstStyle/>
+          <a:p>
+            <a:pPr marL="0" indent="0">
+              <a:buNone/>
+            </a:pPr>
+            <a:r>
+              <a:rPr lang="es-419" dirty="0"/>
+              <a:t> </a:t>
+            </a:r>
+          </a:p>
+        </p:txBody>
+      </p:sp>
+      <p:sp>
+        <p:nvSpPr>
+          <p:cNvPr id="4" name="TextBox 3">
+            <a:extLst>
+              <a:ext uri="{FF2B5EF4-FFF2-40B4-BE49-F238E27FC236}">
+                <a16:creationId xmlns:a16="http://schemas.microsoft.com/office/drawing/2014/main" id="{2DCECD34-2AA5-41A0-80E6-B33058206DCA}"/>
+              </a:ext>
+            </a:extLst>
+          </p:cNvPr>
+          <p:cNvSpPr txBox="1"/>
+          <p:nvPr/>
+        </p:nvSpPr>
+        <p:spPr>
+          <a:xfrm>
+            <a:off x="952901" y="2531444"/>
+            <a:ext cx="2470163" cy="1754326"/>
+          </a:xfrm>
+          <a:prstGeom prst="rect">
+            <a:avLst/>
+          </a:prstGeom>
+          <a:noFill/>
+        </p:spPr>
+        <p:txBody>
+          <a:bodyPr wrap="none" rtlCol="0">
+            <a:spAutoFit/>
+          </a:bodyPr>
+          <a:lstStyle/>
+          <a:p>
+            <a:pPr marL="285750" indent="-285750">
+              <a:buFontTx/>
+              <a:buChar char="-"/>
+            </a:pPr>
+            <a:r>
+              <a:rPr lang="en-US" dirty="0"/>
+              <a:t>Branches por </a:t>
+            </a:r>
+            <a:r>
+              <a:rPr lang="en-US" dirty="0" err="1"/>
+              <a:t>defecto</a:t>
+            </a:r>
+            <a:endParaRPr lang="en-US" dirty="0"/>
+          </a:p>
+          <a:p>
+            <a:pPr marL="285750" indent="-285750">
+              <a:buFontTx/>
+              <a:buChar char="-"/>
+            </a:pPr>
+            <a:r>
+              <a:rPr lang="en-US" dirty="0" err="1"/>
+              <a:t>Gitignore</a:t>
+            </a:r>
+            <a:endParaRPr lang="en-US" dirty="0"/>
+          </a:p>
+          <a:p>
+            <a:pPr marL="285750" indent="-285750">
+              <a:buFontTx/>
+              <a:buChar char="-"/>
+            </a:pPr>
+            <a:r>
+              <a:rPr lang="en-US" dirty="0"/>
+              <a:t>License</a:t>
+            </a:r>
+          </a:p>
+          <a:p>
+            <a:pPr marL="285750" indent="-285750">
+              <a:buFontTx/>
+              <a:buChar char="-"/>
+            </a:pPr>
+            <a:r>
+              <a:rPr lang="en-US" dirty="0"/>
+              <a:t>Readme</a:t>
+            </a:r>
+          </a:p>
+          <a:p>
+            <a:endParaRPr lang="en-US" dirty="0"/>
+          </a:p>
+          <a:p>
+            <a:endParaRPr lang="es-419" dirty="0"/>
+          </a:p>
+        </p:txBody>
+      </p:sp>
+    </p:spTree>
+    <p:extLst>
+      <p:ext uri="{BB962C8B-B14F-4D97-AF65-F5344CB8AC3E}">
+        <p14:creationId xmlns:p14="http://schemas.microsoft.com/office/powerpoint/2010/main" val="4210234373"/>
+      </p:ext>
+    </p:extLst>
+  </p:cSld>
+  <p:clrMapOvr>
+    <a:masterClrMapping/>
+  </p:clrMapOvr>
+</p:sld>
+</file>
+
+<file path=ppt/slides/slide12.xml><?xml version="1.0" encoding="utf-8"?>
+<p:sld xmlns:a="http://schemas.openxmlformats.org/drawingml/2006/main" xmlns:r="http://schemas.openxmlformats.org/officeDocument/2006/relationships" xmlns:p="http://schemas.openxmlformats.org/presentationml/2006/main">
+  <p:cSld>
+    <p:spTree>
+      <p:nvGrpSpPr>
+        <p:cNvPr id="1" name=""/>
+        <p:cNvGrpSpPr/>
+        <p:nvPr/>
+      </p:nvGrpSpPr>
+      <p:grpSpPr>
+        <a:xfrm>
+          <a:off x="0" y="0"/>
+          <a:ext cx="0" cy="0"/>
+          <a:chOff x="0" y="0"/>
+          <a:chExt cx="0" cy="0"/>
+        </a:xfrm>
+      </p:grpSpPr>
+      <p:sp>
+        <p:nvSpPr>
+          <p:cNvPr id="2" name="Title 1">
+            <a:extLst>
+              <a:ext uri="{FF2B5EF4-FFF2-40B4-BE49-F238E27FC236}">
+                <a16:creationId xmlns:a16="http://schemas.microsoft.com/office/drawing/2014/main" id="{E94C24EB-7ECC-4ECF-9E67-D3422B6EC4F8}"/>
+              </a:ext>
+            </a:extLst>
+          </p:cNvPr>
+          <p:cNvSpPr>
+            <a:spLocks noGrp="1"/>
+          </p:cNvSpPr>
+          <p:nvPr>
+            <p:ph type="title"/>
+          </p:nvPr>
+        </p:nvSpPr>
+        <p:spPr/>
+        <p:txBody>
+          <a:bodyPr/>
+          <a:lstStyle/>
+          <a:p>
+            <a:r>
+              <a:rPr lang="en-US" dirty="0"/>
+              <a:t>Git/Github/</a:t>
+            </a:r>
+            <a:r>
+              <a:rPr lang="en-US" dirty="0" err="1"/>
+              <a:t>GitKraken</a:t>
+            </a:r>
+            <a:endParaRPr lang="es-419" dirty="0"/>
+          </a:p>
+        </p:txBody>
+      </p:sp>
+      <p:sp>
+        <p:nvSpPr>
+          <p:cNvPr id="3" name="Content Placeholder 2">
+            <a:extLst>
+              <a:ext uri="{FF2B5EF4-FFF2-40B4-BE49-F238E27FC236}">
+                <a16:creationId xmlns:a16="http://schemas.microsoft.com/office/drawing/2014/main" id="{4C8A22F4-750C-4E9A-B539-BC08DBA1AC78}"/>
+              </a:ext>
+            </a:extLst>
+          </p:cNvPr>
+          <p:cNvSpPr>
+            <a:spLocks noGrp="1"/>
+          </p:cNvSpPr>
+          <p:nvPr>
+            <p:ph idx="1"/>
+          </p:nvPr>
+        </p:nvSpPr>
+        <p:spPr/>
+        <p:txBody>
+          <a:bodyPr/>
+          <a:lstStyle/>
+          <a:p>
+            <a:pPr marL="0" indent="0">
+              <a:buNone/>
+            </a:pPr>
+            <a:r>
+              <a:rPr lang="es-419" dirty="0"/>
+              <a:t> </a:t>
+            </a:r>
+          </a:p>
+        </p:txBody>
+      </p:sp>
+    </p:spTree>
+    <p:extLst>
+      <p:ext uri="{BB962C8B-B14F-4D97-AF65-F5344CB8AC3E}">
+        <p14:creationId xmlns:p14="http://schemas.microsoft.com/office/powerpoint/2010/main" val="4223982895"/>
+      </p:ext>
+    </p:extLst>
+  </p:cSld>
+  <p:clrMapOvr>
+    <a:masterClrMapping/>
+  </p:clrMapOvr>
+</p:sld>
+</file>
+
+<file path=ppt/slides/slide13.xml><?xml version="1.0" encoding="utf-8"?>
+<p:sld xmlns:a="http://schemas.openxmlformats.org/drawingml/2006/main" xmlns:r="http://schemas.openxmlformats.org/officeDocument/2006/relationships" xmlns:p="http://schemas.openxmlformats.org/presentationml/2006/main">
+  <p:cSld>
+    <p:spTree>
+      <p:nvGrpSpPr>
+        <p:cNvPr id="1" name=""/>
+        <p:cNvGrpSpPr/>
+        <p:nvPr/>
+      </p:nvGrpSpPr>
+      <p:grpSpPr>
+        <a:xfrm>
+          <a:off x="0" y="0"/>
+          <a:ext cx="0" cy="0"/>
+          <a:chOff x="0" y="0"/>
+          <a:chExt cx="0" cy="0"/>
+        </a:xfrm>
+      </p:grpSpPr>
+      <p:sp>
+        <p:nvSpPr>
+          <p:cNvPr id="2" name="Title 1">
+            <a:extLst>
+              <a:ext uri="{FF2B5EF4-FFF2-40B4-BE49-F238E27FC236}">
+                <a16:creationId xmlns:a16="http://schemas.microsoft.com/office/drawing/2014/main" id="{E94C24EB-7ECC-4ECF-9E67-D3422B6EC4F8}"/>
+              </a:ext>
+            </a:extLst>
+          </p:cNvPr>
+          <p:cNvSpPr>
+            <a:spLocks noGrp="1"/>
+          </p:cNvSpPr>
+          <p:nvPr>
+            <p:ph type="title"/>
+          </p:nvPr>
+        </p:nvSpPr>
+        <p:spPr/>
+        <p:txBody>
+          <a:bodyPr/>
+          <a:lstStyle/>
+          <a:p>
+            <a:r>
+              <a:rPr lang="en-US" dirty="0" err="1"/>
+              <a:t>Esquema</a:t>
+            </a:r>
+            <a:r>
+              <a:rPr lang="en-US" dirty="0"/>
+              <a:t> de Branches</a:t>
+            </a:r>
+            <a:endParaRPr lang="es-419" dirty="0"/>
+          </a:p>
+        </p:txBody>
+      </p:sp>
+      <p:sp>
+        <p:nvSpPr>
+          <p:cNvPr id="3" name="Content Placeholder 2">
+            <a:extLst>
+              <a:ext uri="{FF2B5EF4-FFF2-40B4-BE49-F238E27FC236}">
+                <a16:creationId xmlns:a16="http://schemas.microsoft.com/office/drawing/2014/main" id="{4C8A22F4-750C-4E9A-B539-BC08DBA1AC78}"/>
+              </a:ext>
+            </a:extLst>
+          </p:cNvPr>
+          <p:cNvSpPr>
+            <a:spLocks noGrp="1"/>
+          </p:cNvSpPr>
+          <p:nvPr>
+            <p:ph idx="1"/>
+          </p:nvPr>
+        </p:nvSpPr>
+        <p:spPr/>
+        <p:txBody>
+          <a:bodyPr/>
+          <a:lstStyle/>
+          <a:p>
+            <a:pPr marL="0" indent="0">
+              <a:buNone/>
+            </a:pPr>
+            <a:r>
+              <a:rPr lang="es-419" dirty="0"/>
+              <a:t> </a:t>
+            </a:r>
+          </a:p>
+        </p:txBody>
+      </p:sp>
+    </p:spTree>
+    <p:extLst>
+      <p:ext uri="{BB962C8B-B14F-4D97-AF65-F5344CB8AC3E}">
+        <p14:creationId xmlns:p14="http://schemas.microsoft.com/office/powerpoint/2010/main" val="1981387030"/>
+      </p:ext>
+    </p:extLst>
+  </p:cSld>
+  <p:clrMapOvr>
+    <a:masterClrMapping/>
+  </p:clrMapOvr>
+</p:sld>
+</file>
+
+<file path=ppt/slides/slide14.xml><?xml version="1.0" encoding="utf-8"?>
+<p:sld xmlns:a="http://schemas.openxmlformats.org/drawingml/2006/main" xmlns:r="http://schemas.openxmlformats.org/officeDocument/2006/relationships" xmlns:p="http://schemas.openxmlformats.org/presentationml/2006/main">
+  <p:cSld>
+    <p:spTree>
+      <p:nvGrpSpPr>
+        <p:cNvPr id="1" name=""/>
+        <p:cNvGrpSpPr/>
+        <p:nvPr/>
+      </p:nvGrpSpPr>
+      <p:grpSpPr>
+        <a:xfrm>
+          <a:off x="0" y="0"/>
+          <a:ext cx="0" cy="0"/>
+          <a:chOff x="0" y="0"/>
+          <a:chExt cx="0" cy="0"/>
+        </a:xfrm>
+      </p:grpSpPr>
+      <p:sp>
+        <p:nvSpPr>
+          <p:cNvPr id="2" name="Title 1">
+            <a:extLst>
+              <a:ext uri="{FF2B5EF4-FFF2-40B4-BE49-F238E27FC236}">
+                <a16:creationId xmlns:a16="http://schemas.microsoft.com/office/drawing/2014/main" id="{E94C24EB-7ECC-4ECF-9E67-D3422B6EC4F8}"/>
+              </a:ext>
+            </a:extLst>
+          </p:cNvPr>
+          <p:cNvSpPr>
+            <a:spLocks noGrp="1"/>
+          </p:cNvSpPr>
+          <p:nvPr>
+            <p:ph type="title"/>
+          </p:nvPr>
+        </p:nvSpPr>
+        <p:spPr/>
+        <p:txBody>
+          <a:bodyPr/>
+          <a:lstStyle/>
+          <a:p>
+            <a:r>
+              <a:rPr lang="en-US" dirty="0" err="1"/>
+              <a:t>Comunicaci</a:t>
+            </a:r>
+            <a:r>
+              <a:rPr lang="es-419" dirty="0" err="1"/>
+              <a:t>ó</a:t>
+            </a:r>
+            <a:r>
+              <a:rPr lang="en-US" dirty="0"/>
+              <a:t>n</a:t>
+            </a:r>
+            <a:endParaRPr lang="es-419" dirty="0"/>
+          </a:p>
+        </p:txBody>
+      </p:sp>
+      <p:sp>
+        <p:nvSpPr>
+          <p:cNvPr id="3" name="Content Placeholder 2">
+            <a:extLst>
+              <a:ext uri="{FF2B5EF4-FFF2-40B4-BE49-F238E27FC236}">
+                <a16:creationId xmlns:a16="http://schemas.microsoft.com/office/drawing/2014/main" id="{4C8A22F4-750C-4E9A-B539-BC08DBA1AC78}"/>
+              </a:ext>
+            </a:extLst>
+          </p:cNvPr>
+          <p:cNvSpPr>
+            <a:spLocks noGrp="1"/>
+          </p:cNvSpPr>
+          <p:nvPr>
+            <p:ph idx="1"/>
+          </p:nvPr>
+        </p:nvSpPr>
+        <p:spPr/>
+        <p:txBody>
+          <a:bodyPr/>
+          <a:lstStyle/>
+          <a:p>
+            <a:pPr marL="0" indent="0">
+              <a:buNone/>
+            </a:pPr>
+            <a:r>
+              <a:rPr lang="es-419" dirty="0"/>
+              <a:t> </a:t>
+            </a:r>
+          </a:p>
+        </p:txBody>
+      </p:sp>
+    </p:spTree>
+    <p:extLst>
+      <p:ext uri="{BB962C8B-B14F-4D97-AF65-F5344CB8AC3E}">
+        <p14:creationId xmlns:p14="http://schemas.microsoft.com/office/powerpoint/2010/main" val="3740971148"/>
+      </p:ext>
+    </p:extLst>
+  </p:cSld>
+  <p:clrMapOvr>
+    <a:masterClrMapping/>
+  </p:clrMapOvr>
+</p:sld>
+</file>
+
+<file path=ppt/slides/slide15.xml><?xml version="1.0" encoding="utf-8"?>
+<p:sld xmlns:a="http://schemas.openxmlformats.org/drawingml/2006/main" xmlns:r="http://schemas.openxmlformats.org/officeDocument/2006/relationships" xmlns:p="http://schemas.openxmlformats.org/presentationml/2006/main">
+  <p:cSld>
+    <p:spTree>
+      <p:nvGrpSpPr>
+        <p:cNvPr id="1" name=""/>
+        <p:cNvGrpSpPr/>
+        <p:nvPr/>
+      </p:nvGrpSpPr>
+      <p:grpSpPr>
+        <a:xfrm>
+          <a:off x="0" y="0"/>
+          <a:ext cx="0" cy="0"/>
+          <a:chOff x="0" y="0"/>
+          <a:chExt cx="0" cy="0"/>
+        </a:xfrm>
+      </p:grpSpPr>
+      <p:sp>
+        <p:nvSpPr>
+          <p:cNvPr id="2" name="Title 1">
+            <a:extLst>
+              <a:ext uri="{FF2B5EF4-FFF2-40B4-BE49-F238E27FC236}">
+                <a16:creationId xmlns:a16="http://schemas.microsoft.com/office/drawing/2014/main" id="{E94C24EB-7ECC-4ECF-9E67-D3422B6EC4F8}"/>
+              </a:ext>
+            </a:extLst>
+          </p:cNvPr>
+          <p:cNvSpPr>
+            <a:spLocks noGrp="1"/>
+          </p:cNvSpPr>
+          <p:nvPr>
+            <p:ph type="title"/>
+          </p:nvPr>
+        </p:nvSpPr>
+        <p:spPr/>
+        <p:txBody>
+          <a:bodyPr/>
+          <a:lstStyle/>
+          <a:p>
+            <a:r>
+              <a:rPr lang="en-US" dirty="0"/>
+              <a:t>Trello/Boards</a:t>
+            </a:r>
+            <a:endParaRPr lang="es-419" dirty="0"/>
+          </a:p>
+        </p:txBody>
+      </p:sp>
+      <p:sp>
+        <p:nvSpPr>
+          <p:cNvPr id="3" name="Content Placeholder 2">
+            <a:extLst>
+              <a:ext uri="{FF2B5EF4-FFF2-40B4-BE49-F238E27FC236}">
+                <a16:creationId xmlns:a16="http://schemas.microsoft.com/office/drawing/2014/main" id="{4C8A22F4-750C-4E9A-B539-BC08DBA1AC78}"/>
+              </a:ext>
+            </a:extLst>
+          </p:cNvPr>
+          <p:cNvSpPr>
+            <a:spLocks noGrp="1"/>
+          </p:cNvSpPr>
+          <p:nvPr>
+            <p:ph idx="1"/>
+          </p:nvPr>
+        </p:nvSpPr>
+        <p:spPr/>
+        <p:txBody>
+          <a:bodyPr/>
+          <a:lstStyle/>
+          <a:p>
+            <a:pPr marL="0" indent="0">
+              <a:buNone/>
+            </a:pPr>
+            <a:r>
+              <a:rPr lang="es-419" dirty="0"/>
+              <a:t> </a:t>
+            </a:r>
+          </a:p>
+        </p:txBody>
+      </p:sp>
+    </p:spTree>
+    <p:extLst>
+      <p:ext uri="{BB962C8B-B14F-4D97-AF65-F5344CB8AC3E}">
+        <p14:creationId xmlns:p14="http://schemas.microsoft.com/office/powerpoint/2010/main" val="3387504599"/>
+      </p:ext>
+    </p:extLst>
+  </p:cSld>
+  <p:clrMapOvr>
+    <a:masterClrMapping/>
+  </p:clrMapOvr>
+</p:sld>
+</file>
+
+<file path=ppt/slides/slide16.xml><?xml version="1.0" encoding="utf-8"?>
+<p:sld xmlns:a="http://schemas.openxmlformats.org/drawingml/2006/main" xmlns:r="http://schemas.openxmlformats.org/officeDocument/2006/relationships" xmlns:p="http://schemas.openxmlformats.org/presentationml/2006/main">
+  <p:cSld>
+    <p:spTree>
+      <p:nvGrpSpPr>
+        <p:cNvPr id="1" name=""/>
+        <p:cNvGrpSpPr/>
+        <p:nvPr/>
+      </p:nvGrpSpPr>
+      <p:grpSpPr>
+        <a:xfrm>
+          <a:off x="0" y="0"/>
+          <a:ext cx="0" cy="0"/>
+          <a:chOff x="0" y="0"/>
+          <a:chExt cx="0" cy="0"/>
+        </a:xfrm>
+      </p:grpSpPr>
+      <p:sp>
+        <p:nvSpPr>
+          <p:cNvPr id="2" name="Title 1">
+            <a:extLst>
+              <a:ext uri="{FF2B5EF4-FFF2-40B4-BE49-F238E27FC236}">
+                <a16:creationId xmlns:a16="http://schemas.microsoft.com/office/drawing/2014/main" id="{E94C24EB-7ECC-4ECF-9E67-D3422B6EC4F8}"/>
+              </a:ext>
+            </a:extLst>
+          </p:cNvPr>
+          <p:cNvSpPr>
+            <a:spLocks noGrp="1"/>
+          </p:cNvSpPr>
+          <p:nvPr>
+            <p:ph type="title"/>
+          </p:nvPr>
+        </p:nvSpPr>
+        <p:spPr/>
+        <p:txBody>
+          <a:bodyPr/>
+          <a:lstStyle/>
+          <a:p>
+            <a:r>
+              <a:rPr lang="en-US" dirty="0"/>
+              <a:t>Conflicts: </a:t>
+            </a:r>
+            <a:r>
+              <a:rPr lang="en-US" dirty="0" err="1"/>
+              <a:t>Prevenir</a:t>
+            </a:r>
+            <a:endParaRPr lang="es-419" dirty="0"/>
+          </a:p>
+        </p:txBody>
+      </p:sp>
+      <p:sp>
+        <p:nvSpPr>
+          <p:cNvPr id="3" name="Content Placeholder 2">
+            <a:extLst>
+              <a:ext uri="{FF2B5EF4-FFF2-40B4-BE49-F238E27FC236}">
+                <a16:creationId xmlns:a16="http://schemas.microsoft.com/office/drawing/2014/main" id="{4C8A22F4-750C-4E9A-B539-BC08DBA1AC78}"/>
+              </a:ext>
+            </a:extLst>
+          </p:cNvPr>
+          <p:cNvSpPr>
+            <a:spLocks noGrp="1"/>
+          </p:cNvSpPr>
+          <p:nvPr>
+            <p:ph idx="1"/>
+          </p:nvPr>
+        </p:nvSpPr>
+        <p:spPr/>
+        <p:txBody>
+          <a:bodyPr/>
+          <a:lstStyle/>
+          <a:p>
+            <a:pPr marL="0" indent="0">
+              <a:buNone/>
+            </a:pPr>
+            <a:r>
+              <a:rPr lang="es-419" dirty="0"/>
+              <a:t> </a:t>
+            </a:r>
+          </a:p>
+        </p:txBody>
+      </p:sp>
+      <p:sp>
+        <p:nvSpPr>
+          <p:cNvPr id="4" name="TextBox 3">
+            <a:extLst>
+              <a:ext uri="{FF2B5EF4-FFF2-40B4-BE49-F238E27FC236}">
+                <a16:creationId xmlns:a16="http://schemas.microsoft.com/office/drawing/2014/main" id="{D38FAB16-376C-468C-A3E6-F4486C832DE7}"/>
+              </a:ext>
+            </a:extLst>
+          </p:cNvPr>
+          <p:cNvSpPr txBox="1"/>
+          <p:nvPr/>
+        </p:nvSpPr>
+        <p:spPr>
+          <a:xfrm>
+            <a:off x="838200" y="3301465"/>
+            <a:ext cx="2910284" cy="1200329"/>
+          </a:xfrm>
+          <a:prstGeom prst="rect">
+            <a:avLst/>
+          </a:prstGeom>
+          <a:noFill/>
+        </p:spPr>
+        <p:txBody>
+          <a:bodyPr wrap="none" rtlCol="0">
+            <a:spAutoFit/>
+          </a:bodyPr>
+          <a:lstStyle/>
+          <a:p>
+            <a:r>
+              <a:rPr lang="en-US" dirty="0" err="1"/>
+              <a:t>Separacion</a:t>
+            </a:r>
+            <a:r>
+              <a:rPr lang="en-US" dirty="0"/>
+              <a:t> de </a:t>
+            </a:r>
+            <a:r>
+              <a:rPr lang="en-US" dirty="0" err="1"/>
+              <a:t>código</a:t>
+            </a:r>
+            <a:endParaRPr lang="es-419" dirty="0"/>
+          </a:p>
+          <a:p>
+            <a:r>
+              <a:rPr lang="es-419" dirty="0"/>
+              <a:t>Actualizar mi Branch primero</a:t>
+            </a:r>
+          </a:p>
+          <a:p>
+            <a:r>
+              <a:rPr lang="en-US" dirty="0" err="1"/>
+              <a:t>Comunicacion</a:t>
+            </a:r>
+            <a:endParaRPr lang="en-US" dirty="0"/>
+          </a:p>
+          <a:p>
+            <a:endParaRPr lang="en-US" dirty="0"/>
+          </a:p>
+        </p:txBody>
+      </p:sp>
+    </p:spTree>
+    <p:extLst>
+      <p:ext uri="{BB962C8B-B14F-4D97-AF65-F5344CB8AC3E}">
+        <p14:creationId xmlns:p14="http://schemas.microsoft.com/office/powerpoint/2010/main" val="718397276"/>
+      </p:ext>
+    </p:extLst>
+  </p:cSld>
+  <p:clrMapOvr>
+    <a:masterClrMapping/>
+  </p:clrMapOvr>
+</p:sld>
+</file>
+
+<file path=ppt/slides/slide17.xml><?xml version="1.0" encoding="utf-8"?>
+<p:sld xmlns:a="http://schemas.openxmlformats.org/drawingml/2006/main" xmlns:r="http://schemas.openxmlformats.org/officeDocument/2006/relationships" xmlns:p="http://schemas.openxmlformats.org/presentationml/2006/main">
+  <p:cSld>
+    <p:spTree>
+      <p:nvGrpSpPr>
+        <p:cNvPr id="1" name=""/>
+        <p:cNvGrpSpPr/>
+        <p:nvPr/>
+      </p:nvGrpSpPr>
+      <p:grpSpPr>
+        <a:xfrm>
+          <a:off x="0" y="0"/>
+          <a:ext cx="0" cy="0"/>
+          <a:chOff x="0" y="0"/>
+          <a:chExt cx="0" cy="0"/>
+        </a:xfrm>
+      </p:grpSpPr>
+      <p:sp>
+        <p:nvSpPr>
+          <p:cNvPr id="2" name="Title 1">
+            <a:extLst>
+              <a:ext uri="{FF2B5EF4-FFF2-40B4-BE49-F238E27FC236}">
+                <a16:creationId xmlns:a16="http://schemas.microsoft.com/office/drawing/2014/main" id="{E94C24EB-7ECC-4ECF-9E67-D3422B6EC4F8}"/>
+              </a:ext>
+            </a:extLst>
+          </p:cNvPr>
+          <p:cNvSpPr>
+            <a:spLocks noGrp="1"/>
+          </p:cNvSpPr>
+          <p:nvPr>
+            <p:ph type="title"/>
+          </p:nvPr>
+        </p:nvSpPr>
+        <p:spPr/>
+        <p:txBody>
+          <a:bodyPr/>
+          <a:lstStyle/>
+          <a:p>
+            <a:r>
+              <a:rPr lang="en-US" dirty="0" err="1"/>
+              <a:t>Separar</a:t>
+            </a:r>
+            <a:r>
+              <a:rPr lang="en-US" dirty="0"/>
+              <a:t> </a:t>
+            </a:r>
+            <a:r>
+              <a:rPr lang="en-US" dirty="0" err="1"/>
+              <a:t>codigo</a:t>
+            </a:r>
+            <a:endParaRPr lang="es-419" dirty="0"/>
+          </a:p>
+        </p:txBody>
+      </p:sp>
+      <p:sp>
+        <p:nvSpPr>
+          <p:cNvPr id="4" name="TextBox 3">
+            <a:extLst>
+              <a:ext uri="{FF2B5EF4-FFF2-40B4-BE49-F238E27FC236}">
+                <a16:creationId xmlns:a16="http://schemas.microsoft.com/office/drawing/2014/main" id="{D38FAB16-376C-468C-A3E6-F4486C832DE7}"/>
+              </a:ext>
+            </a:extLst>
+          </p:cNvPr>
+          <p:cNvSpPr txBox="1"/>
+          <p:nvPr/>
+        </p:nvSpPr>
+        <p:spPr>
+          <a:xfrm>
+            <a:off x="838200" y="3301465"/>
+            <a:ext cx="3591240" cy="1200329"/>
+          </a:xfrm>
+          <a:prstGeom prst="rect">
+            <a:avLst/>
+          </a:prstGeom>
+          <a:noFill/>
+        </p:spPr>
+        <p:txBody>
+          <a:bodyPr wrap="none" rtlCol="0">
+            <a:spAutoFit/>
+          </a:bodyPr>
+          <a:lstStyle/>
+          <a:p>
+            <a:r>
+              <a:rPr lang="en-US" dirty="0" err="1"/>
+              <a:t>Principios</a:t>
+            </a:r>
+            <a:r>
+              <a:rPr lang="en-US" dirty="0"/>
+              <a:t> de </a:t>
+            </a:r>
+            <a:r>
+              <a:rPr lang="en-US" dirty="0" err="1"/>
+              <a:t>responsabilidad</a:t>
+            </a:r>
+            <a:r>
+              <a:rPr lang="en-US" dirty="0"/>
+              <a:t> simple</a:t>
+            </a:r>
+          </a:p>
+          <a:p>
+            <a:r>
+              <a:rPr lang="en-US" dirty="0"/>
+              <a:t>Interfaces</a:t>
+            </a:r>
+          </a:p>
+          <a:p>
+            <a:r>
+              <a:rPr lang="en-US" dirty="0" err="1"/>
+              <a:t>Caja</a:t>
+            </a:r>
+            <a:r>
+              <a:rPr lang="en-US" dirty="0"/>
+              <a:t> </a:t>
+            </a:r>
+            <a:r>
+              <a:rPr lang="en-US" dirty="0" err="1"/>
+              <a:t>negra</a:t>
+            </a:r>
+            <a:r>
+              <a:rPr lang="en-US" dirty="0"/>
+              <a:t>/ley de Demeter</a:t>
+            </a:r>
+          </a:p>
+          <a:p>
+            <a:endParaRPr lang="en-US" dirty="0"/>
+          </a:p>
+        </p:txBody>
+      </p:sp>
+    </p:spTree>
+    <p:extLst>
+      <p:ext uri="{BB962C8B-B14F-4D97-AF65-F5344CB8AC3E}">
+        <p14:creationId xmlns:p14="http://schemas.microsoft.com/office/powerpoint/2010/main" val="1768428990"/>
+      </p:ext>
+    </p:extLst>
+  </p:cSld>
+  <p:clrMapOvr>
+    <a:masterClrMapping/>
+  </p:clrMapOvr>
+</p:sld>
+</file>
+
+<file path=ppt/slides/slide18.xml><?xml version="1.0" encoding="utf-8"?>
+<p:sld xmlns:a="http://schemas.openxmlformats.org/drawingml/2006/main" xmlns:r="http://schemas.openxmlformats.org/officeDocument/2006/relationships" xmlns:p="http://schemas.openxmlformats.org/presentationml/2006/main">
+  <p:cSld>
+    <p:spTree>
+      <p:nvGrpSpPr>
+        <p:cNvPr id="1" name=""/>
+        <p:cNvGrpSpPr/>
+        <p:nvPr/>
+      </p:nvGrpSpPr>
+      <p:grpSpPr>
+        <a:xfrm>
+          <a:off x="0" y="0"/>
+          <a:ext cx="0" cy="0"/>
+          <a:chOff x="0" y="0"/>
+          <a:chExt cx="0" cy="0"/>
+        </a:xfrm>
+      </p:grpSpPr>
+      <p:sp>
+        <p:nvSpPr>
+          <p:cNvPr id="2" name="Title 1">
+            <a:extLst>
+              <a:ext uri="{FF2B5EF4-FFF2-40B4-BE49-F238E27FC236}">
+                <a16:creationId xmlns:a16="http://schemas.microsoft.com/office/drawing/2014/main" id="{E94C24EB-7ECC-4ECF-9E67-D3422B6EC4F8}"/>
+              </a:ext>
+            </a:extLst>
+          </p:cNvPr>
+          <p:cNvSpPr>
+            <a:spLocks noGrp="1"/>
+          </p:cNvSpPr>
+          <p:nvPr>
+            <p:ph type="title"/>
+          </p:nvPr>
+        </p:nvSpPr>
+        <p:spPr/>
+        <p:txBody>
+          <a:bodyPr/>
+          <a:lstStyle/>
+          <a:p>
+            <a:r>
+              <a:rPr lang="en-US" dirty="0"/>
+              <a:t>Conflicts: </a:t>
+            </a:r>
+            <a:r>
+              <a:rPr lang="en-US" dirty="0" err="1"/>
+              <a:t>Lamentar</a:t>
+            </a:r>
+            <a:r>
+              <a:rPr lang="en-US" dirty="0"/>
+              <a:t> (resolver merge)</a:t>
+            </a:r>
+            <a:endParaRPr lang="es-419" dirty="0"/>
+          </a:p>
+        </p:txBody>
+      </p:sp>
+      <p:sp>
+        <p:nvSpPr>
+          <p:cNvPr id="3" name="Content Placeholder 2">
+            <a:extLst>
+              <a:ext uri="{FF2B5EF4-FFF2-40B4-BE49-F238E27FC236}">
+                <a16:creationId xmlns:a16="http://schemas.microsoft.com/office/drawing/2014/main" id="{4C8A22F4-750C-4E9A-B539-BC08DBA1AC78}"/>
+              </a:ext>
+            </a:extLst>
+          </p:cNvPr>
+          <p:cNvSpPr>
+            <a:spLocks noGrp="1"/>
+          </p:cNvSpPr>
+          <p:nvPr>
+            <p:ph idx="1"/>
+          </p:nvPr>
+        </p:nvSpPr>
+        <p:spPr/>
+        <p:txBody>
+          <a:bodyPr/>
+          <a:lstStyle/>
+          <a:p>
+            <a:pPr marL="0" indent="0">
+              <a:buNone/>
+            </a:pPr>
+            <a:r>
+              <a:rPr lang="es-419" dirty="0"/>
+              <a:t> </a:t>
+            </a:r>
+          </a:p>
+        </p:txBody>
+      </p:sp>
+    </p:spTree>
+    <p:extLst>
+      <p:ext uri="{BB962C8B-B14F-4D97-AF65-F5344CB8AC3E}">
+        <p14:creationId xmlns:p14="http://schemas.microsoft.com/office/powerpoint/2010/main" val="3331826155"/>
+      </p:ext>
+    </p:extLst>
+  </p:cSld>
+  <p:clrMapOvr>
+    <a:masterClrMapping/>
+  </p:clrMapOvr>
+</p:sld>
+</file>
+
 <file path=ppt/slides/slide2.xml><?xml version="1.0" encoding="utf-8"?>
 <p:sld xmlns:a="http://schemas.openxmlformats.org/drawingml/2006/main" xmlns:r="http://schemas.openxmlformats.org/officeDocument/2006/relationships" xmlns:p="http://schemas.openxmlformats.org/presentationml/2006/main">
   <p:cSld>
@@ -4380,6 +5431,42 @@
               <a:rPr lang="es-419" dirty="0"/>
               <a:t> </a:t>
             </a:r>
+          </a:p>
+        </p:txBody>
+      </p:sp>
+      <p:sp>
+        <p:nvSpPr>
+          <p:cNvPr id="4" name="TextBox 3">
+            <a:extLst>
+              <a:ext uri="{FF2B5EF4-FFF2-40B4-BE49-F238E27FC236}">
+                <a16:creationId xmlns:a16="http://schemas.microsoft.com/office/drawing/2014/main" id="{1E7665FC-A04F-40EE-91BC-EF257DD150FD}"/>
+              </a:ext>
+            </a:extLst>
+          </p:cNvPr>
+          <p:cNvSpPr txBox="1"/>
+          <p:nvPr/>
+        </p:nvSpPr>
+        <p:spPr>
+          <a:xfrm>
+            <a:off x="673768" y="3821229"/>
+            <a:ext cx="1441998" cy="369332"/>
+          </a:xfrm>
+          <a:prstGeom prst="rect">
+            <a:avLst/>
+          </a:prstGeom>
+          <a:noFill/>
+        </p:spPr>
+        <p:txBody>
+          <a:bodyPr wrap="none" rtlCol="0">
+            <a:spAutoFit/>
+          </a:bodyPr>
+          <a:lstStyle/>
+          <a:p>
+            <a:r>
+              <a:rPr lang="en-US" dirty="0"/>
+              <a:t>Local/remote</a:t>
+            </a:r>
+            <a:endParaRPr lang="es-419" dirty="0"/>
           </a:p>
         </p:txBody>
       </p:sp>

</xml_diff>

<commit_message>
Agregados conceptos hasta portada de branch
</commit_message>
<xml_diff>
--- a/Presentation/Git Gud 2.pptx
+++ b/Presentation/Git Gud 2.pptx
@@ -12,17 +12,18 @@
     <p:sldId id="259" r:id="rId6"/>
     <p:sldId id="260" r:id="rId7"/>
     <p:sldId id="261" r:id="rId8"/>
-    <p:sldId id="262" r:id="rId9"/>
-    <p:sldId id="264" r:id="rId10"/>
-    <p:sldId id="265" r:id="rId11"/>
-    <p:sldId id="266" r:id="rId12"/>
-    <p:sldId id="267" r:id="rId13"/>
-    <p:sldId id="268" r:id="rId14"/>
-    <p:sldId id="269" r:id="rId15"/>
-    <p:sldId id="270" r:id="rId16"/>
-    <p:sldId id="271" r:id="rId17"/>
-    <p:sldId id="274" r:id="rId18"/>
-    <p:sldId id="273" r:id="rId19"/>
+    <p:sldId id="275" r:id="rId9"/>
+    <p:sldId id="262" r:id="rId10"/>
+    <p:sldId id="264" r:id="rId11"/>
+    <p:sldId id="265" r:id="rId12"/>
+    <p:sldId id="266" r:id="rId13"/>
+    <p:sldId id="267" r:id="rId14"/>
+    <p:sldId id="268" r:id="rId15"/>
+    <p:sldId id="269" r:id="rId16"/>
+    <p:sldId id="270" r:id="rId17"/>
+    <p:sldId id="271" r:id="rId18"/>
+    <p:sldId id="274" r:id="rId19"/>
+    <p:sldId id="273" r:id="rId20"/>
   </p:sldIdLst>
   <p:sldSz cx="12192000" cy="6858000"/>
   <p:notesSz cx="6858000" cy="9144000"/>
@@ -6258,7 +6259,7 @@
     </p:spTree>
     <p:extLst>
       <p:ext uri="{BB962C8B-B14F-4D97-AF65-F5344CB8AC3E}">
-        <p14:creationId xmlns:p14="http://schemas.microsoft.com/office/powerpoint/2010/main" val="2859493164"/>
+        <p14:creationId xmlns:p14="http://schemas.microsoft.com/office/powerpoint/2010/main" val="1882495817"/>
       </p:ext>
     </p:extLst>
   </p:cSld>
@@ -6307,16 +6308,12 @@
           <a:lstStyle/>
           <a:p>
             <a:r>
-              <a:rPr lang="en-US" dirty="0" err="1"/>
-              <a:t>Estructura</a:t>
+              <a:rPr lang="es-419" dirty="0"/>
+              <a:t>Conceptos clave</a:t>
             </a:r>
             <a:r>
               <a:rPr lang="en-US" dirty="0"/>
-              <a:t> de un </a:t>
-            </a:r>
-            <a:r>
-              <a:rPr lang="en-US" dirty="0" err="1"/>
-              <a:t>Repositorio</a:t>
+              <a:t>: Merge/Conflict</a:t>
             </a:r>
             <a:endParaRPr lang="es-419" dirty="0"/>
           </a:p>
@@ -6353,91 +6350,10 @@
           </a:p>
         </p:txBody>
       </p:sp>
-      <p:sp>
-        <p:nvSpPr>
-          <p:cNvPr id="4" name="TextBox 3">
-            <a:extLst>
-              <a:ext uri="{FF2B5EF4-FFF2-40B4-BE49-F238E27FC236}">
-                <a16:creationId xmlns:a16="http://schemas.microsoft.com/office/drawing/2014/main" id="{2DCECD34-2AA5-41A0-80E6-B33058206DCA}"/>
-              </a:ext>
-            </a:extLst>
-          </p:cNvPr>
-          <p:cNvSpPr txBox="1"/>
-          <p:nvPr/>
-        </p:nvSpPr>
-        <p:spPr>
-          <a:xfrm>
-            <a:off x="952901" y="2531444"/>
-            <a:ext cx="2470163" cy="1754326"/>
-          </a:xfrm>
-          <a:prstGeom prst="rect">
-            <a:avLst/>
-          </a:prstGeom>
-          <a:noFill/>
-        </p:spPr>
-        <p:txBody>
-          <a:bodyPr wrap="none" rtlCol="0">
-            <a:spAutoFit/>
-          </a:bodyPr>
-          <a:lstStyle/>
-          <a:p>
-            <a:pPr marL="285750" indent="-285750">
-              <a:buFontTx/>
-              <a:buChar char="-"/>
-            </a:pPr>
-            <a:r>
-              <a:rPr lang="en-US" dirty="0"/>
-              <a:t>Branches por </a:t>
-            </a:r>
-            <a:r>
-              <a:rPr lang="en-US" dirty="0" err="1"/>
-              <a:t>defecto</a:t>
-            </a:r>
-            <a:endParaRPr lang="en-US" dirty="0"/>
-          </a:p>
-          <a:p>
-            <a:pPr marL="285750" indent="-285750">
-              <a:buFontTx/>
-              <a:buChar char="-"/>
-            </a:pPr>
-            <a:r>
-              <a:rPr lang="en-US" dirty="0" err="1"/>
-              <a:t>Gitignore</a:t>
-            </a:r>
-            <a:endParaRPr lang="en-US" dirty="0"/>
-          </a:p>
-          <a:p>
-            <a:pPr marL="285750" indent="-285750">
-              <a:buFontTx/>
-              <a:buChar char="-"/>
-            </a:pPr>
-            <a:r>
-              <a:rPr lang="en-US" dirty="0"/>
-              <a:t>License</a:t>
-            </a:r>
-          </a:p>
-          <a:p>
-            <a:pPr marL="285750" indent="-285750">
-              <a:buFontTx/>
-              <a:buChar char="-"/>
-            </a:pPr>
-            <a:r>
-              <a:rPr lang="en-US" dirty="0"/>
-              <a:t>Readme</a:t>
-            </a:r>
-          </a:p>
-          <a:p>
-            <a:endParaRPr lang="en-US" dirty="0"/>
-          </a:p>
-          <a:p>
-            <a:endParaRPr lang="es-419" dirty="0"/>
-          </a:p>
-        </p:txBody>
-      </p:sp>
     </p:spTree>
     <p:extLst>
       <p:ext uri="{BB962C8B-B14F-4D97-AF65-F5344CB8AC3E}">
-        <p14:creationId xmlns:p14="http://schemas.microsoft.com/office/powerpoint/2010/main" val="4210234373"/>
+        <p14:creationId xmlns:p14="http://schemas.microsoft.com/office/powerpoint/2010/main" val="2859493164"/>
       </p:ext>
     </p:extLst>
   </p:cSld>
@@ -6486,12 +6402,16 @@
           <a:lstStyle/>
           <a:p>
             <a:r>
+              <a:rPr lang="en-US" dirty="0" err="1"/>
+              <a:t>Estructura</a:t>
+            </a:r>
+            <a:r>
               <a:rPr lang="en-US" dirty="0"/>
-              <a:t>Git/Github/</a:t>
+              <a:t> de un </a:t>
             </a:r>
             <a:r>
               <a:rPr lang="en-US" dirty="0" err="1"/>
-              <a:t>GitKraken</a:t>
+              <a:t>Repositorio</a:t>
             </a:r>
             <a:endParaRPr lang="es-419" dirty="0"/>
           </a:p>
@@ -6528,10 +6448,91 @@
           </a:p>
         </p:txBody>
       </p:sp>
+      <p:sp>
+        <p:nvSpPr>
+          <p:cNvPr id="4" name="TextBox 3">
+            <a:extLst>
+              <a:ext uri="{FF2B5EF4-FFF2-40B4-BE49-F238E27FC236}">
+                <a16:creationId xmlns:a16="http://schemas.microsoft.com/office/drawing/2014/main" id="{2DCECD34-2AA5-41A0-80E6-B33058206DCA}"/>
+              </a:ext>
+            </a:extLst>
+          </p:cNvPr>
+          <p:cNvSpPr txBox="1"/>
+          <p:nvPr/>
+        </p:nvSpPr>
+        <p:spPr>
+          <a:xfrm>
+            <a:off x="952901" y="2531444"/>
+            <a:ext cx="2470163" cy="1754326"/>
+          </a:xfrm>
+          <a:prstGeom prst="rect">
+            <a:avLst/>
+          </a:prstGeom>
+          <a:noFill/>
+        </p:spPr>
+        <p:txBody>
+          <a:bodyPr wrap="none" rtlCol="0">
+            <a:spAutoFit/>
+          </a:bodyPr>
+          <a:lstStyle/>
+          <a:p>
+            <a:pPr marL="285750" indent="-285750">
+              <a:buFontTx/>
+              <a:buChar char="-"/>
+            </a:pPr>
+            <a:r>
+              <a:rPr lang="en-US" dirty="0"/>
+              <a:t>Branches por </a:t>
+            </a:r>
+            <a:r>
+              <a:rPr lang="en-US" dirty="0" err="1"/>
+              <a:t>defecto</a:t>
+            </a:r>
+            <a:endParaRPr lang="en-US" dirty="0"/>
+          </a:p>
+          <a:p>
+            <a:pPr marL="285750" indent="-285750">
+              <a:buFontTx/>
+              <a:buChar char="-"/>
+            </a:pPr>
+            <a:r>
+              <a:rPr lang="en-US" dirty="0" err="1"/>
+              <a:t>Gitignore</a:t>
+            </a:r>
+            <a:endParaRPr lang="en-US" dirty="0"/>
+          </a:p>
+          <a:p>
+            <a:pPr marL="285750" indent="-285750">
+              <a:buFontTx/>
+              <a:buChar char="-"/>
+            </a:pPr>
+            <a:r>
+              <a:rPr lang="en-US" dirty="0"/>
+              <a:t>License</a:t>
+            </a:r>
+          </a:p>
+          <a:p>
+            <a:pPr marL="285750" indent="-285750">
+              <a:buFontTx/>
+              <a:buChar char="-"/>
+            </a:pPr>
+            <a:r>
+              <a:rPr lang="en-US" dirty="0"/>
+              <a:t>Readme</a:t>
+            </a:r>
+          </a:p>
+          <a:p>
+            <a:endParaRPr lang="en-US" dirty="0"/>
+          </a:p>
+          <a:p>
+            <a:endParaRPr lang="es-419" dirty="0"/>
+          </a:p>
+        </p:txBody>
+      </p:sp>
     </p:spTree>
     <p:extLst>
       <p:ext uri="{BB962C8B-B14F-4D97-AF65-F5344CB8AC3E}">
-        <p14:creationId xmlns:p14="http://schemas.microsoft.com/office/powerpoint/2010/main" val="4223982895"/>
+        <p14:creationId xmlns:p14="http://schemas.microsoft.com/office/powerpoint/2010/main" val="4210234373"/>
       </p:ext>
     </p:extLst>
   </p:cSld>
@@ -6580,12 +6581,12 @@
           <a:lstStyle/>
           <a:p>
             <a:r>
+              <a:rPr lang="en-US" dirty="0"/>
+              <a:t>Git/Github/</a:t>
+            </a:r>
+            <a:r>
               <a:rPr lang="en-US" dirty="0" err="1"/>
-              <a:t>Esquema</a:t>
-            </a:r>
-            <a:r>
-              <a:rPr lang="en-US" dirty="0"/>
-              <a:t> de Branches</a:t>
+              <a:t>GitKraken</a:t>
             </a:r>
             <a:endParaRPr lang="es-419" dirty="0"/>
           </a:p>
@@ -6625,7 +6626,7 @@
     </p:spTree>
     <p:extLst>
       <p:ext uri="{BB962C8B-B14F-4D97-AF65-F5344CB8AC3E}">
-        <p14:creationId xmlns:p14="http://schemas.microsoft.com/office/powerpoint/2010/main" val="1981387030"/>
+        <p14:creationId xmlns:p14="http://schemas.microsoft.com/office/powerpoint/2010/main" val="4223982895"/>
       </p:ext>
     </p:extLst>
   </p:cSld>
@@ -6675,15 +6676,11 @@
           <a:p>
             <a:r>
               <a:rPr lang="en-US" dirty="0" err="1"/>
-              <a:t>Comunicaci</a:t>
-            </a:r>
-            <a:r>
-              <a:rPr lang="es-419" dirty="0" err="1"/>
-              <a:t>ó</a:t>
+              <a:t>Esquema</a:t>
             </a:r>
             <a:r>
               <a:rPr lang="en-US" dirty="0"/>
-              <a:t>n</a:t>
+              <a:t> de Branches</a:t>
             </a:r>
             <a:endParaRPr lang="es-419" dirty="0"/>
           </a:p>
@@ -6723,7 +6720,7 @@
     </p:spTree>
     <p:extLst>
       <p:ext uri="{BB962C8B-B14F-4D97-AF65-F5344CB8AC3E}">
-        <p14:creationId xmlns:p14="http://schemas.microsoft.com/office/powerpoint/2010/main" val="3740971148"/>
+        <p14:creationId xmlns:p14="http://schemas.microsoft.com/office/powerpoint/2010/main" val="1981387030"/>
       </p:ext>
     </p:extLst>
   </p:cSld>
@@ -6772,8 +6769,16 @@
           <a:lstStyle/>
           <a:p>
             <a:r>
+              <a:rPr lang="en-US" dirty="0" err="1"/>
+              <a:t>Comunicaci</a:t>
+            </a:r>
+            <a:r>
+              <a:rPr lang="es-419" dirty="0" err="1"/>
+              <a:t>ó</a:t>
+            </a:r>
+            <a:r>
               <a:rPr lang="en-US" dirty="0"/>
-              <a:t>Trello/Boards</a:t>
+              <a:t>n</a:t>
             </a:r>
             <a:endParaRPr lang="es-419" dirty="0"/>
           </a:p>
@@ -6813,7 +6818,7 @@
     </p:spTree>
     <p:extLst>
       <p:ext uri="{BB962C8B-B14F-4D97-AF65-F5344CB8AC3E}">
-        <p14:creationId xmlns:p14="http://schemas.microsoft.com/office/powerpoint/2010/main" val="3387504599"/>
+        <p14:creationId xmlns:p14="http://schemas.microsoft.com/office/powerpoint/2010/main" val="3740971148"/>
       </p:ext>
     </p:extLst>
   </p:cSld>
@@ -6863,11 +6868,7 @@
           <a:p>
             <a:r>
               <a:rPr lang="en-US" dirty="0"/>
-              <a:t>Conflicts: </a:t>
-            </a:r>
-            <a:r>
-              <a:rPr lang="en-US" dirty="0" err="1"/>
-              <a:t>Prevenir</a:t>
+              <a:t>Trello/Boards</a:t>
             </a:r>
             <a:endParaRPr lang="es-419" dirty="0"/>
           </a:p>
@@ -6904,70 +6905,10 @@
           </a:p>
         </p:txBody>
       </p:sp>
-      <p:sp>
-        <p:nvSpPr>
-          <p:cNvPr id="4" name="TextBox 3">
-            <a:extLst>
-              <a:ext uri="{FF2B5EF4-FFF2-40B4-BE49-F238E27FC236}">
-                <a16:creationId xmlns:a16="http://schemas.microsoft.com/office/drawing/2014/main" id="{D38FAB16-376C-468C-A3E6-F4486C832DE7}"/>
-              </a:ext>
-            </a:extLst>
-          </p:cNvPr>
-          <p:cNvSpPr txBox="1"/>
-          <p:nvPr/>
-        </p:nvSpPr>
-        <p:spPr>
-          <a:xfrm>
-            <a:off x="838200" y="3301465"/>
-            <a:ext cx="2910284" cy="1200329"/>
-          </a:xfrm>
-          <a:prstGeom prst="rect">
-            <a:avLst/>
-          </a:prstGeom>
-          <a:noFill/>
-        </p:spPr>
-        <p:txBody>
-          <a:bodyPr wrap="none" rtlCol="0">
-            <a:spAutoFit/>
-          </a:bodyPr>
-          <a:lstStyle/>
-          <a:p>
-            <a:r>
-              <a:rPr lang="en-US" dirty="0" err="1"/>
-              <a:t>Separacion</a:t>
-            </a:r>
-            <a:r>
-              <a:rPr lang="en-US" dirty="0"/>
-              <a:t> de </a:t>
-            </a:r>
-            <a:r>
-              <a:rPr lang="en-US" dirty="0" err="1"/>
-              <a:t>código</a:t>
-            </a:r>
-            <a:endParaRPr lang="es-419" dirty="0"/>
-          </a:p>
-          <a:p>
-            <a:r>
-              <a:rPr lang="es-419" dirty="0"/>
-              <a:t>Actualizar mi Branch primero</a:t>
-            </a:r>
-          </a:p>
-          <a:p>
-            <a:r>
-              <a:rPr lang="en-US" dirty="0" err="1"/>
-              <a:t>Comunicacion</a:t>
-            </a:r>
-            <a:endParaRPr lang="en-US" dirty="0"/>
-          </a:p>
-          <a:p>
-            <a:endParaRPr lang="en-US" dirty="0"/>
-          </a:p>
-        </p:txBody>
-      </p:sp>
     </p:spTree>
     <p:extLst>
       <p:ext uri="{BB962C8B-B14F-4D97-AF65-F5344CB8AC3E}">
-        <p14:creationId xmlns:p14="http://schemas.microsoft.com/office/powerpoint/2010/main" val="718397276"/>
+        <p14:creationId xmlns:p14="http://schemas.microsoft.com/office/powerpoint/2010/main" val="3387504599"/>
       </p:ext>
     </p:extLst>
   </p:cSld>
@@ -7016,6 +6957,160 @@
           <a:lstStyle/>
           <a:p>
             <a:r>
+              <a:rPr lang="en-US" dirty="0"/>
+              <a:t>Conflicts: </a:t>
+            </a:r>
+            <a:r>
+              <a:rPr lang="en-US" dirty="0" err="1"/>
+              <a:t>Prevenir</a:t>
+            </a:r>
+            <a:endParaRPr lang="es-419" dirty="0"/>
+          </a:p>
+        </p:txBody>
+      </p:sp>
+      <p:sp>
+        <p:nvSpPr>
+          <p:cNvPr id="3" name="Content Placeholder 2">
+            <a:extLst>
+              <a:ext uri="{FF2B5EF4-FFF2-40B4-BE49-F238E27FC236}">
+                <a16:creationId xmlns:a16="http://schemas.microsoft.com/office/drawing/2014/main" id="{4C8A22F4-750C-4E9A-B539-BC08DBA1AC78}"/>
+              </a:ext>
+            </a:extLst>
+          </p:cNvPr>
+          <p:cNvSpPr>
+            <a:spLocks noGrp="1"/>
+          </p:cNvSpPr>
+          <p:nvPr>
+            <p:ph idx="1"/>
+          </p:nvPr>
+        </p:nvSpPr>
+        <p:spPr/>
+        <p:txBody>
+          <a:bodyPr/>
+          <a:lstStyle/>
+          <a:p>
+            <a:pPr marL="0" indent="0">
+              <a:buNone/>
+            </a:pPr>
+            <a:r>
+              <a:rPr lang="es-419" dirty="0"/>
+              <a:t> </a:t>
+            </a:r>
+          </a:p>
+        </p:txBody>
+      </p:sp>
+      <p:sp>
+        <p:nvSpPr>
+          <p:cNvPr id="4" name="TextBox 3">
+            <a:extLst>
+              <a:ext uri="{FF2B5EF4-FFF2-40B4-BE49-F238E27FC236}">
+                <a16:creationId xmlns:a16="http://schemas.microsoft.com/office/drawing/2014/main" id="{D38FAB16-376C-468C-A3E6-F4486C832DE7}"/>
+              </a:ext>
+            </a:extLst>
+          </p:cNvPr>
+          <p:cNvSpPr txBox="1"/>
+          <p:nvPr/>
+        </p:nvSpPr>
+        <p:spPr>
+          <a:xfrm>
+            <a:off x="838200" y="3301465"/>
+            <a:ext cx="2910284" cy="1200329"/>
+          </a:xfrm>
+          <a:prstGeom prst="rect">
+            <a:avLst/>
+          </a:prstGeom>
+          <a:noFill/>
+        </p:spPr>
+        <p:txBody>
+          <a:bodyPr wrap="none" rtlCol="0">
+            <a:spAutoFit/>
+          </a:bodyPr>
+          <a:lstStyle/>
+          <a:p>
+            <a:r>
+              <a:rPr lang="en-US" dirty="0" err="1"/>
+              <a:t>Separacion</a:t>
+            </a:r>
+            <a:r>
+              <a:rPr lang="en-US" dirty="0"/>
+              <a:t> de </a:t>
+            </a:r>
+            <a:r>
+              <a:rPr lang="en-US" dirty="0" err="1"/>
+              <a:t>código</a:t>
+            </a:r>
+            <a:endParaRPr lang="es-419" dirty="0"/>
+          </a:p>
+          <a:p>
+            <a:r>
+              <a:rPr lang="es-419" dirty="0"/>
+              <a:t>Actualizar mi Branch primero</a:t>
+            </a:r>
+          </a:p>
+          <a:p>
+            <a:r>
+              <a:rPr lang="en-US" dirty="0" err="1"/>
+              <a:t>Comunicacion</a:t>
+            </a:r>
+            <a:endParaRPr lang="en-US" dirty="0"/>
+          </a:p>
+          <a:p>
+            <a:endParaRPr lang="en-US" dirty="0"/>
+          </a:p>
+        </p:txBody>
+      </p:sp>
+    </p:spTree>
+    <p:extLst>
+      <p:ext uri="{BB962C8B-B14F-4D97-AF65-F5344CB8AC3E}">
+        <p14:creationId xmlns:p14="http://schemas.microsoft.com/office/powerpoint/2010/main" val="718397276"/>
+      </p:ext>
+    </p:extLst>
+  </p:cSld>
+  <p:clrMapOvr>
+    <a:masterClrMapping/>
+  </p:clrMapOvr>
+</p:sld>
+</file>
+
+<file path=ppt/slides/slide18.xml><?xml version="1.0" encoding="utf-8"?>
+<p:sld xmlns:a="http://schemas.openxmlformats.org/drawingml/2006/main" xmlns:r="http://schemas.openxmlformats.org/officeDocument/2006/relationships" xmlns:p="http://schemas.openxmlformats.org/presentationml/2006/main">
+  <p:cSld>
+    <p:spTree>
+      <p:nvGrpSpPr>
+        <p:cNvPr id="1" name=""/>
+        <p:cNvGrpSpPr/>
+        <p:nvPr/>
+      </p:nvGrpSpPr>
+      <p:grpSpPr>
+        <a:xfrm>
+          <a:off x="0" y="0"/>
+          <a:ext cx="0" cy="0"/>
+          <a:chOff x="0" y="0"/>
+          <a:chExt cx="0" cy="0"/>
+        </a:xfrm>
+      </p:grpSpPr>
+      <p:sp>
+        <p:nvSpPr>
+          <p:cNvPr id="2" name="Title 1">
+            <a:extLst>
+              <a:ext uri="{FF2B5EF4-FFF2-40B4-BE49-F238E27FC236}">
+                <a16:creationId xmlns:a16="http://schemas.microsoft.com/office/drawing/2014/main" id="{E94C24EB-7ECC-4ECF-9E67-D3422B6EC4F8}"/>
+              </a:ext>
+            </a:extLst>
+          </p:cNvPr>
+          <p:cNvSpPr>
+            <a:spLocks noGrp="1"/>
+          </p:cNvSpPr>
+          <p:nvPr>
+            <p:ph type="title"/>
+          </p:nvPr>
+        </p:nvSpPr>
+        <p:spPr/>
+        <p:txBody>
+          <a:bodyPr/>
+          <a:lstStyle/>
+          <a:p>
+            <a:r>
               <a:rPr lang="en-US" dirty="0" err="1"/>
               <a:t>Separar</a:t>
             </a:r>
@@ -7118,7 +7213,7 @@
 </p:sld>
 </file>
 
-<file path=ppt/slides/slide18.xml><?xml version="1.0" encoding="utf-8"?>
+<file path=ppt/slides/slide19.xml><?xml version="1.0" encoding="utf-8"?>
 <p:sld xmlns:a="http://schemas.openxmlformats.org/drawingml/2006/main" xmlns:r="http://schemas.openxmlformats.org/officeDocument/2006/relationships" xmlns:p="http://schemas.openxmlformats.org/presentationml/2006/main">
   <p:cSld>
     <p:spTree>
@@ -8001,13 +8096,29 @@
             </a:r>
             <a:r>
               <a:rPr lang="en-US" dirty="0"/>
-              <a:t>: Control de </a:t>
-            </a:r>
-            <a:r>
-              <a:rPr lang="en-US" dirty="0" err="1"/>
+              <a:t>: </a:t>
+            </a:r>
+            <a:r>
+              <a:rPr lang="en-US" dirty="0">
+                <a:solidFill>
+                  <a:srgbClr val="FFC000"/>
+                </a:solidFill>
+              </a:rPr>
+              <a:t>Control de </a:t>
+            </a:r>
+            <a:r>
+              <a:rPr lang="en-US" dirty="0" err="1">
+                <a:solidFill>
+                  <a:srgbClr val="FFC000"/>
+                </a:solidFill>
+              </a:rPr>
               <a:t>Versiones</a:t>
             </a:r>
-            <a:endParaRPr lang="es-419" dirty="0"/>
+            <a:endParaRPr lang="es-419" dirty="0">
+              <a:solidFill>
+                <a:srgbClr val="FFC000"/>
+              </a:solidFill>
+            </a:endParaRPr>
           </a:p>
         </p:txBody>
       </p:sp>
@@ -8354,9 +8465,21 @@
             </a:r>
             <a:r>
               <a:rPr lang="en-US" dirty="0"/>
-              <a:t>: Commit</a:t>
-            </a:r>
-            <a:endParaRPr lang="es-419" dirty="0"/>
+              <a:t>: </a:t>
+            </a:r>
+            <a:r>
+              <a:rPr lang="en-US" dirty="0">
+                <a:solidFill>
+                  <a:srgbClr val="FFC000"/>
+                </a:solidFill>
+              </a:rPr>
+              <a:t>Commit</a:t>
+            </a:r>
+            <a:endParaRPr lang="es-419" dirty="0">
+              <a:solidFill>
+                <a:srgbClr val="FFC000"/>
+              </a:solidFill>
+            </a:endParaRPr>
           </a:p>
         </p:txBody>
       </p:sp>
@@ -8391,6 +8514,128 @@
           </a:p>
         </p:txBody>
       </p:sp>
+      <p:sp>
+        <p:nvSpPr>
+          <p:cNvPr id="4" name="TextBox 3">
+            <a:extLst>
+              <a:ext uri="{FF2B5EF4-FFF2-40B4-BE49-F238E27FC236}">
+                <a16:creationId xmlns:a16="http://schemas.microsoft.com/office/drawing/2014/main" id="{978B135C-E710-4AAA-9156-2F7A1B4F8011}"/>
+              </a:ext>
+            </a:extLst>
+          </p:cNvPr>
+          <p:cNvSpPr txBox="1"/>
+          <p:nvPr/>
+        </p:nvSpPr>
+        <p:spPr>
+          <a:xfrm>
+            <a:off x="1636295" y="2435192"/>
+            <a:ext cx="9392315" cy="369332"/>
+          </a:xfrm>
+          <a:prstGeom prst="rect">
+            <a:avLst/>
+          </a:prstGeom>
+          <a:noFill/>
+        </p:spPr>
+        <p:txBody>
+          <a:bodyPr wrap="none" rtlCol="0">
+            <a:spAutoFit/>
+          </a:bodyPr>
+          <a:lstStyle/>
+          <a:p>
+            <a:r>
+              <a:rPr lang="en-US" dirty="0"/>
+              <a:t>Es un </a:t>
+            </a:r>
+            <a:r>
+              <a:rPr lang="en-US" dirty="0">
+                <a:solidFill>
+                  <a:srgbClr val="FFC000"/>
+                </a:solidFill>
+              </a:rPr>
+              <a:t>snapshot</a:t>
+            </a:r>
+            <a:r>
+              <a:rPr lang="en-US" dirty="0"/>
+              <a:t> (</a:t>
+            </a:r>
+            <a:r>
+              <a:rPr lang="en-US" dirty="0" err="1"/>
+              <a:t>momento</a:t>
+            </a:r>
+            <a:r>
+              <a:rPr lang="en-US" dirty="0"/>
+              <a:t>) del software, es lo que </a:t>
+            </a:r>
+            <a:r>
+              <a:rPr lang="en-US" dirty="0" err="1"/>
+              <a:t>consideramos</a:t>
+            </a:r>
+            <a:r>
+              <a:rPr lang="en-US" dirty="0"/>
+              <a:t> una </a:t>
+            </a:r>
+            <a:r>
+              <a:rPr lang="en-US" dirty="0" err="1">
+                <a:solidFill>
+                  <a:srgbClr val="FFC000"/>
+                </a:solidFill>
+              </a:rPr>
+              <a:t>versi</a:t>
+            </a:r>
+            <a:r>
+              <a:rPr lang="es-419" dirty="0" err="1">
+                <a:solidFill>
+                  <a:srgbClr val="FFC000"/>
+                </a:solidFill>
+              </a:rPr>
+              <a:t>ó</a:t>
+            </a:r>
+            <a:r>
+              <a:rPr lang="en-US" dirty="0">
+                <a:solidFill>
+                  <a:srgbClr val="FFC000"/>
+                </a:solidFill>
+              </a:rPr>
+              <a:t>n</a:t>
+            </a:r>
+            <a:r>
+              <a:rPr lang="en-US" dirty="0"/>
+              <a:t> del software</a:t>
+            </a:r>
+            <a:endParaRPr lang="es-419" dirty="0"/>
+          </a:p>
+        </p:txBody>
+      </p:sp>
+      <p:pic>
+        <p:nvPicPr>
+          <p:cNvPr id="5" name="Picture 4">
+            <a:extLst>
+              <a:ext uri="{FF2B5EF4-FFF2-40B4-BE49-F238E27FC236}">
+                <a16:creationId xmlns:a16="http://schemas.microsoft.com/office/drawing/2014/main" id="{9C9E66C7-3640-4CEC-8E15-DE21A9B1F290}"/>
+              </a:ext>
+            </a:extLst>
+          </p:cNvPr>
+          <p:cNvPicPr>
+            <a:picLocks noChangeAspect="1"/>
+          </p:cNvPicPr>
+          <p:nvPr/>
+        </p:nvPicPr>
+        <p:blipFill>
+          <a:blip r:embed="rId2"/>
+          <a:stretch>
+            <a:fillRect/>
+          </a:stretch>
+        </p:blipFill>
+        <p:spPr>
+          <a:xfrm>
+            <a:off x="2937461" y="3597848"/>
+            <a:ext cx="6306430" cy="2457793"/>
+          </a:xfrm>
+          <a:prstGeom prst="rect">
+            <a:avLst/>
+          </a:prstGeom>
+        </p:spPr>
+      </p:pic>
     </p:spTree>
     <p:extLst>
       <p:ext uri="{BB962C8B-B14F-4D97-AF65-F5344CB8AC3E}">
@@ -8448,40 +8693,324 @@
             </a:r>
             <a:r>
               <a:rPr lang="en-US" dirty="0"/>
-              <a:t>: Push/Pull</a:t>
-            </a:r>
-            <a:endParaRPr lang="es-419" dirty="0"/>
-          </a:p>
-        </p:txBody>
-      </p:sp>
-      <p:sp>
-        <p:nvSpPr>
-          <p:cNvPr id="3" name="Content Placeholder 2">
+              <a:t>: </a:t>
+            </a:r>
+            <a:r>
+              <a:rPr lang="en-US" dirty="0">
+                <a:solidFill>
+                  <a:srgbClr val="FFC000"/>
+                </a:solidFill>
+              </a:rPr>
+              <a:t>Push/Pull</a:t>
+            </a:r>
+            <a:endParaRPr lang="es-419" dirty="0">
+              <a:solidFill>
+                <a:srgbClr val="FFC000"/>
+              </a:solidFill>
+            </a:endParaRPr>
+          </a:p>
+        </p:txBody>
+      </p:sp>
+      <p:sp>
+        <p:nvSpPr>
+          <p:cNvPr id="4" name="TextBox 3">
             <a:extLst>
               <a:ext uri="{FF2B5EF4-FFF2-40B4-BE49-F238E27FC236}">
-                <a16:creationId xmlns:a16="http://schemas.microsoft.com/office/drawing/2014/main" id="{4C8A22F4-750C-4E9A-B539-BC08DBA1AC78}"/>
+                <a16:creationId xmlns:a16="http://schemas.microsoft.com/office/drawing/2014/main" id="{0D78F0FD-2D23-4CE4-A7A3-B818E4041AA7}"/>
               </a:ext>
             </a:extLst>
           </p:cNvPr>
-          <p:cNvSpPr>
-            <a:spLocks noGrp="1"/>
-          </p:cNvSpPr>
-          <p:nvPr>
-            <p:ph idx="1"/>
-          </p:nvPr>
-        </p:nvSpPr>
-        <p:spPr/>
-        <p:txBody>
-          <a:bodyPr/>
-          <a:lstStyle/>
-          <a:p>
-            <a:pPr marL="0" indent="0">
-              <a:buNone/>
-            </a:pPr>
-            <a:r>
-              <a:rPr lang="es-419" dirty="0"/>
+          <p:cNvSpPr txBox="1"/>
+          <p:nvPr/>
+        </p:nvSpPr>
+        <p:spPr>
+          <a:xfrm>
+            <a:off x="2079057" y="2223436"/>
+            <a:ext cx="7303602" cy="1107996"/>
+          </a:xfrm>
+          <a:prstGeom prst="rect">
+            <a:avLst/>
+          </a:prstGeom>
+          <a:noFill/>
+        </p:spPr>
+        <p:txBody>
+          <a:bodyPr wrap="none" rtlCol="0">
+            <a:spAutoFit/>
+          </a:bodyPr>
+          <a:lstStyle/>
+          <a:p>
+            <a:r>
+              <a:rPr lang="en-US" sz="2400" dirty="0">
+                <a:solidFill>
+                  <a:srgbClr val="FFC000"/>
+                </a:solidFill>
+              </a:rPr>
+              <a:t>Pull</a:t>
+            </a:r>
+            <a:r>
+              <a:rPr lang="en-US" dirty="0"/>
+              <a:t>: es la </a:t>
+            </a:r>
+            <a:r>
+              <a:rPr lang="en-US" dirty="0" err="1"/>
+              <a:t>accion</a:t>
+            </a:r>
+            <a:r>
+              <a:rPr lang="en-US" dirty="0"/>
+              <a:t> de </a:t>
+            </a:r>
+            <a:r>
+              <a:rPr lang="en-US" dirty="0" err="1">
+                <a:solidFill>
+                  <a:srgbClr val="FFC000"/>
+                </a:solidFill>
+              </a:rPr>
+              <a:t>traer</a:t>
+            </a:r>
+            <a:r>
+              <a:rPr lang="en-US" dirty="0"/>
               <a:t> </a:t>
             </a:r>
+            <a:r>
+              <a:rPr lang="en-US" dirty="0" err="1"/>
+              <a:t>versiones</a:t>
+            </a:r>
+            <a:r>
+              <a:rPr lang="en-US" dirty="0"/>
+              <a:t> </a:t>
+            </a:r>
+            <a:r>
+              <a:rPr lang="en-US" dirty="0" err="1"/>
+              <a:t>desde</a:t>
+            </a:r>
+            <a:r>
+              <a:rPr lang="en-US" dirty="0"/>
+              <a:t> el </a:t>
+            </a:r>
+            <a:r>
+              <a:rPr lang="en-US" dirty="0">
+                <a:solidFill>
+                  <a:srgbClr val="FFC000"/>
+                </a:solidFill>
+              </a:rPr>
+              <a:t>Remote </a:t>
+            </a:r>
+            <a:r>
+              <a:rPr lang="en-US" dirty="0" err="1"/>
+              <a:t>hacia</a:t>
+            </a:r>
+            <a:r>
+              <a:rPr lang="en-US" dirty="0"/>
+              <a:t> mi </a:t>
+            </a:r>
+            <a:r>
+              <a:rPr lang="en-US" dirty="0">
+                <a:solidFill>
+                  <a:srgbClr val="FFC000"/>
+                </a:solidFill>
+              </a:rPr>
+              <a:t>Local</a:t>
+            </a:r>
+          </a:p>
+          <a:p>
+            <a:endParaRPr lang="en-US" dirty="0">
+              <a:solidFill>
+                <a:srgbClr val="FFC000"/>
+              </a:solidFill>
+            </a:endParaRPr>
+          </a:p>
+          <a:p>
+            <a:r>
+              <a:rPr lang="en-US" sz="2400" dirty="0">
+                <a:solidFill>
+                  <a:srgbClr val="FFC000"/>
+                </a:solidFill>
+              </a:rPr>
+              <a:t>Push</a:t>
+            </a:r>
+            <a:r>
+              <a:rPr lang="en-US" dirty="0"/>
+              <a:t>: la </a:t>
+            </a:r>
+            <a:r>
+              <a:rPr lang="en-US" dirty="0" err="1"/>
+              <a:t>accion</a:t>
+            </a:r>
+            <a:r>
+              <a:rPr lang="en-US" dirty="0"/>
+              <a:t> de </a:t>
+            </a:r>
+            <a:r>
+              <a:rPr lang="en-US" dirty="0" err="1">
+                <a:solidFill>
+                  <a:srgbClr val="FFC000"/>
+                </a:solidFill>
+              </a:rPr>
+              <a:t>enviar</a:t>
+            </a:r>
+            <a:r>
+              <a:rPr lang="en-US" dirty="0"/>
+              <a:t> </a:t>
+            </a:r>
+            <a:r>
+              <a:rPr lang="en-US" dirty="0" err="1"/>
+              <a:t>versiones</a:t>
+            </a:r>
+            <a:r>
+              <a:rPr lang="en-US" dirty="0"/>
+              <a:t> </a:t>
+            </a:r>
+            <a:r>
+              <a:rPr lang="en-US" dirty="0" err="1"/>
+              <a:t>desde</a:t>
+            </a:r>
+            <a:r>
+              <a:rPr lang="en-US" dirty="0"/>
+              <a:t> el </a:t>
+            </a:r>
+            <a:r>
+              <a:rPr lang="en-US" dirty="0">
+                <a:solidFill>
+                  <a:srgbClr val="FFC000"/>
+                </a:solidFill>
+              </a:rPr>
+              <a:t>Local</a:t>
+            </a:r>
+            <a:r>
+              <a:rPr lang="en-US" dirty="0"/>
+              <a:t> </a:t>
+            </a:r>
+            <a:r>
+              <a:rPr lang="en-US" dirty="0" err="1"/>
+              <a:t>hacia</a:t>
+            </a:r>
+            <a:r>
+              <a:rPr lang="en-US" dirty="0"/>
+              <a:t> el </a:t>
+            </a:r>
+            <a:r>
+              <a:rPr lang="en-US" dirty="0">
+                <a:solidFill>
+                  <a:srgbClr val="FFC000"/>
+                </a:solidFill>
+              </a:rPr>
+              <a:t>Remote</a:t>
+            </a:r>
+            <a:endParaRPr lang="es-419" dirty="0">
+              <a:solidFill>
+                <a:srgbClr val="FFC000"/>
+              </a:solidFill>
+            </a:endParaRPr>
+          </a:p>
+        </p:txBody>
+      </p:sp>
+      <p:pic>
+        <p:nvPicPr>
+          <p:cNvPr id="7" name="Picture 6">
+            <a:extLst>
+              <a:ext uri="{FF2B5EF4-FFF2-40B4-BE49-F238E27FC236}">
+                <a16:creationId xmlns:a16="http://schemas.microsoft.com/office/drawing/2014/main" id="{18EF4626-456F-48AD-94FE-B836D840CC63}"/>
+              </a:ext>
+            </a:extLst>
+          </p:cNvPr>
+          <p:cNvPicPr>
+            <a:picLocks noChangeAspect="1"/>
+          </p:cNvPicPr>
+          <p:nvPr/>
+        </p:nvPicPr>
+        <p:blipFill>
+          <a:blip r:embed="rId2"/>
+          <a:stretch>
+            <a:fillRect/>
+          </a:stretch>
+        </p:blipFill>
+        <p:spPr>
+          <a:xfrm>
+            <a:off x="4263803" y="4851630"/>
+            <a:ext cx="2934109" cy="1486107"/>
+          </a:xfrm>
+          <a:prstGeom prst="rect">
+            <a:avLst/>
+          </a:prstGeom>
+        </p:spPr>
+      </p:pic>
+      <p:sp>
+        <p:nvSpPr>
+          <p:cNvPr id="8" name="TextBox 7">
+            <a:extLst>
+              <a:ext uri="{FF2B5EF4-FFF2-40B4-BE49-F238E27FC236}">
+                <a16:creationId xmlns:a16="http://schemas.microsoft.com/office/drawing/2014/main" id="{0E1A5F0D-6120-4640-A1A7-B4F0FF8E5E8F}"/>
+              </a:ext>
+            </a:extLst>
+          </p:cNvPr>
+          <p:cNvSpPr txBox="1"/>
+          <p:nvPr/>
+        </p:nvSpPr>
+        <p:spPr>
+          <a:xfrm>
+            <a:off x="3541796" y="4058292"/>
+            <a:ext cx="4378122" cy="369332"/>
+          </a:xfrm>
+          <a:prstGeom prst="rect">
+            <a:avLst/>
+          </a:prstGeom>
+          <a:noFill/>
+        </p:spPr>
+        <p:txBody>
+          <a:bodyPr wrap="none" rtlCol="0">
+            <a:spAutoFit/>
+          </a:bodyPr>
+          <a:lstStyle/>
+          <a:p>
+            <a:r>
+              <a:rPr lang="en-US" dirty="0" err="1"/>
+              <a:t>Siempre</a:t>
+            </a:r>
+            <a:r>
+              <a:rPr lang="en-US" dirty="0"/>
+              <a:t> </a:t>
+            </a:r>
+            <a:r>
+              <a:rPr lang="en-US" dirty="0" err="1"/>
+              <a:t>haz</a:t>
+            </a:r>
+            <a:r>
+              <a:rPr lang="en-US" dirty="0"/>
+              <a:t> </a:t>
+            </a:r>
+            <a:r>
+              <a:rPr lang="en-US" dirty="0">
+                <a:solidFill>
+                  <a:srgbClr val="FFC000"/>
+                </a:solidFill>
+              </a:rPr>
+              <a:t>pull</a:t>
+            </a:r>
+            <a:r>
+              <a:rPr lang="en-US" dirty="0"/>
+              <a:t> antes de </a:t>
+            </a:r>
+            <a:r>
+              <a:rPr lang="en-US" dirty="0" err="1"/>
+              <a:t>hacer</a:t>
+            </a:r>
+            <a:r>
+              <a:rPr lang="en-US" dirty="0"/>
+              <a:t> un </a:t>
+            </a:r>
+            <a:r>
+              <a:rPr lang="en-US" dirty="0">
+                <a:solidFill>
+                  <a:srgbClr val="FFC000"/>
+                </a:solidFill>
+              </a:rPr>
+              <a:t>push</a:t>
+            </a:r>
+            <a:endParaRPr lang="es-419" dirty="0">
+              <a:solidFill>
+                <a:srgbClr val="FFC000"/>
+              </a:solidFill>
+            </a:endParaRPr>
           </a:p>
         </p:txBody>
       </p:sp>
@@ -8501,6 +9030,25 @@
 <file path=ppt/slides/slide8.xml><?xml version="1.0" encoding="utf-8"?>
 <p:sld xmlns:a="http://schemas.openxmlformats.org/drawingml/2006/main" xmlns:r="http://schemas.openxmlformats.org/officeDocument/2006/relationships" xmlns:p="http://schemas.openxmlformats.org/presentationml/2006/main">
   <p:cSld>
+    <p:bg>
+      <p:bgPr>
+        <a:blipFill rotWithShape="1">
+          <a:blip r:embed="rId2">
+            <a:duotone>
+              <a:schemeClr val="bg2">
+                <a:shade val="80000"/>
+                <a:lumMod val="80000"/>
+              </a:schemeClr>
+              <a:schemeClr val="bg2">
+                <a:tint val="98000"/>
+              </a:schemeClr>
+            </a:duotone>
+          </a:blip>
+          <a:stretch/>
+        </a:blipFill>
+        <a:effectLst/>
+      </p:bgPr>
+    </p:bg>
     <p:spTree>
       <p:nvGrpSpPr>
         <p:cNvPr id="1" name=""/>
@@ -8515,6 +9063,49 @@
           <a:chExt cx="0" cy="0"/>
         </a:xfrm>
       </p:grpSpPr>
+      <p:pic>
+        <p:nvPicPr>
+          <p:cNvPr id="4" name="Picture 3" descr="A close up of a tree&#10;&#10;Description automatically generated">
+            <a:extLst>
+              <a:ext uri="{FF2B5EF4-FFF2-40B4-BE49-F238E27FC236}">
+                <a16:creationId xmlns:a16="http://schemas.microsoft.com/office/drawing/2014/main" id="{AEFCC674-69EB-437C-B645-4B48107ADD95}"/>
+              </a:ext>
+            </a:extLst>
+          </p:cNvPr>
+          <p:cNvPicPr>
+            <a:picLocks noChangeAspect="1"/>
+          </p:cNvPicPr>
+          <p:nvPr/>
+        </p:nvPicPr>
+        <p:blipFill rotWithShape="1">
+          <a:blip r:embed="rId3">
+            <a:duotone>
+              <a:prstClr val="black"/>
+              <a:schemeClr val="tx2">
+                <a:tint val="45000"/>
+                <a:satMod val="400000"/>
+              </a:schemeClr>
+            </a:duotone>
+            <a:alphaModFix amt="35000"/>
+            <a:extLst>
+              <a:ext uri="{28A0092B-C50C-407E-A947-70E740481C1C}">
+                <a14:useLocalDpi xmlns:a14="http://schemas.microsoft.com/office/drawing/2010/main" val="0"/>
+              </a:ext>
+            </a:extLst>
+          </a:blip>
+          <a:srcRect t="3119" b="12611"/>
+          <a:stretch/>
+        </p:blipFill>
+        <p:spPr>
+          <a:xfrm>
+            <a:off x="20" y="10"/>
+            <a:ext cx="12191980" cy="6857990"/>
+          </a:xfrm>
+          <a:prstGeom prst="rect">
+            <a:avLst/>
+          </a:prstGeom>
+        </p:spPr>
+      </p:pic>
       <p:sp>
         <p:nvSpPr>
           <p:cNvPr id="2" name="Title 1">
@@ -8531,50 +9122,21 @@
             <p:ph type="title"/>
           </p:nvPr>
         </p:nvSpPr>
-        <p:spPr/>
-        <p:txBody>
-          <a:bodyPr/>
-          <a:lstStyle/>
-          <a:p>
-            <a:r>
-              <a:rPr lang="es-419" dirty="0"/>
-              <a:t>Conceptos clave</a:t>
-            </a:r>
-            <a:r>
-              <a:rPr lang="en-US" dirty="0"/>
-              <a:t>: Branch</a:t>
-            </a:r>
-            <a:endParaRPr lang="es-419" dirty="0"/>
-          </a:p>
-        </p:txBody>
-      </p:sp>
-      <p:sp>
-        <p:nvSpPr>
-          <p:cNvPr id="3" name="Content Placeholder 2">
-            <a:extLst>
-              <a:ext uri="{FF2B5EF4-FFF2-40B4-BE49-F238E27FC236}">
-                <a16:creationId xmlns:a16="http://schemas.microsoft.com/office/drawing/2014/main" id="{4C8A22F4-750C-4E9A-B539-BC08DBA1AC78}"/>
-              </a:ext>
-            </a:extLst>
-          </p:cNvPr>
-          <p:cNvSpPr>
-            <a:spLocks noGrp="1"/>
-          </p:cNvSpPr>
-          <p:nvPr>
-            <p:ph idx="1"/>
-          </p:nvPr>
-        </p:nvSpPr>
-        <p:spPr/>
-        <p:txBody>
-          <a:bodyPr/>
-          <a:lstStyle/>
-          <a:p>
-            <a:pPr marL="0" indent="0">
-              <a:buNone/>
-            </a:pPr>
-            <a:r>
-              <a:rPr lang="es-419" dirty="0"/>
-              <a:t> </a:t>
+        <p:spPr>
+          <a:xfrm>
+            <a:off x="1370693" y="1769540"/>
+            <a:ext cx="9440034" cy="1828801"/>
+          </a:xfrm>
+        </p:spPr>
+        <p:txBody>
+          <a:bodyPr vert="horz" lIns="91440" tIns="45720" rIns="91440" bIns="45720" rtlCol="0" anchor="b">
+            <a:normAutofit/>
+          </a:bodyPr>
+          <a:lstStyle/>
+          <a:p>
+            <a:r>
+              <a:rPr lang="en-US" sz="5400"/>
+              <a:t>Conceptos clave: Branch</a:t>
             </a:r>
           </a:p>
         </p:txBody>
@@ -8582,7 +9144,7 @@
     </p:spTree>
     <p:extLst>
       <p:ext uri="{BB962C8B-B14F-4D97-AF65-F5344CB8AC3E}">
-        <p14:creationId xmlns:p14="http://schemas.microsoft.com/office/powerpoint/2010/main" val="3816666332"/>
+        <p14:creationId xmlns:p14="http://schemas.microsoft.com/office/powerpoint/2010/main" val="3169587410"/>
       </p:ext>
     </p:extLst>
   </p:cSld>
@@ -8636,47 +9198,28 @@
             </a:r>
             <a:r>
               <a:rPr lang="en-US" dirty="0"/>
-              <a:t>: Merge/Conflict</a:t>
-            </a:r>
-            <a:endParaRPr lang="es-419" dirty="0"/>
-          </a:p>
-        </p:txBody>
-      </p:sp>
-      <p:sp>
-        <p:nvSpPr>
-          <p:cNvPr id="3" name="Content Placeholder 2">
-            <a:extLst>
-              <a:ext uri="{FF2B5EF4-FFF2-40B4-BE49-F238E27FC236}">
-                <a16:creationId xmlns:a16="http://schemas.microsoft.com/office/drawing/2014/main" id="{4C8A22F4-750C-4E9A-B539-BC08DBA1AC78}"/>
-              </a:ext>
-            </a:extLst>
-          </p:cNvPr>
-          <p:cNvSpPr>
-            <a:spLocks noGrp="1"/>
-          </p:cNvSpPr>
-          <p:nvPr>
-            <p:ph idx="1"/>
-          </p:nvPr>
-        </p:nvSpPr>
-        <p:spPr/>
-        <p:txBody>
-          <a:bodyPr/>
-          <a:lstStyle/>
-          <a:p>
-            <a:pPr marL="0" indent="0">
-              <a:buNone/>
-            </a:pPr>
-            <a:r>
-              <a:rPr lang="es-419" dirty="0"/>
-              <a:t> </a:t>
-            </a:r>
+              <a:t>: </a:t>
+            </a:r>
+            <a:r>
+              <a:rPr lang="en-US" dirty="0">
+                <a:solidFill>
+                  <a:srgbClr val="FFC000"/>
+                </a:solidFill>
+              </a:rPr>
+              <a:t>Branch</a:t>
+            </a:r>
+            <a:endParaRPr lang="es-419" dirty="0">
+              <a:solidFill>
+                <a:srgbClr val="FFC000"/>
+              </a:solidFill>
+            </a:endParaRPr>
           </a:p>
         </p:txBody>
       </p:sp>
     </p:spTree>
     <p:extLst>
       <p:ext uri="{BB962C8B-B14F-4D97-AF65-F5344CB8AC3E}">
-        <p14:creationId xmlns:p14="http://schemas.microsoft.com/office/powerpoint/2010/main" val="1882495817"/>
+        <p14:creationId xmlns:p14="http://schemas.microsoft.com/office/powerpoint/2010/main" val="3816666332"/>
       </p:ext>
     </p:extLst>
   </p:cSld>

</xml_diff>

<commit_message>
agregada info de branches y carpeta src con ejemplos 1 y 3
</commit_message>
<xml_diff>
--- a/Presentation/Git Gud 2.pptx
+++ b/Presentation/Git Gud 2.pptx
@@ -14,16 +14,18 @@
     <p:sldId id="261" r:id="rId8"/>
     <p:sldId id="275" r:id="rId9"/>
     <p:sldId id="262" r:id="rId10"/>
-    <p:sldId id="264" r:id="rId11"/>
-    <p:sldId id="265" r:id="rId12"/>
-    <p:sldId id="266" r:id="rId13"/>
-    <p:sldId id="267" r:id="rId14"/>
-    <p:sldId id="268" r:id="rId15"/>
-    <p:sldId id="269" r:id="rId16"/>
-    <p:sldId id="270" r:id="rId17"/>
-    <p:sldId id="271" r:id="rId18"/>
-    <p:sldId id="274" r:id="rId19"/>
-    <p:sldId id="273" r:id="rId20"/>
+    <p:sldId id="276" r:id="rId11"/>
+    <p:sldId id="277" r:id="rId12"/>
+    <p:sldId id="264" r:id="rId13"/>
+    <p:sldId id="265" r:id="rId14"/>
+    <p:sldId id="266" r:id="rId15"/>
+    <p:sldId id="267" r:id="rId16"/>
+    <p:sldId id="268" r:id="rId17"/>
+    <p:sldId id="269" r:id="rId18"/>
+    <p:sldId id="270" r:id="rId19"/>
+    <p:sldId id="271" r:id="rId20"/>
+    <p:sldId id="274" r:id="rId21"/>
+    <p:sldId id="273" r:id="rId22"/>
   </p:sldIdLst>
   <p:sldSz cx="12192000" cy="6858000"/>
   <p:notesSz cx="6858000" cy="9144000"/>
@@ -128,6 +130,510 @@
     </p:ext>
   </p:extLst>
 </p:presentation>
+</file>
+
+<file path=ppt/ink/ink1.xml><?xml version="1.0" encoding="utf-8"?>
+<inkml:ink xmlns:inkml="http://www.w3.org/2003/InkML">
+  <inkml:definitions>
+    <inkml:context xml:id="ctx0">
+      <inkml:inkSource xml:id="inkSrc0">
+        <inkml:traceFormat>
+          <inkml:channel name="X" type="integer" min="-2.14748E9" max="2.14748E9" units="cm"/>
+          <inkml:channel name="Y" type="integer" min="-2.14748E9" max="2.14748E9" units="cm"/>
+          <inkml:channel name="F" type="integer" max="32767" units="dev"/>
+        </inkml:traceFormat>
+        <inkml:channelProperties>
+          <inkml:channelProperty channel="X" name="resolution" value="1000" units="1/cm"/>
+          <inkml:channelProperty channel="Y" name="resolution" value="1000" units="1/cm"/>
+          <inkml:channelProperty channel="F" name="resolution" value="0" units="1/dev"/>
+        </inkml:channelProperties>
+      </inkml:inkSource>
+      <inkml:timestamp xml:id="ts0" timeString="2020-10-16T16:13:45.762"/>
+    </inkml:context>
+    <inkml:brush xml:id="br0">
+      <inkml:brushProperty name="width" value="0.1" units="cm"/>
+      <inkml:brushProperty name="height" value="0.1" units="cm"/>
+      <inkml:brushProperty name="color" value="#FF0066"/>
+    </inkml:brush>
+  </inkml:definitions>
+  <inkml:trace contextRef="#ctx0" brushRef="#br0">3009 1 5369,'0'0'1897,"0"0"-293,0 0-205,0 0-52,0 0-122,0 0-124,-8 3-153,-157 47 5276,-25 0-6224,77-23 779,-251 68 837,248-59-1310,4-2 794,-63 10-1100,75-23 556,0 4 1,-20 12-557,39-12 376,-18 2-376,28-5 121,44-13-27,0-1 1,-24 4-95,7-3 99,1 2 0,0 2 1,-20 10-100,15-5 94,-70 21 199,39-14-34,2 3 1,-44 24-260,120-51 6,-5 2 10,1-1 1,0 1-1,-1-1 1,1 0-1,-1 0 1,0-1-1,-2 1-16,7-2 14,1 0 4,-27 11 165,-40 7 65,35-8-594,27-9 309,1 0 1,0 0-1,0 0 1,0 1-1,0-1 0,0 1 1,1 0-1,-1 0 1,0 0-1,-1 2 37,-43 19-197,44-20 169,0 0 0,0-1 0,-1 0 0,1 1 0,-1-1 0,0-1 0,0 1 0,-4 0 28,5-1-22,-1 1-1,0-1 1,0 1 0,1 0-1,-1 0 1,1 1-1,0-1 1,-3 3 22,-5-1-10,-5 3-12,-2 0 30,4-3-10,13-3 1,-1-1 1,1 1-1,-1 0 1,1-1 0,-1 1-1,1 0 1,0 1-1,-1-1 1,1 0-1,0 1 1,0-1 0,0 1-1,0 0 1,0 0 0,6-8-3301,27-29 334,4 1-1674,5-6-1942</inkml:trace>
+</inkml:ink>
+</file>
+
+<file path=ppt/ink/ink10.xml><?xml version="1.0" encoding="utf-8"?>
+<inkml:ink xmlns:inkml="http://www.w3.org/2003/InkML">
+  <inkml:definitions>
+    <inkml:context xml:id="ctx0">
+      <inkml:inkSource xml:id="inkSrc0">
+        <inkml:traceFormat>
+          <inkml:channel name="X" type="integer" min="-2.14748E9" max="2.14748E9" units="cm"/>
+          <inkml:channel name="Y" type="integer" min="-2.14748E9" max="2.14748E9" units="cm"/>
+          <inkml:channel name="F" type="integer" max="32767" units="dev"/>
+        </inkml:traceFormat>
+        <inkml:channelProperties>
+          <inkml:channelProperty channel="X" name="resolution" value="1000" units="1/cm"/>
+          <inkml:channelProperty channel="Y" name="resolution" value="1000" units="1/cm"/>
+          <inkml:channelProperty channel="F" name="resolution" value="0" units="1/dev"/>
+        </inkml:channelProperties>
+      </inkml:inkSource>
+      <inkml:timestamp xml:id="ts0" timeString="2020-10-16T16:14:02.642"/>
+    </inkml:context>
+    <inkml:brush xml:id="br0">
+      <inkml:brushProperty name="width" value="0.1" units="cm"/>
+      <inkml:brushProperty name="height" value="0.1" units="cm"/>
+      <inkml:brushProperty name="color" value="#66CC00"/>
+    </inkml:brush>
+  </inkml:definitions>
+  <inkml:trace contextRef="#ctx0" brushRef="#br0">21 0 7922,'0'0'2568,"0"0"-511,0 0-17,0 0-784,0 0-15,-20 173-33,20-132-304,0-7-336,0-11-144,0-11-152,0-6-184,0-6-88,0 0-640,0 0-1056,0-12-1169,0 0-2848</inkml:trace>
+</inkml:ink>
+</file>
+
+<file path=ppt/ink/ink11.xml><?xml version="1.0" encoding="utf-8"?>
+<inkml:ink xmlns:inkml="http://www.w3.org/2003/InkML">
+  <inkml:definitions>
+    <inkml:context xml:id="ctx0">
+      <inkml:inkSource xml:id="inkSrc0">
+        <inkml:traceFormat>
+          <inkml:channel name="X" type="integer" min="-2.14748E9" max="2.14748E9" units="cm"/>
+          <inkml:channel name="Y" type="integer" min="-2.14748E9" max="2.14748E9" units="cm"/>
+          <inkml:channel name="F" type="integer" max="32767" units="dev"/>
+        </inkml:traceFormat>
+        <inkml:channelProperties>
+          <inkml:channelProperty channel="X" name="resolution" value="1000" units="1/cm"/>
+          <inkml:channelProperty channel="Y" name="resolution" value="1000" units="1/cm"/>
+          <inkml:channelProperty channel="F" name="resolution" value="0" units="1/dev"/>
+        </inkml:channelProperties>
+      </inkml:inkSource>
+      <inkml:timestamp xml:id="ts0" timeString="2020-10-16T16:14:02.986"/>
+    </inkml:context>
+    <inkml:brush xml:id="br0">
+      <inkml:brushProperty name="width" value="0.1" units="cm"/>
+      <inkml:brushProperty name="height" value="0.1" units="cm"/>
+      <inkml:brushProperty name="color" value="#66CC00"/>
+    </inkml:brush>
+  </inkml:definitions>
+  <inkml:trace contextRef="#ctx0" brushRef="#br0">1 0 9498,'0'0'4329,"0"0"-3001,0 0-23,0 0-1305,0 0-121,0 0-2359,0 0-4217</inkml:trace>
+</inkml:ink>
+</file>
+
+<file path=ppt/ink/ink12.xml><?xml version="1.0" encoding="utf-8"?>
+<inkml:ink xmlns:inkml="http://www.w3.org/2003/InkML">
+  <inkml:definitions>
+    <inkml:context xml:id="ctx0">
+      <inkml:inkSource xml:id="inkSrc0">
+        <inkml:traceFormat>
+          <inkml:channel name="X" type="integer" min="-2.14748E9" max="2.14748E9" units="cm"/>
+          <inkml:channel name="Y" type="integer" min="-2.14748E9" max="2.14748E9" units="cm"/>
+          <inkml:channel name="F" type="integer" max="32767" units="dev"/>
+        </inkml:traceFormat>
+        <inkml:channelProperties>
+          <inkml:channelProperty channel="X" name="resolution" value="1000" units="1/cm"/>
+          <inkml:channelProperty channel="Y" name="resolution" value="1000" units="1/cm"/>
+          <inkml:channelProperty channel="F" name="resolution" value="0" units="1/dev"/>
+        </inkml:channelProperties>
+      </inkml:inkSource>
+      <inkml:timestamp xml:id="ts0" timeString="2020-10-16T16:14:03.731"/>
+    </inkml:context>
+    <inkml:brush xml:id="br0">
+      <inkml:brushProperty name="width" value="0.1" units="cm"/>
+      <inkml:brushProperty name="height" value="0.1" units="cm"/>
+      <inkml:brushProperty name="color" value="#66CC00"/>
+    </inkml:brush>
+  </inkml:definitions>
+  <inkml:trace contextRef="#ctx0" brushRef="#br0">0 1 7154,'0'0'2023,"0"0"-276,0 0-318,0 0-335,0 0-71,0 0-56,0 0-31,0 0 24,0 25 1363,0 49-760,3-1 0,4 1 0,10 43-1563,-16-106 80,-1-11-63,0 1 0,0-1 0,0 1 0,0-1 0,0 1 0,0-1 0,0 1 0,1-1-1,-1 1 1,0-1 0,0 1 0,0 0 0,1-1 0,-1 0 0,0 1 0,0-1 0,1 1 0,-1-1 0,0 1 0,1-1 0,-1 0 0,1 1-1,-1-1 1,1 0 0,-1 1 0,1-1 0,-1 0 0,0 1 0,1-1 0,0 0 0,-1 0 0,1 0 0,-1 0 0,1 1 0,-1-1 0,1 0 0,-1 0-1,1 0 1,-1 0 0,1 0 0,0 0 0,-1 0 0,1-1 0,-1 1 0,1 0 0,-1 0 0,1 0 0,-1-1 0,1 1-17,0 0 21,-1 0-10,16-19-13,-7 0-9,0 1 0,1 1 0,1-1-1,1 2 1,8-11 11,71-74-42,-83 91 32,1 0 0,0 1 1,1 0-1,0 1 0,0 0 0,0 1 1,1 0-1,1 1 0,-1 0 1,1 0-1,0 1 0,0 1 1,0 0-1,1 1 0,-1 0 0,1 1 1,0 0-1,1 1 10,-3 0-15,1 1 0,0 0 0,-1 0 1,1 2-1,-1-1 0,0 1 0,1 1 0,-1 0 0,0 1 0,6 2 15,-11-3 15,0 1 1,0-1-1,0 1 0,-1 0 0,0 1 0,0-1 0,0 1 1,0 0-1,-1 0 0,1 0 0,-1 1 0,-1 0 0,1 0 0,-1 0 1,0 0-1,0 0 0,-1 0 0,2 7-15,1 11 111,-1 0 1,-2 1-1,0-1 0,-2 0 0,0 1 1,-2 3-112,0 32 123,3-32-66,0-17-38,-1 0-1,1 0 0,-2 0 1,0 0-1,0-1 0,-1 1 0,0 0 1,-1 0-1,0-1 0,0 0 1,-3 4-19,5-12 30,1-2-158,-36 0-2459,35 0 2455,-1 0-1,1-1 1,-1 1 0,0 0-1,1-1 1,-1 0-1,1 1 1,-1-1 0,1 0-1,-1 0 1,1 1 0,0-1-1,-1 0 1,1 0 0,0-1-1,0 1 1,0 0-1,-1 0 1,1-1 0,1 1-1,-1 0 1,0-1 0,0 1-1,0-1 1,1 1 0,-1-2 132,-11-45-5420,11 25 606</inkml:trace>
+</inkml:ink>
+</file>
+
+<file path=ppt/ink/ink13.xml><?xml version="1.0" encoding="utf-8"?>
+<inkml:ink xmlns:inkml="http://www.w3.org/2003/InkML">
+  <inkml:definitions>
+    <inkml:context xml:id="ctx0">
+      <inkml:inkSource xml:id="inkSrc0">
+        <inkml:traceFormat>
+          <inkml:channel name="X" type="integer" min="-2.14748E9" max="2.14748E9" units="cm"/>
+          <inkml:channel name="Y" type="integer" min="-2.14748E9" max="2.14748E9" units="cm"/>
+          <inkml:channel name="F" type="integer" max="32767" units="dev"/>
+        </inkml:traceFormat>
+        <inkml:channelProperties>
+          <inkml:channelProperty channel="X" name="resolution" value="1000" units="1/cm"/>
+          <inkml:channelProperty channel="Y" name="resolution" value="1000" units="1/cm"/>
+          <inkml:channelProperty channel="F" name="resolution" value="0" units="1/dev"/>
+        </inkml:channelProperties>
+      </inkml:inkSource>
+      <inkml:timestamp xml:id="ts0" timeString="2020-10-16T16:13:45.762"/>
+    </inkml:context>
+    <inkml:brush xml:id="br0">
+      <inkml:brushProperty name="width" value="0.1" units="cm"/>
+      <inkml:brushProperty name="height" value="0.1" units="cm"/>
+      <inkml:brushProperty name="color" value="#FF0066"/>
+    </inkml:brush>
+  </inkml:definitions>
+  <inkml:trace contextRef="#ctx0" brushRef="#br0">3009 1 5369,'0'0'1897,"0"0"-293,0 0-205,0 0-52,0 0-122,0 0-124,-8 3-153,-157 47 5276,-25 0-6224,77-23 779,-251 68 837,248-59-1310,4-2 794,-63 10-1100,75-23 556,0 4 1,-20 12-557,39-12 376,-18 2-376,28-5 121,44-13-27,0-1 1,-24 4-95,7-3 99,1 2 0,0 2 1,-20 10-100,15-5 94,-70 21 199,39-14-34,2 3 1,-44 24-260,120-51 6,-5 2 10,1-1 1,0 1-1,-1-1 1,1 0-1,-1 0 1,0-1-1,-2 1-16,7-2 14,1 0 4,-27 11 165,-40 7 65,35-8-594,27-9 309,1 0 1,0 0-1,0 0 1,0 1-1,0-1 0,0 1 1,1 0-1,-1 0 1,0 0-1,-1 2 37,-43 19-197,44-20 169,0 0 0,0-1 0,-1 0 0,1 1 0,-1-1 0,0-1 0,0 1 0,-4 0 28,5-1-22,-1 1-1,0-1 1,0 1 0,1 0-1,-1 0 1,1 1-1,0-1 1,-3 3 22,-5-1-10,-5 3-12,-2 0 30,4-3-10,13-3 1,-1-1 1,1 1-1,-1 0 1,1-1 0,-1 1-1,1 0 1,0 1-1,-1-1 1,1 0-1,0 1 1,0-1 0,0 1-1,0 0 1,0 0 0,6-8-3301,27-29 334,4 1-1674,5-6-1942</inkml:trace>
+</inkml:ink>
+</file>
+
+<file path=ppt/ink/ink14.xml><?xml version="1.0" encoding="utf-8"?>
+<inkml:ink xmlns:inkml="http://www.w3.org/2003/InkML">
+  <inkml:definitions>
+    <inkml:context xml:id="ctx0">
+      <inkml:inkSource xml:id="inkSrc0">
+        <inkml:traceFormat>
+          <inkml:channel name="X" type="integer" min="-2.14748E9" max="2.14748E9" units="cm"/>
+          <inkml:channel name="Y" type="integer" min="-2.14748E9" max="2.14748E9" units="cm"/>
+          <inkml:channel name="F" type="integer" max="32767" units="dev"/>
+        </inkml:traceFormat>
+        <inkml:channelProperties>
+          <inkml:channelProperty channel="X" name="resolution" value="1000" units="1/cm"/>
+          <inkml:channelProperty channel="Y" name="resolution" value="1000" units="1/cm"/>
+          <inkml:channelProperty channel="F" name="resolution" value="0" units="1/dev"/>
+        </inkml:channelProperties>
+      </inkml:inkSource>
+      <inkml:timestamp xml:id="ts0" timeString="2020-10-16T16:14:00.935"/>
+    </inkml:context>
+    <inkml:brush xml:id="br0">
+      <inkml:brushProperty name="width" value="0.1" units="cm"/>
+      <inkml:brushProperty name="height" value="0.1" units="cm"/>
+      <inkml:brushProperty name="color" value="#66CC00"/>
+    </inkml:brush>
+  </inkml:definitions>
+  <inkml:trace contextRef="#ctx0" brushRef="#br0">3 10 4585,'0'0'1872,"0"0"-91,0 0-66,0 0-274,0 0-282,0-9 1617,-1 83-731,0-25-1380,1 0 1,2 1 0,3-1-1,2-1 1,2 1-666,9 28 629,2 8 369,3-1 1,12 24-999,-29-215 1291,-6 57-1256,2 0 0,3 0 0,2-4-35,-4 34-1,2 1 1,0 0-1,1 0 0,1 1 0,1-1 1,0 1-1,2 1 0,0 0 0,3-3 1,-9 15-9,0 0 0,1 0-1,-1 1 1,1 0 0,0 0 0,0 0-1,1 0 1,-1 1 0,1 0-1,-1 0 1,1 1 0,0-1-1,0 1 1,1 0 0,-1 1 0,5-1 9,8-1-21,0 2 0,0 0 0,0 1 0,0 0 0,2 2 21,-15-1-7,0 1 0,0-1 0,0 1 0,-1 0 0,1 1 0,0 0 0,-1-1 0,0 2 0,1-1 0,-1 1 0,-1-1 0,1 1 0,-1 1 0,1-1 0,-1 1 0,0-1 1,-1 1-1,1 1 0,-1-1 0,0 0 0,0 1 0,-1-1 0,2 6 7,5 11 16,-1 0 0,-1 1 0,-1 0 0,-2 0 0,2 17-16,-1 28 74,-3 64-74,-2-86 154,0-45-143,0-1 2,0 0-4,0 0-1,0 0 8,0 0 26,0 0-10,0-24 50,1-1-61,1 0-1,2 0 1,0 1-1,2-1 1,0 1-1,10-21-20,4-6-3,3 1 1,18-29 2,-36 70-7,0 1 1,0-1-1,1 1 0,0 0 1,0 1-1,1 0 1,0 0-1,1 0 1,2-2 6,-6 7-8,-1 0 0,0 0 1,1 0-1,-1 1 0,1 0 0,-1-1 1,1 1-1,0 0 0,0 1 1,0-1-1,-1 1 0,1-1 1,0 1-1,0 0 0,0 1 1,0-1-1,-1 1 0,1-1 1,0 1-1,0 1 0,-1-1 1,1 0-1,-1 1 0,1-1 1,-1 1-1,3 2 8,16 9-6,-2 0-1,0 1 1,0 1 0,-2 1-1,1 1 1,7 10 6,-18-18 3,0 1 0,-1 0 0,-1 1 1,1 0-1,-2 0 0,1 0 0,-1 1 0,-1-1 1,0 1-1,-1 0 0,0 0 0,-1 1 0,-1-1 1,1 3-4,0 3 39,-1 0 1,0-1-1,-1 1 1,-1 0-1,-1 0 1,-1 0-1,0 0 1,-1-1-1,-1 1 1,-1-1-1,0 0 1,-1-1-1,-7 12-39,-28 27 180,25-34-101,14-15-98,3-5-181,0-1-247,0 0-352,0-21-3161,0-56-4281,0 37 2901</inkml:trace>
+</inkml:ink>
+</file>
+
+<file path=ppt/ink/ink15.xml><?xml version="1.0" encoding="utf-8"?>
+<inkml:ink xmlns:inkml="http://www.w3.org/2003/InkML">
+  <inkml:definitions>
+    <inkml:context xml:id="ctx0">
+      <inkml:inkSource xml:id="inkSrc0">
+        <inkml:traceFormat>
+          <inkml:channel name="X" type="integer" min="-2.14748E9" max="2.14748E9" units="cm"/>
+          <inkml:channel name="Y" type="integer" min="-2.14748E9" max="2.14748E9" units="cm"/>
+          <inkml:channel name="F" type="integer" max="32767" units="dev"/>
+        </inkml:traceFormat>
+        <inkml:channelProperties>
+          <inkml:channelProperty channel="X" name="resolution" value="1000" units="1/cm"/>
+          <inkml:channelProperty channel="Y" name="resolution" value="1000" units="1/cm"/>
+          <inkml:channelProperty channel="F" name="resolution" value="0" units="1/dev"/>
+        </inkml:channelProperties>
+      </inkml:inkSource>
+      <inkml:timestamp xml:id="ts0" timeString="2020-10-16T16:14:02.022"/>
+    </inkml:context>
+    <inkml:brush xml:id="br0">
+      <inkml:brushProperty name="width" value="0.1" units="cm"/>
+      <inkml:brushProperty name="height" value="0.1" units="cm"/>
+      <inkml:brushProperty name="color" value="#66CC00"/>
+    </inkml:brush>
+  </inkml:definitions>
+  <inkml:trace contextRef="#ctx0" brushRef="#br0">70 113 5393,'0'0'2426,"0"0"-702,0 0-223,0 0-209,0 0-246,0 0-74,7-13-3,-2 2-676,-4 7-214,1 0 0,-1 0-1,1 1 1,0-1 0,0 0-1,0 1 1,1 0 0,-1-1 0,1 1-1,0 0 1,0 0 0,0 0-1,0 1 1,0-1 0,0 1 0,1-1-1,-1 1 1,1 0 0,0 1-1,2-2-78,19-4 466,0 1 0,1 2 0,-1 0 0,1 1 0,0 2 0,0 1 0,-1 0 0,8 3-466,-27-1 36,1 0 0,-1 0 1,0 0-1,1 1 1,-1 0-1,-1 0 0,1 0 1,0 1-1,-1 0 0,0 0 1,0 0-1,0 1 0,0 0 1,-1 0-1,1 0 0,-1 0 1,-1 1-1,1-1 0,-1 1 1,0 0-1,0 0 0,0 2-36,4 7 57,-1 1 0,0-1 0,-1 1 0,-1 0 0,-1 0 0,0 1 0,-1-1 0,0 10-57,-2-26 33,0 1 1,0-1 0,0 0-1,0 0 1,0 1 0,0-1-1,0 0 1,0 0-1,0 0 1,0 1 0,0-1-1,0 0 1,0 0 0,0 1-1,-1-1 1,1 0 0,0 0-1,0 0 1,0 1-1,0-1 1,-1 0 0,1 0-1,0 0 1,0 0 0,0 1-1,-1-1 1,1 0-1,0 0 1,0 0 0,0 0-1,-1 0 1,1 0 0,0 0-1,0 0 1,-1 0 0,1 0-1,0 0 1,0 0-1,-1 0-33,-15-4 658,-35-22-480,-14-6 101,37 28-166,0 1 1,-1 1 0,0 2 0,1 0 0,-20 4-114,35 0 17,-1-1 0,1 2 0,0 0 0,0 0 0,0 1 0,1 1 0,0 0 0,0 1 0,1 0 0,0 1 0,0 0 0,1 1 0,-7 7-17,14-13 2,0 0-1,1 0 0,-1 0 1,1 1-1,0-1 1,0 0-1,0 1 0,1 0 1,0-1-1,0 1 0,0 0 1,0-1-1,1 3-1,2 63 154,-1-68-143,-1 0 0,1 1 0,-1-1-1,1 0 1,0 0 0,0 0-1,0 0 1,0 0 0,0 0-1,0 0 1,0 0 0,1 0 0,-1-1-1,1 1 1,0 0 0,-1-1-1,1 0 1,0 1 0,1 0-11,2 1 6,0-1 0,0 1 0,1-1 1,-1-1-1,0 1 0,1 0 0,-1-1 0,3 0-6,16 1 15,0-1-1,-1 0 0,20-4-14,-35 3 25,11-4-97,0 0 1,0-1 0,-1 0-1,0-2 1,0 0 0,-1-1-1,13-8 72,-4 3-641,-23 12 331,1-1 0,0 0 0,-1-1-1,1 1 1,-1-1 0,0 1 0,1-1-1,-1 0 1,-1 0 0,1 0 0,0-1-1,-1 1 1,0-1 0,0 1 0,0-1-1,1-1 311,8-44-7456,-10 16-528</inkml:trace>
+</inkml:ink>
+</file>
+
+<file path=ppt/ink/ink16.xml><?xml version="1.0" encoding="utf-8"?>
+<inkml:ink xmlns:inkml="http://www.w3.org/2003/InkML">
+  <inkml:definitions>
+    <inkml:context xml:id="ctx0">
+      <inkml:inkSource xml:id="inkSrc0">
+        <inkml:traceFormat>
+          <inkml:channel name="X" type="integer" min="-2.14748E9" max="2.14748E9" units="cm"/>
+          <inkml:channel name="Y" type="integer" min="-2.14748E9" max="2.14748E9" units="cm"/>
+          <inkml:channel name="F" type="integer" max="32767" units="dev"/>
+        </inkml:traceFormat>
+        <inkml:channelProperties>
+          <inkml:channelProperty channel="X" name="resolution" value="1000" units="1/cm"/>
+          <inkml:channelProperty channel="Y" name="resolution" value="1000" units="1/cm"/>
+          <inkml:channelProperty channel="F" name="resolution" value="0" units="1/dev"/>
+        </inkml:channelProperties>
+      </inkml:inkSource>
+      <inkml:timestamp xml:id="ts0" timeString="2020-10-16T16:14:02.642"/>
+    </inkml:context>
+    <inkml:brush xml:id="br0">
+      <inkml:brushProperty name="width" value="0.1" units="cm"/>
+      <inkml:brushProperty name="height" value="0.1" units="cm"/>
+      <inkml:brushProperty name="color" value="#66CC00"/>
+    </inkml:brush>
+  </inkml:definitions>
+  <inkml:trace contextRef="#ctx0" brushRef="#br0">21 0 7922,'0'0'2568,"0"0"-511,0 0-17,0 0-784,0 0-15,-20 173-33,20-132-304,0-7-336,0-11-144,0-11-152,0-6-184,0-6-88,0 0-640,0 0-1056,0-12-1169,0 0-2848</inkml:trace>
+</inkml:ink>
+</file>
+
+<file path=ppt/ink/ink17.xml><?xml version="1.0" encoding="utf-8"?>
+<inkml:ink xmlns:inkml="http://www.w3.org/2003/InkML">
+  <inkml:definitions>
+    <inkml:context xml:id="ctx0">
+      <inkml:inkSource xml:id="inkSrc0">
+        <inkml:traceFormat>
+          <inkml:channel name="X" type="integer" min="-2.14748E9" max="2.14748E9" units="cm"/>
+          <inkml:channel name="Y" type="integer" min="-2.14748E9" max="2.14748E9" units="cm"/>
+          <inkml:channel name="F" type="integer" max="32767" units="dev"/>
+        </inkml:traceFormat>
+        <inkml:channelProperties>
+          <inkml:channelProperty channel="X" name="resolution" value="1000" units="1/cm"/>
+          <inkml:channelProperty channel="Y" name="resolution" value="1000" units="1/cm"/>
+          <inkml:channelProperty channel="F" name="resolution" value="0" units="1/dev"/>
+        </inkml:channelProperties>
+      </inkml:inkSource>
+      <inkml:timestamp xml:id="ts0" timeString="2020-10-16T16:14:02.986"/>
+    </inkml:context>
+    <inkml:brush xml:id="br0">
+      <inkml:brushProperty name="width" value="0.1" units="cm"/>
+      <inkml:brushProperty name="height" value="0.1" units="cm"/>
+      <inkml:brushProperty name="color" value="#66CC00"/>
+    </inkml:brush>
+  </inkml:definitions>
+  <inkml:trace contextRef="#ctx0" brushRef="#br0">1 0 9498,'0'0'4329,"0"0"-3001,0 0-23,0 0-1305,0 0-121,0 0-2359,0 0-4217</inkml:trace>
+</inkml:ink>
+</file>
+
+<file path=ppt/ink/ink18.xml><?xml version="1.0" encoding="utf-8"?>
+<inkml:ink xmlns:inkml="http://www.w3.org/2003/InkML">
+  <inkml:definitions>
+    <inkml:context xml:id="ctx0">
+      <inkml:inkSource xml:id="inkSrc0">
+        <inkml:traceFormat>
+          <inkml:channel name="X" type="integer" min="-2.14748E9" max="2.14748E9" units="cm"/>
+          <inkml:channel name="Y" type="integer" min="-2.14748E9" max="2.14748E9" units="cm"/>
+          <inkml:channel name="F" type="integer" max="32767" units="dev"/>
+        </inkml:traceFormat>
+        <inkml:channelProperties>
+          <inkml:channelProperty channel="X" name="resolution" value="1000" units="1/cm"/>
+          <inkml:channelProperty channel="Y" name="resolution" value="1000" units="1/cm"/>
+          <inkml:channelProperty channel="F" name="resolution" value="0" units="1/dev"/>
+        </inkml:channelProperties>
+      </inkml:inkSource>
+      <inkml:timestamp xml:id="ts0" timeString="2020-10-16T16:14:03.731"/>
+    </inkml:context>
+    <inkml:brush xml:id="br0">
+      <inkml:brushProperty name="width" value="0.1" units="cm"/>
+      <inkml:brushProperty name="height" value="0.1" units="cm"/>
+      <inkml:brushProperty name="color" value="#66CC00"/>
+    </inkml:brush>
+  </inkml:definitions>
+  <inkml:trace contextRef="#ctx0" brushRef="#br0">0 1 7154,'0'0'2023,"0"0"-276,0 0-318,0 0-335,0 0-71,0 0-56,0 0-31,0 0 24,0 25 1363,0 49-760,3-1 0,4 1 0,10 43-1563,-16-106 80,-1-11-63,0 1 0,0-1 0,0 1 0,0-1 0,0 1 0,0-1 0,0 1 0,1-1-1,-1 1 1,0-1 0,0 1 0,0 0 0,1-1 0,-1 0 0,0 1 0,0-1 0,1 1 0,-1-1 0,0 1 0,1-1 0,-1 0 0,1 1-1,-1-1 1,1 0 0,-1 1 0,1-1 0,-1 0 0,0 1 0,1-1 0,0 0 0,-1 0 0,1 0 0,-1 0 0,1 1 0,-1-1 0,1 0 0,-1 0-1,1 0 1,-1 0 0,1 0 0,0 0 0,-1 0 0,1-1 0,-1 1 0,1 0 0,-1 0 0,1 0 0,-1-1 0,1 1-17,0 0 21,-1 0-10,16-19-13,-7 0-9,0 1 0,1 1 0,1-1-1,1 2 1,8-11 11,71-74-42,-83 91 32,1 0 0,0 1 1,1 0-1,0 1 0,0 0 0,0 1 1,1 0-1,1 1 0,-1 0 1,1 0-1,0 1 0,0 1 1,0 0-1,1 1 0,-1 0 0,1 1 1,0 0-1,1 1 10,-3 0-15,1 1 0,0 0 0,-1 0 1,1 2-1,-1-1 0,0 1 0,1 1 0,-1 0 0,0 1 0,6 2 15,-11-3 15,0 1 1,0-1-1,0 1 0,-1 0 0,0 1 0,0-1 0,0 1 1,0 0-1,-1 0 0,1 0 0,-1 1 0,-1 0 0,1 0 0,-1 0 1,0 0-1,0 0 0,-1 0 0,2 7-15,1 11 111,-1 0 1,-2 1-1,0-1 0,-2 0 0,0 1 1,-2 3-112,0 32 123,3-32-66,0-17-38,-1 0-1,1 0 0,-2 0 1,0 0-1,0-1 0,-1 1 0,0 0 1,-1 0-1,0-1 0,0 0 1,-3 4-19,5-12 30,1-2-158,-36 0-2459,35 0 2455,-1 0-1,1-1 1,-1 1 0,0 0-1,1-1 1,-1 0-1,1 1 1,-1-1 0,1 0-1,-1 0 1,1 1 0,0-1-1,-1 0 1,1 0 0,0-1-1,0 1 1,0 0-1,-1 0 1,1-1 0,1 1-1,-1 0 1,0-1 0,0 1-1,0-1 1,1 1 0,-1-2 132,-11-45-5420,11 25 606</inkml:trace>
+</inkml:ink>
+</file>
+
+<file path=ppt/ink/ink2.xml><?xml version="1.0" encoding="utf-8"?>
+<inkml:ink xmlns:inkml="http://www.w3.org/2003/InkML">
+  <inkml:definitions>
+    <inkml:context xml:id="ctx0">
+      <inkml:inkSource xml:id="inkSrc0">
+        <inkml:traceFormat>
+          <inkml:channel name="X" type="integer" min="-2.14748E9" max="2.14748E9" units="cm"/>
+          <inkml:channel name="Y" type="integer" min="-2.14748E9" max="2.14748E9" units="cm"/>
+          <inkml:channel name="F" type="integer" max="32767" units="dev"/>
+        </inkml:traceFormat>
+        <inkml:channelProperties>
+          <inkml:channelProperty channel="X" name="resolution" value="1000" units="1/cm"/>
+          <inkml:channelProperty channel="Y" name="resolution" value="1000" units="1/cm"/>
+          <inkml:channelProperty channel="F" name="resolution" value="0" units="1/dev"/>
+        </inkml:channelProperties>
+      </inkml:inkSource>
+      <inkml:timestamp xml:id="ts0" timeString="2020-10-16T16:14:00.935"/>
+    </inkml:context>
+    <inkml:brush xml:id="br0">
+      <inkml:brushProperty name="width" value="0.1" units="cm"/>
+      <inkml:brushProperty name="height" value="0.1" units="cm"/>
+      <inkml:brushProperty name="color" value="#66CC00"/>
+    </inkml:brush>
+  </inkml:definitions>
+  <inkml:trace contextRef="#ctx0" brushRef="#br0">3 10 4585,'0'0'1872,"0"0"-91,0 0-66,0 0-274,0 0-282,0-9 1617,-1 83-731,0-25-1380,1 0 1,2 1 0,3-1-1,2-1 1,2 1-666,9 28 629,2 8 369,3-1 1,12 24-999,-29-215 1291,-6 57-1256,2 0 0,3 0 0,2-4-35,-4 34-1,2 1 1,0 0-1,1 0 0,1 1 0,1-1 1,0 1-1,2 1 0,0 0 0,3-3 1,-9 15-9,0 0 0,1 0-1,-1 1 1,1 0 0,0 0 0,0 0-1,1 0 1,-1 1 0,1 0-1,-1 0 1,1 1 0,0-1-1,0 1 1,1 0 0,-1 1 0,5-1 9,8-1-21,0 2 0,0 0 0,0 1 0,0 0 0,2 2 21,-15-1-7,0 1 0,0-1 0,0 1 0,-1 0 0,1 1 0,0 0 0,-1-1 0,0 2 0,1-1 0,-1 1 0,-1-1 0,1 1 0,-1 1 0,1-1 0,-1 1 0,0-1 1,-1 1-1,1 1 0,-1-1 0,0 0 0,0 1 0,-1-1 0,2 6 7,5 11 16,-1 0 0,-1 1 0,-1 0 0,-2 0 0,2 17-16,-1 28 74,-3 64-74,-2-86 154,0-45-143,0-1 2,0 0-4,0 0-1,0 0 8,0 0 26,0 0-10,0-24 50,1-1-61,1 0-1,2 0 1,0 1-1,2-1 1,0 1-1,10-21-20,4-6-3,3 1 1,18-29 2,-36 70-7,0 1 1,0-1-1,1 1 0,0 0 1,0 1-1,1 0 1,0 0-1,1 0 1,2-2 6,-6 7-8,-1 0 0,0 0 1,1 0-1,-1 1 0,1 0 0,-1-1 1,1 1-1,0 0 0,0 1 1,0-1-1,-1 1 0,1-1 1,0 1-1,0 0 0,0 1 1,0-1-1,-1 1 0,1-1 1,0 1-1,0 1 0,-1-1 1,1 0-1,-1 1 0,1-1 1,-1 1-1,3 2 8,16 9-6,-2 0-1,0 1 1,0 1 0,-2 1-1,1 1 1,7 10 6,-18-18 3,0 1 0,-1 0 0,-1 1 1,1 0-1,-2 0 0,1 0 0,-1 1 0,-1-1 1,0 1-1,-1 0 0,0 0 0,-1 1 0,-1-1 1,1 3-4,0 3 39,-1 0 1,0-1-1,-1 1 1,-1 0-1,-1 0 1,-1 0-1,0 0 1,-1-1-1,-1 1 1,-1-1-1,0 0 1,-1-1-1,-7 12-39,-28 27 180,25-34-101,14-15-98,3-5-181,0-1-247,0 0-352,0-21-3161,0-56-4281,0 37 2901</inkml:trace>
+</inkml:ink>
+</file>
+
+<file path=ppt/ink/ink3.xml><?xml version="1.0" encoding="utf-8"?>
+<inkml:ink xmlns:inkml="http://www.w3.org/2003/InkML">
+  <inkml:definitions>
+    <inkml:context xml:id="ctx0">
+      <inkml:inkSource xml:id="inkSrc0">
+        <inkml:traceFormat>
+          <inkml:channel name="X" type="integer" min="-2.14748E9" max="2.14748E9" units="cm"/>
+          <inkml:channel name="Y" type="integer" min="-2.14748E9" max="2.14748E9" units="cm"/>
+          <inkml:channel name="F" type="integer" max="32767" units="dev"/>
+        </inkml:traceFormat>
+        <inkml:channelProperties>
+          <inkml:channelProperty channel="X" name="resolution" value="1000" units="1/cm"/>
+          <inkml:channelProperty channel="Y" name="resolution" value="1000" units="1/cm"/>
+          <inkml:channelProperty channel="F" name="resolution" value="0" units="1/dev"/>
+        </inkml:channelProperties>
+      </inkml:inkSource>
+      <inkml:timestamp xml:id="ts0" timeString="2020-10-16T16:14:02.022"/>
+    </inkml:context>
+    <inkml:brush xml:id="br0">
+      <inkml:brushProperty name="width" value="0.1" units="cm"/>
+      <inkml:brushProperty name="height" value="0.1" units="cm"/>
+      <inkml:brushProperty name="color" value="#66CC00"/>
+    </inkml:brush>
+  </inkml:definitions>
+  <inkml:trace contextRef="#ctx0" brushRef="#br0">70 113 5393,'0'0'2426,"0"0"-702,0 0-223,0 0-209,0 0-246,0 0-74,7-13-3,-2 2-676,-4 7-214,1 0 0,-1 0-1,1 1 1,0-1 0,0 0-1,0 1 1,1 0 0,-1-1 0,1 1-1,0 0 1,0 0 0,0 0-1,0 1 1,0-1 0,0 1 0,1-1-1,-1 1 1,1 0 0,0 1-1,2-2-78,19-4 466,0 1 0,1 2 0,-1 0 0,1 1 0,0 2 0,0 1 0,-1 0 0,8 3-466,-27-1 36,1 0 0,-1 0 1,0 0-1,1 1 1,-1 0-1,-1 0 0,1 0 1,0 1-1,-1 0 0,0 0 1,0 0-1,0 1 0,0 0 1,-1 0-1,1 0 0,-1 0 1,-1 1-1,1-1 0,-1 1 1,0 0-1,0 0 0,0 2-36,4 7 57,-1 1 0,0-1 0,-1 1 0,-1 0 0,-1 0 0,0 1 0,-1-1 0,0 10-57,-2-26 33,0 1 1,0-1 0,0 0-1,0 0 1,0 1 0,0-1-1,0 0 1,0 0-1,0 0 1,0 1 0,0-1-1,0 0 1,0 0 0,0 1-1,-1-1 1,1 0 0,0 0-1,0 0 1,0 1-1,0-1 1,-1 0 0,1 0-1,0 0 1,0 0 0,0 1-1,-1-1 1,1 0-1,0 0 1,0 0 0,0 0-1,-1 0 1,1 0 0,0 0-1,0 0 1,-1 0 0,1 0-1,0 0 1,0 0-1,-1 0-33,-15-4 658,-35-22-480,-14-6 101,37 28-166,0 1 1,-1 1 0,0 2 0,1 0 0,-20 4-114,35 0 17,-1-1 0,1 2 0,0 0 0,0 0 0,0 1 0,1 1 0,0 0 0,0 1 0,1 0 0,0 1 0,0 0 0,1 1 0,-7 7-17,14-13 2,0 0-1,1 0 0,-1 0 1,1 1-1,0-1 1,0 0-1,0 1 0,1 0 1,0-1-1,0 1 0,0 0 1,0-1-1,1 3-1,2 63 154,-1-68-143,-1 0 0,1 1 0,-1-1-1,1 0 1,0 0 0,0 0-1,0 0 1,0 0 0,0 0-1,0 0 1,0 0 0,1 0 0,-1-1-1,1 1 1,0 0 0,-1-1-1,1 0 1,0 1 0,1 0-11,2 1 6,0-1 0,0 1 0,1-1 1,-1-1-1,0 1 0,1 0 0,-1-1 0,3 0-6,16 1 15,0-1-1,-1 0 0,20-4-14,-35 3 25,11-4-97,0 0 1,0-1 0,-1 0-1,0-2 1,0 0 0,-1-1-1,13-8 72,-4 3-641,-23 12 331,1-1 0,0 0 0,-1-1-1,1 1 1,-1-1 0,0 1 0,1-1-1,-1 0 1,-1 0 0,1 0 0,0-1-1,-1 1 1,0-1 0,0 1 0,0-1-1,1-1 311,8-44-7456,-10 16-528</inkml:trace>
+</inkml:ink>
+</file>
+
+<file path=ppt/ink/ink4.xml><?xml version="1.0" encoding="utf-8"?>
+<inkml:ink xmlns:inkml="http://www.w3.org/2003/InkML">
+  <inkml:definitions>
+    <inkml:context xml:id="ctx0">
+      <inkml:inkSource xml:id="inkSrc0">
+        <inkml:traceFormat>
+          <inkml:channel name="X" type="integer" min="-2.14748E9" max="2.14748E9" units="cm"/>
+          <inkml:channel name="Y" type="integer" min="-2.14748E9" max="2.14748E9" units="cm"/>
+          <inkml:channel name="F" type="integer" max="32767" units="dev"/>
+        </inkml:traceFormat>
+        <inkml:channelProperties>
+          <inkml:channelProperty channel="X" name="resolution" value="1000" units="1/cm"/>
+          <inkml:channelProperty channel="Y" name="resolution" value="1000" units="1/cm"/>
+          <inkml:channelProperty channel="F" name="resolution" value="0" units="1/dev"/>
+        </inkml:channelProperties>
+      </inkml:inkSource>
+      <inkml:timestamp xml:id="ts0" timeString="2020-10-16T16:14:02.642"/>
+    </inkml:context>
+    <inkml:brush xml:id="br0">
+      <inkml:brushProperty name="width" value="0.1" units="cm"/>
+      <inkml:brushProperty name="height" value="0.1" units="cm"/>
+      <inkml:brushProperty name="color" value="#66CC00"/>
+    </inkml:brush>
+  </inkml:definitions>
+  <inkml:trace contextRef="#ctx0" brushRef="#br0">21 0 7922,'0'0'2568,"0"0"-511,0 0-17,0 0-784,0 0-15,-20 173-33,20-132-304,0-7-336,0-11-144,0-11-152,0-6-184,0-6-88,0 0-640,0 0-1056,0-12-1169,0 0-2848</inkml:trace>
+</inkml:ink>
+</file>
+
+<file path=ppt/ink/ink5.xml><?xml version="1.0" encoding="utf-8"?>
+<inkml:ink xmlns:inkml="http://www.w3.org/2003/InkML">
+  <inkml:definitions>
+    <inkml:context xml:id="ctx0">
+      <inkml:inkSource xml:id="inkSrc0">
+        <inkml:traceFormat>
+          <inkml:channel name="X" type="integer" min="-2.14748E9" max="2.14748E9" units="cm"/>
+          <inkml:channel name="Y" type="integer" min="-2.14748E9" max="2.14748E9" units="cm"/>
+          <inkml:channel name="F" type="integer" max="32767" units="dev"/>
+        </inkml:traceFormat>
+        <inkml:channelProperties>
+          <inkml:channelProperty channel="X" name="resolution" value="1000" units="1/cm"/>
+          <inkml:channelProperty channel="Y" name="resolution" value="1000" units="1/cm"/>
+          <inkml:channelProperty channel="F" name="resolution" value="0" units="1/dev"/>
+        </inkml:channelProperties>
+      </inkml:inkSource>
+      <inkml:timestamp xml:id="ts0" timeString="2020-10-16T16:14:02.986"/>
+    </inkml:context>
+    <inkml:brush xml:id="br0">
+      <inkml:brushProperty name="width" value="0.1" units="cm"/>
+      <inkml:brushProperty name="height" value="0.1" units="cm"/>
+      <inkml:brushProperty name="color" value="#66CC00"/>
+    </inkml:brush>
+  </inkml:definitions>
+  <inkml:trace contextRef="#ctx0" brushRef="#br0">1 0 9498,'0'0'4329,"0"0"-3001,0 0-23,0 0-1305,0 0-121,0 0-2359,0 0-4217</inkml:trace>
+</inkml:ink>
+</file>
+
+<file path=ppt/ink/ink6.xml><?xml version="1.0" encoding="utf-8"?>
+<inkml:ink xmlns:inkml="http://www.w3.org/2003/InkML">
+  <inkml:definitions>
+    <inkml:context xml:id="ctx0">
+      <inkml:inkSource xml:id="inkSrc0">
+        <inkml:traceFormat>
+          <inkml:channel name="X" type="integer" min="-2.14748E9" max="2.14748E9" units="cm"/>
+          <inkml:channel name="Y" type="integer" min="-2.14748E9" max="2.14748E9" units="cm"/>
+          <inkml:channel name="F" type="integer" max="32767" units="dev"/>
+        </inkml:traceFormat>
+        <inkml:channelProperties>
+          <inkml:channelProperty channel="X" name="resolution" value="1000" units="1/cm"/>
+          <inkml:channelProperty channel="Y" name="resolution" value="1000" units="1/cm"/>
+          <inkml:channelProperty channel="F" name="resolution" value="0" units="1/dev"/>
+        </inkml:channelProperties>
+      </inkml:inkSource>
+      <inkml:timestamp xml:id="ts0" timeString="2020-10-16T16:14:03.731"/>
+    </inkml:context>
+    <inkml:brush xml:id="br0">
+      <inkml:brushProperty name="width" value="0.1" units="cm"/>
+      <inkml:brushProperty name="height" value="0.1" units="cm"/>
+      <inkml:brushProperty name="color" value="#66CC00"/>
+    </inkml:brush>
+  </inkml:definitions>
+  <inkml:trace contextRef="#ctx0" brushRef="#br0">0 1 7154,'0'0'2023,"0"0"-276,0 0-318,0 0-335,0 0-71,0 0-56,0 0-31,0 0 24,0 25 1363,0 49-760,3-1 0,4 1 0,10 43-1563,-16-106 80,-1-11-63,0 1 0,0-1 0,0 1 0,0-1 0,0 1 0,0-1 0,0 1 0,1-1-1,-1 1 1,0-1 0,0 1 0,0 0 0,1-1 0,-1 0 0,0 1 0,0-1 0,1 1 0,-1-1 0,0 1 0,1-1 0,-1 0 0,1 1-1,-1-1 1,1 0 0,-1 1 0,1-1 0,-1 0 0,0 1 0,1-1 0,0 0 0,-1 0 0,1 0 0,-1 0 0,1 1 0,-1-1 0,1 0 0,-1 0-1,1 0 1,-1 0 0,1 0 0,0 0 0,-1 0 0,1-1 0,-1 1 0,1 0 0,-1 0 0,1 0 0,-1-1 0,1 1-17,0 0 21,-1 0-10,16-19-13,-7 0-9,0 1 0,1 1 0,1-1-1,1 2 1,8-11 11,71-74-42,-83 91 32,1 0 0,0 1 1,1 0-1,0 1 0,0 0 0,0 1 1,1 0-1,1 1 0,-1 0 1,1 0-1,0 1 0,0 1 1,0 0-1,1 1 0,-1 0 0,1 1 1,0 0-1,1 1 10,-3 0-15,1 1 0,0 0 0,-1 0 1,1 2-1,-1-1 0,0 1 0,1 1 0,-1 0 0,0 1 0,6 2 15,-11-3 15,0 1 1,0-1-1,0 1 0,-1 0 0,0 1 0,0-1 0,0 1 1,0 0-1,-1 0 0,1 0 0,-1 1 0,-1 0 0,1 0 0,-1 0 1,0 0-1,0 0 0,-1 0 0,2 7-15,1 11 111,-1 0 1,-2 1-1,0-1 0,-2 0 0,0 1 1,-2 3-112,0 32 123,3-32-66,0-17-38,-1 0-1,1 0 0,-2 0 1,0 0-1,0-1 0,-1 1 0,0 0 1,-1 0-1,0-1 0,0 0 1,-3 4-19,5-12 30,1-2-158,-36 0-2459,35 0 2455,-1 0-1,1-1 1,-1 1 0,0 0-1,1-1 1,-1 0-1,1 1 1,-1-1 0,1 0-1,-1 0 1,1 1 0,0-1-1,-1 0 1,1 0 0,0-1-1,0 1 1,0 0-1,-1 0 1,1-1 0,1 1-1,-1 0 1,0-1 0,0 1-1,0-1 1,1 1 0,-1-2 132,-11-45-5420,11 25 606</inkml:trace>
+</inkml:ink>
+</file>
+
+<file path=ppt/ink/ink7.xml><?xml version="1.0" encoding="utf-8"?>
+<inkml:ink xmlns:inkml="http://www.w3.org/2003/InkML">
+  <inkml:definitions>
+    <inkml:context xml:id="ctx0">
+      <inkml:inkSource xml:id="inkSrc0">
+        <inkml:traceFormat>
+          <inkml:channel name="X" type="integer" min="-2.14748E9" max="2.14748E9" units="cm"/>
+          <inkml:channel name="Y" type="integer" min="-2.14748E9" max="2.14748E9" units="cm"/>
+          <inkml:channel name="F" type="integer" max="32767" units="dev"/>
+        </inkml:traceFormat>
+        <inkml:channelProperties>
+          <inkml:channelProperty channel="X" name="resolution" value="1000" units="1/cm"/>
+          <inkml:channelProperty channel="Y" name="resolution" value="1000" units="1/cm"/>
+          <inkml:channelProperty channel="F" name="resolution" value="0" units="1/dev"/>
+        </inkml:channelProperties>
+      </inkml:inkSource>
+      <inkml:timestamp xml:id="ts0" timeString="2020-10-16T16:13:45.762"/>
+    </inkml:context>
+    <inkml:brush xml:id="br0">
+      <inkml:brushProperty name="width" value="0.1" units="cm"/>
+      <inkml:brushProperty name="height" value="0.1" units="cm"/>
+      <inkml:brushProperty name="color" value="#FF0066"/>
+    </inkml:brush>
+  </inkml:definitions>
+  <inkml:trace contextRef="#ctx0" brushRef="#br0">3009 1 5369,'0'0'1897,"0"0"-293,0 0-205,0 0-52,0 0-122,0 0-124,-8 3-153,-157 47 5276,-25 0-6224,77-23 779,-251 68 837,248-59-1310,4-2 794,-63 10-1100,75-23 556,0 4 1,-20 12-557,39-12 376,-18 2-376,28-5 121,44-13-27,0-1 1,-24 4-95,7-3 99,1 2 0,0 2 1,-20 10-100,15-5 94,-70 21 199,39-14-34,2 3 1,-44 24-260,120-51 6,-5 2 10,1-1 1,0 1-1,-1-1 1,1 0-1,-1 0 1,0-1-1,-2 1-16,7-2 14,1 0 4,-27 11 165,-40 7 65,35-8-594,27-9 309,1 0 1,0 0-1,0 0 1,0 1-1,0-1 0,0 1 1,1 0-1,-1 0 1,0 0-1,-1 2 37,-43 19-197,44-20 169,0 0 0,0-1 0,-1 0 0,1 1 0,-1-1 0,0-1 0,0 1 0,-4 0 28,5-1-22,-1 1-1,0-1 1,0 1 0,1 0-1,-1 0 1,1 1-1,0-1 1,-3 3 22,-5-1-10,-5 3-12,-2 0 30,4-3-10,13-3 1,-1-1 1,1 1-1,-1 0 1,1-1 0,-1 1-1,1 0 1,0 1-1,-1-1 1,1 0-1,0 1 1,0-1 0,0 1-1,0 0 1,0 0 0,6-8-3301,27-29 334,4 1-1674,5-6-1942</inkml:trace>
+</inkml:ink>
+</file>
+
+<file path=ppt/ink/ink8.xml><?xml version="1.0" encoding="utf-8"?>
+<inkml:ink xmlns:inkml="http://www.w3.org/2003/InkML">
+  <inkml:definitions>
+    <inkml:context xml:id="ctx0">
+      <inkml:inkSource xml:id="inkSrc0">
+        <inkml:traceFormat>
+          <inkml:channel name="X" type="integer" min="-2.14748E9" max="2.14748E9" units="cm"/>
+          <inkml:channel name="Y" type="integer" min="-2.14748E9" max="2.14748E9" units="cm"/>
+          <inkml:channel name="F" type="integer" max="32767" units="dev"/>
+        </inkml:traceFormat>
+        <inkml:channelProperties>
+          <inkml:channelProperty channel="X" name="resolution" value="1000" units="1/cm"/>
+          <inkml:channelProperty channel="Y" name="resolution" value="1000" units="1/cm"/>
+          <inkml:channelProperty channel="F" name="resolution" value="0" units="1/dev"/>
+        </inkml:channelProperties>
+      </inkml:inkSource>
+      <inkml:timestamp xml:id="ts0" timeString="2020-10-16T16:14:00.935"/>
+    </inkml:context>
+    <inkml:brush xml:id="br0">
+      <inkml:brushProperty name="width" value="0.1" units="cm"/>
+      <inkml:brushProperty name="height" value="0.1" units="cm"/>
+      <inkml:brushProperty name="color" value="#66CC00"/>
+    </inkml:brush>
+  </inkml:definitions>
+  <inkml:trace contextRef="#ctx0" brushRef="#br0">3 10 4585,'0'0'1872,"0"0"-91,0 0-66,0 0-274,0 0-282,0-9 1617,-1 83-731,0-25-1380,1 0 1,2 1 0,3-1-1,2-1 1,2 1-666,9 28 629,2 8 369,3-1 1,12 24-999,-29-215 1291,-6 57-1256,2 0 0,3 0 0,2-4-35,-4 34-1,2 1 1,0 0-1,1 0 0,1 1 0,1-1 1,0 1-1,2 1 0,0 0 0,3-3 1,-9 15-9,0 0 0,1 0-1,-1 1 1,1 0 0,0 0 0,0 0-1,1 0 1,-1 1 0,1 0-1,-1 0 1,1 1 0,0-1-1,0 1 1,1 0 0,-1 1 0,5-1 9,8-1-21,0 2 0,0 0 0,0 1 0,0 0 0,2 2 21,-15-1-7,0 1 0,0-1 0,0 1 0,-1 0 0,1 1 0,0 0 0,-1-1 0,0 2 0,1-1 0,-1 1 0,-1-1 0,1 1 0,-1 1 0,1-1 0,-1 1 0,0-1 1,-1 1-1,1 1 0,-1-1 0,0 0 0,0 1 0,-1-1 0,2 6 7,5 11 16,-1 0 0,-1 1 0,-1 0 0,-2 0 0,2 17-16,-1 28 74,-3 64-74,-2-86 154,0-45-143,0-1 2,0 0-4,0 0-1,0 0 8,0 0 26,0 0-10,0-24 50,1-1-61,1 0-1,2 0 1,0 1-1,2-1 1,0 1-1,10-21-20,4-6-3,3 1 1,18-29 2,-36 70-7,0 1 1,0-1-1,1 1 0,0 0 1,0 1-1,1 0 1,0 0-1,1 0 1,2-2 6,-6 7-8,-1 0 0,0 0 1,1 0-1,-1 1 0,1 0 0,-1-1 1,1 1-1,0 0 0,0 1 1,0-1-1,-1 1 0,1-1 1,0 1-1,0 0 0,0 1 1,0-1-1,-1 1 0,1-1 1,0 1-1,0 1 0,-1-1 1,1 0-1,-1 1 0,1-1 1,-1 1-1,3 2 8,16 9-6,-2 0-1,0 1 1,0 1 0,-2 1-1,1 1 1,7 10 6,-18-18 3,0 1 0,-1 0 0,-1 1 1,1 0-1,-2 0 0,1 0 0,-1 1 0,-1-1 1,0 1-1,-1 0 0,0 0 0,-1 1 0,-1-1 1,1 3-4,0 3 39,-1 0 1,0-1-1,-1 1 1,-1 0-1,-1 0 1,-1 0-1,0 0 1,-1-1-1,-1 1 1,-1-1-1,0 0 1,-1-1-1,-7 12-39,-28 27 180,25-34-101,14-15-98,3-5-181,0-1-247,0 0-352,0-21-3161,0-56-4281,0 37 2901</inkml:trace>
+</inkml:ink>
+</file>
+
+<file path=ppt/ink/ink9.xml><?xml version="1.0" encoding="utf-8"?>
+<inkml:ink xmlns:inkml="http://www.w3.org/2003/InkML">
+  <inkml:definitions>
+    <inkml:context xml:id="ctx0">
+      <inkml:inkSource xml:id="inkSrc0">
+        <inkml:traceFormat>
+          <inkml:channel name="X" type="integer" min="-2.14748E9" max="2.14748E9" units="cm"/>
+          <inkml:channel name="Y" type="integer" min="-2.14748E9" max="2.14748E9" units="cm"/>
+          <inkml:channel name="F" type="integer" max="32767" units="dev"/>
+        </inkml:traceFormat>
+        <inkml:channelProperties>
+          <inkml:channelProperty channel="X" name="resolution" value="1000" units="1/cm"/>
+          <inkml:channelProperty channel="Y" name="resolution" value="1000" units="1/cm"/>
+          <inkml:channelProperty channel="F" name="resolution" value="0" units="1/dev"/>
+        </inkml:channelProperties>
+      </inkml:inkSource>
+      <inkml:timestamp xml:id="ts0" timeString="2020-10-16T16:14:02.022"/>
+    </inkml:context>
+    <inkml:brush xml:id="br0">
+      <inkml:brushProperty name="width" value="0.1" units="cm"/>
+      <inkml:brushProperty name="height" value="0.1" units="cm"/>
+      <inkml:brushProperty name="color" value="#66CC00"/>
+    </inkml:brush>
+  </inkml:definitions>
+  <inkml:trace contextRef="#ctx0" brushRef="#br0">70 113 5393,'0'0'2426,"0"0"-702,0 0-223,0 0-209,0 0-246,0 0-74,7-13-3,-2 2-676,-4 7-214,1 0 0,-1 0-1,1 1 1,0-1 0,0 0-1,0 1 1,1 0 0,-1-1 0,1 1-1,0 0 1,0 0 0,0 0-1,0 1 1,0-1 0,0 1 0,1-1-1,-1 1 1,1 0 0,0 1-1,2-2-78,19-4 466,0 1 0,1 2 0,-1 0 0,1 1 0,0 2 0,0 1 0,-1 0 0,8 3-466,-27-1 36,1 0 0,-1 0 1,0 0-1,1 1 1,-1 0-1,-1 0 0,1 0 1,0 1-1,-1 0 0,0 0 1,0 0-1,0 1 0,0 0 1,-1 0-1,1 0 0,-1 0 1,-1 1-1,1-1 0,-1 1 1,0 0-1,0 0 0,0 2-36,4 7 57,-1 1 0,0-1 0,-1 1 0,-1 0 0,-1 0 0,0 1 0,-1-1 0,0 10-57,-2-26 33,0 1 1,0-1 0,0 0-1,0 0 1,0 1 0,0-1-1,0 0 1,0 0-1,0 0 1,0 1 0,0-1-1,0 0 1,0 0 0,0 1-1,-1-1 1,1 0 0,0 0-1,0 0 1,0 1-1,0-1 1,-1 0 0,1 0-1,0 0 1,0 0 0,0 1-1,-1-1 1,1 0-1,0 0 1,0 0 0,0 0-1,-1 0 1,1 0 0,0 0-1,0 0 1,-1 0 0,1 0-1,0 0 1,0 0-1,-1 0-33,-15-4 658,-35-22-480,-14-6 101,37 28-166,0 1 1,-1 1 0,0 2 0,1 0 0,-20 4-114,35 0 17,-1-1 0,1 2 0,0 0 0,0 0 0,0 1 0,1 1 0,0 0 0,0 1 0,1 0 0,0 1 0,0 0 0,1 1 0,-7 7-17,14-13 2,0 0-1,1 0 0,-1 0 1,1 1-1,0-1 1,0 0-1,0 1 0,1 0 1,0-1-1,0 1 0,0 0 1,0-1-1,1 3-1,2 63 154,-1-68-143,-1 0 0,1 1 0,-1-1-1,1 0 1,0 0 0,0 0-1,0 0 1,0 0 0,0 0-1,0 0 1,0 0 0,1 0 0,-1-1-1,1 1 1,0 0 0,-1-1-1,1 0 1,0 1 0,1 0-11,2 1 6,0-1 0,0 1 0,1-1 1,-1-1-1,0 1 0,1 0 0,-1-1 0,3 0-6,16 1 15,0-1-1,-1 0 0,20-4-14,-35 3 25,11-4-97,0 0 1,0-1 0,-1 0-1,0-2 1,0 0 0,-1-1-1,13-8 72,-4 3-641,-23 12 331,1-1 0,0 0 0,-1-1-1,1 1 1,-1-1 0,0 1 0,1-1-1,-1 0 1,-1 0 0,1 0 0,0-1-1,-1 1 1,0-1 0,0 1 0,0-1-1,1-1 311,8-44-7456,-10 16-528</inkml:trace>
+</inkml:ink>
 </file>
 
 <file path=ppt/slideLayouts/slideLayout1.xml><?xml version="1.0" encoding="utf-8"?>
@@ -6219,47 +6725,577 @@
             </a:r>
             <a:r>
               <a:rPr lang="en-US" dirty="0"/>
-              <a:t>: Merge/Conflict</a:t>
-            </a:r>
-            <a:endParaRPr lang="es-419" dirty="0"/>
-          </a:p>
-        </p:txBody>
-      </p:sp>
-      <p:sp>
-        <p:nvSpPr>
-          <p:cNvPr id="3" name="Content Placeholder 2">
+              <a:t>: </a:t>
+            </a:r>
+            <a:r>
+              <a:rPr lang="en-US" dirty="0">
+                <a:solidFill>
+                  <a:srgbClr val="FFC000"/>
+                </a:solidFill>
+              </a:rPr>
+              <a:t>Branch</a:t>
+            </a:r>
+            <a:endParaRPr lang="es-419" dirty="0">
+              <a:solidFill>
+                <a:srgbClr val="FFC000"/>
+              </a:solidFill>
+            </a:endParaRPr>
+          </a:p>
+        </p:txBody>
+      </p:sp>
+      <p:sp>
+        <p:nvSpPr>
+          <p:cNvPr id="3" name="TextBox 5">
             <a:extLst>
               <a:ext uri="{FF2B5EF4-FFF2-40B4-BE49-F238E27FC236}">
-                <a16:creationId xmlns:a16="http://schemas.microsoft.com/office/drawing/2014/main" id="{4C8A22F4-750C-4E9A-B539-BC08DBA1AC78}"/>
+                <a16:creationId xmlns:a16="http://schemas.microsoft.com/office/drawing/2014/main" id="{A2403F36-6DD4-4B7D-B0D6-78464E57E76E}"/>
               </a:ext>
             </a:extLst>
           </p:cNvPr>
-          <p:cNvSpPr>
-            <a:spLocks noGrp="1"/>
-          </p:cNvSpPr>
-          <p:nvPr>
-            <p:ph idx="1"/>
-          </p:nvPr>
-        </p:nvSpPr>
-        <p:spPr/>
-        <p:txBody>
-          <a:bodyPr/>
-          <a:lstStyle/>
-          <a:p>
-            <a:pPr marL="0" indent="0">
-              <a:buNone/>
-            </a:pPr>
-            <a:r>
-              <a:rPr lang="es-419" dirty="0"/>
+          <p:cNvSpPr txBox="1"/>
+          <p:nvPr/>
+        </p:nvSpPr>
+        <p:spPr>
+          <a:xfrm>
+            <a:off x="1804887" y="2049555"/>
+            <a:ext cx="8571577" cy="369332"/>
+          </a:xfrm>
+          <a:prstGeom prst="rect">
+            <a:avLst/>
+          </a:prstGeom>
+          <a:noFill/>
+        </p:spPr>
+        <p:txBody>
+          <a:bodyPr wrap="none" rtlCol="0">
+            <a:spAutoFit/>
+          </a:bodyPr>
+          <a:lstStyle>
+            <a:defPPr>
+              <a:defRPr lang="en-US"/>
+            </a:defPPr>
+            <a:lvl1pPr marL="0" algn="l" defTabSz="457200" rtl="0" eaLnBrk="1" latinLnBrk="0" hangingPunct="1">
+              <a:defRPr sz="1800" kern="1200">
+                <a:solidFill>
+                  <a:schemeClr val="tx1"/>
+                </a:solidFill>
+                <a:latin typeface="+mn-lt"/>
+                <a:ea typeface="+mn-ea"/>
+                <a:cs typeface="+mn-cs"/>
+              </a:defRPr>
+            </a:lvl1pPr>
+            <a:lvl2pPr marL="457200" algn="l" defTabSz="457200" rtl="0" eaLnBrk="1" latinLnBrk="0" hangingPunct="1">
+              <a:defRPr sz="1800" kern="1200">
+                <a:solidFill>
+                  <a:schemeClr val="tx1"/>
+                </a:solidFill>
+                <a:latin typeface="+mn-lt"/>
+                <a:ea typeface="+mn-ea"/>
+                <a:cs typeface="+mn-cs"/>
+              </a:defRPr>
+            </a:lvl2pPr>
+            <a:lvl3pPr marL="914400" algn="l" defTabSz="457200" rtl="0" eaLnBrk="1" latinLnBrk="0" hangingPunct="1">
+              <a:defRPr sz="1800" kern="1200">
+                <a:solidFill>
+                  <a:schemeClr val="tx1"/>
+                </a:solidFill>
+                <a:latin typeface="+mn-lt"/>
+                <a:ea typeface="+mn-ea"/>
+                <a:cs typeface="+mn-cs"/>
+              </a:defRPr>
+            </a:lvl3pPr>
+            <a:lvl4pPr marL="1371600" algn="l" defTabSz="457200" rtl="0" eaLnBrk="1" latinLnBrk="0" hangingPunct="1">
+              <a:defRPr sz="1800" kern="1200">
+                <a:solidFill>
+                  <a:schemeClr val="tx1"/>
+                </a:solidFill>
+                <a:latin typeface="+mn-lt"/>
+                <a:ea typeface="+mn-ea"/>
+                <a:cs typeface="+mn-cs"/>
+              </a:defRPr>
+            </a:lvl4pPr>
+            <a:lvl5pPr marL="1828800" algn="l" defTabSz="457200" rtl="0" eaLnBrk="1" latinLnBrk="0" hangingPunct="1">
+              <a:defRPr sz="1800" kern="1200">
+                <a:solidFill>
+                  <a:schemeClr val="tx1"/>
+                </a:solidFill>
+                <a:latin typeface="+mn-lt"/>
+                <a:ea typeface="+mn-ea"/>
+                <a:cs typeface="+mn-cs"/>
+              </a:defRPr>
+            </a:lvl5pPr>
+            <a:lvl6pPr marL="2286000" algn="l" defTabSz="457200" rtl="0" eaLnBrk="1" latinLnBrk="0" hangingPunct="1">
+              <a:defRPr sz="1800" kern="1200">
+                <a:solidFill>
+                  <a:schemeClr val="tx1"/>
+                </a:solidFill>
+                <a:latin typeface="+mn-lt"/>
+                <a:ea typeface="+mn-ea"/>
+                <a:cs typeface="+mn-cs"/>
+              </a:defRPr>
+            </a:lvl6pPr>
+            <a:lvl7pPr marL="2743200" algn="l" defTabSz="457200" rtl="0" eaLnBrk="1" latinLnBrk="0" hangingPunct="1">
+              <a:defRPr sz="1800" kern="1200">
+                <a:solidFill>
+                  <a:schemeClr val="tx1"/>
+                </a:solidFill>
+                <a:latin typeface="+mn-lt"/>
+                <a:ea typeface="+mn-ea"/>
+                <a:cs typeface="+mn-cs"/>
+              </a:defRPr>
+            </a:lvl7pPr>
+            <a:lvl8pPr marL="3200400" algn="l" defTabSz="457200" rtl="0" eaLnBrk="1" latinLnBrk="0" hangingPunct="1">
+              <a:defRPr sz="1800" kern="1200">
+                <a:solidFill>
+                  <a:schemeClr val="tx1"/>
+                </a:solidFill>
+                <a:latin typeface="+mn-lt"/>
+                <a:ea typeface="+mn-ea"/>
+                <a:cs typeface="+mn-cs"/>
+              </a:defRPr>
+            </a:lvl8pPr>
+            <a:lvl9pPr marL="3657600" algn="l" defTabSz="457200" rtl="0" eaLnBrk="1" latinLnBrk="0" hangingPunct="1">
+              <a:defRPr sz="1800" kern="1200">
+                <a:solidFill>
+                  <a:schemeClr val="tx1"/>
+                </a:solidFill>
+                <a:latin typeface="+mn-lt"/>
+                <a:ea typeface="+mn-ea"/>
+                <a:cs typeface="+mn-cs"/>
+              </a:defRPr>
+            </a:lvl9pPr>
+          </a:lstStyle>
+          <a:p>
+            <a:r>
+              <a:rPr lang="en-US" dirty="0"/>
+              <a:t>El c</a:t>
+            </a:r>
+            <a:r>
+              <a:rPr lang="es-419" dirty="0" err="1"/>
+              <a:t>ó</a:t>
+            </a:r>
+            <a:r>
+              <a:rPr lang="en-US" dirty="0" err="1"/>
+              <a:t>digo</a:t>
+            </a:r>
+            <a:r>
+              <a:rPr lang="en-US" dirty="0"/>
               <a:t> </a:t>
             </a:r>
-          </a:p>
-        </p:txBody>
-      </p:sp>
+            <a:r>
+              <a:rPr lang="en-US" dirty="0" err="1"/>
+              <a:t>en</a:t>
+            </a:r>
+            <a:r>
+              <a:rPr lang="en-US" dirty="0"/>
+              <a:t> branches </a:t>
+            </a:r>
+            <a:r>
+              <a:rPr lang="en-US" dirty="0" err="1"/>
+              <a:t>distintas</a:t>
+            </a:r>
+            <a:r>
+              <a:rPr lang="en-US" dirty="0"/>
+              <a:t> es </a:t>
+            </a:r>
+            <a:r>
+              <a:rPr lang="en-US" dirty="0" err="1"/>
+              <a:t>distinto</a:t>
+            </a:r>
+            <a:r>
+              <a:rPr lang="en-US" dirty="0"/>
+              <a:t> </a:t>
+            </a:r>
+            <a:r>
+              <a:rPr lang="en-US" dirty="0" err="1"/>
+              <a:t>mientras</a:t>
+            </a:r>
+            <a:r>
+              <a:rPr lang="en-US" dirty="0"/>
+              <a:t> las branches </a:t>
+            </a:r>
+            <a:r>
+              <a:rPr lang="en-US" dirty="0" err="1"/>
+              <a:t>esten</a:t>
+            </a:r>
+            <a:r>
+              <a:rPr lang="en-US" dirty="0"/>
+              <a:t> </a:t>
+            </a:r>
+            <a:r>
+              <a:rPr lang="en-US" dirty="0" err="1"/>
+              <a:t>separadas</a:t>
+            </a:r>
+            <a:endParaRPr lang="es-419" dirty="0"/>
+          </a:p>
+        </p:txBody>
+      </p:sp>
+      <p:pic>
+        <p:nvPicPr>
+          <p:cNvPr id="5" name="Picture 4" descr="Diagram, schematic&#10;&#10;Description automatically generated">
+            <a:extLst>
+              <a:ext uri="{FF2B5EF4-FFF2-40B4-BE49-F238E27FC236}">
+                <a16:creationId xmlns:a16="http://schemas.microsoft.com/office/drawing/2014/main" id="{54645C1F-B4E5-4DF2-B194-A7E6B9FA947F}"/>
+              </a:ext>
+            </a:extLst>
+          </p:cNvPr>
+          <p:cNvPicPr>
+            <a:picLocks noChangeAspect="1"/>
+          </p:cNvPicPr>
+          <p:nvPr/>
+        </p:nvPicPr>
+        <p:blipFill>
+          <a:blip r:embed="rId2">
+            <a:extLst>
+              <a:ext uri="{28A0092B-C50C-407E-A947-70E740481C1C}">
+                <a14:useLocalDpi xmlns:a14="http://schemas.microsoft.com/office/drawing/2010/main" val="0"/>
+              </a:ext>
+            </a:extLst>
+          </a:blip>
+          <a:stretch>
+            <a:fillRect/>
+          </a:stretch>
+        </p:blipFill>
+        <p:spPr>
+          <a:xfrm>
+            <a:off x="2400514" y="2702733"/>
+            <a:ext cx="7390971" cy="3787109"/>
+          </a:xfrm>
+          <a:prstGeom prst="rect">
+            <a:avLst/>
+          </a:prstGeom>
+        </p:spPr>
+      </p:pic>
+      <mc:AlternateContent xmlns:mc="http://schemas.openxmlformats.org/markup-compatibility/2006">
+        <mc:Choice xmlns:p14="http://schemas.microsoft.com/office/powerpoint/2010/main" Requires="p14">
+          <p:contentPart p14:bwMode="auto" r:id="rId3">
+            <p14:nvContentPartPr>
+              <p14:cNvPr id="6" name="Ink 5">
+                <a:extLst>
+                  <a:ext uri="{FF2B5EF4-FFF2-40B4-BE49-F238E27FC236}">
+                    <a16:creationId xmlns:a16="http://schemas.microsoft.com/office/drawing/2014/main" id="{960E235B-FB1E-4BEB-9D27-3C9C1DCA0971}"/>
+                  </a:ext>
+                </a:extLst>
+              </p14:cNvPr>
+              <p14:cNvContentPartPr/>
+              <p14:nvPr/>
+            </p14:nvContentPartPr>
+            <p14:xfrm>
+              <a:off x="2480562" y="5010330"/>
+              <a:ext cx="1083240" cy="332280"/>
+            </p14:xfrm>
+          </p:contentPart>
+        </mc:Choice>
+        <mc:Fallback>
+          <p:pic>
+            <p:nvPicPr>
+              <p:cNvPr id="6" name="Ink 5">
+                <a:extLst>
+                  <a:ext uri="{FF2B5EF4-FFF2-40B4-BE49-F238E27FC236}">
+                    <a16:creationId xmlns:a16="http://schemas.microsoft.com/office/drawing/2014/main" id="{960E235B-FB1E-4BEB-9D27-3C9C1DCA0971}"/>
+                  </a:ext>
+                </a:extLst>
+              </p:cNvPr>
+              <p:cNvPicPr/>
+              <p:nvPr/>
+            </p:nvPicPr>
+            <p:blipFill>
+              <a:blip r:embed="rId4"/>
+              <a:stretch>
+                <a:fillRect/>
+              </a:stretch>
+            </p:blipFill>
+            <p:spPr>
+              <a:xfrm>
+                <a:off x="2462922" y="4992690"/>
+                <a:ext cx="1118880" cy="367920"/>
+              </a:xfrm>
+              <a:prstGeom prst="rect">
+                <a:avLst/>
+              </a:prstGeom>
+            </p:spPr>
+          </p:pic>
+        </mc:Fallback>
+      </mc:AlternateContent>
+      <p:grpSp>
+        <p:nvGrpSpPr>
+          <p:cNvPr id="18" name="Group 17">
+            <a:extLst>
+              <a:ext uri="{FF2B5EF4-FFF2-40B4-BE49-F238E27FC236}">
+                <a16:creationId xmlns:a16="http://schemas.microsoft.com/office/drawing/2014/main" id="{5F35DFA2-5B0E-407E-9BC0-502768FCAACC}"/>
+              </a:ext>
+            </a:extLst>
+          </p:cNvPr>
+          <p:cNvGrpSpPr/>
+          <p:nvPr/>
+        </p:nvGrpSpPr>
+        <p:grpSpPr>
+          <a:xfrm>
+            <a:off x="2536722" y="5458890"/>
+            <a:ext cx="1112400" cy="307440"/>
+            <a:chOff x="2536722" y="5458890"/>
+            <a:chExt cx="1112400" cy="307440"/>
+          </a:xfrm>
+        </p:grpSpPr>
+        <mc:AlternateContent xmlns:mc="http://schemas.openxmlformats.org/markup-compatibility/2006">
+          <mc:Choice xmlns:p14="http://schemas.microsoft.com/office/powerpoint/2010/main" Requires="p14">
+            <p:contentPart p14:bwMode="auto" r:id="rId5">
+              <p14:nvContentPartPr>
+                <p14:cNvPr id="13" name="Ink 12">
+                  <a:extLst>
+                    <a:ext uri="{FF2B5EF4-FFF2-40B4-BE49-F238E27FC236}">
+                      <a16:creationId xmlns:a16="http://schemas.microsoft.com/office/drawing/2014/main" id="{1FCB7FDE-1666-4349-848E-2BD9D7B4B21A}"/>
+                    </a:ext>
+                  </a:extLst>
+                </p14:cNvPr>
+                <p14:cNvContentPartPr/>
+                <p14:nvPr/>
+              </p14:nvContentPartPr>
+              <p14:xfrm>
+                <a:off x="2536722" y="5465730"/>
+                <a:ext cx="393480" cy="292320"/>
+              </p14:xfrm>
+            </p:contentPart>
+          </mc:Choice>
+          <mc:Fallback>
+            <p:pic>
+              <p:nvPicPr>
+                <p:cNvPr id="13" name="Ink 12">
+                  <a:extLst>
+                    <a:ext uri="{FF2B5EF4-FFF2-40B4-BE49-F238E27FC236}">
+                      <a16:creationId xmlns:a16="http://schemas.microsoft.com/office/drawing/2014/main" id="{1FCB7FDE-1666-4349-848E-2BD9D7B4B21A}"/>
+                    </a:ext>
+                  </a:extLst>
+                </p:cNvPr>
+                <p:cNvPicPr/>
+                <p:nvPr/>
+              </p:nvPicPr>
+              <p:blipFill>
+                <a:blip r:embed="rId6"/>
+                <a:stretch>
+                  <a:fillRect/>
+                </a:stretch>
+              </p:blipFill>
+              <p:spPr>
+                <a:xfrm>
+                  <a:off x="2519082" y="5448090"/>
+                  <a:ext cx="429120" cy="327960"/>
+                </a:xfrm>
+                <a:prstGeom prst="rect">
+                  <a:avLst/>
+                </a:prstGeom>
+              </p:spPr>
+            </p:pic>
+          </mc:Fallback>
+        </mc:AlternateContent>
+        <mc:AlternateContent xmlns:mc="http://schemas.openxmlformats.org/markup-compatibility/2006">
+          <mc:Choice xmlns:p14="http://schemas.microsoft.com/office/powerpoint/2010/main" Requires="p14">
+            <p:contentPart p14:bwMode="auto" r:id="rId7">
+              <p14:nvContentPartPr>
+                <p14:cNvPr id="14" name="Ink 13">
+                  <a:extLst>
+                    <a:ext uri="{FF2B5EF4-FFF2-40B4-BE49-F238E27FC236}">
+                      <a16:creationId xmlns:a16="http://schemas.microsoft.com/office/drawing/2014/main" id="{B8343A6A-5B07-4A48-9F3C-54BD2317D8B0}"/>
+                    </a:ext>
+                  </a:extLst>
+                </p14:cNvPr>
+                <p14:cNvContentPartPr/>
+                <p14:nvPr/>
+              </p14:nvContentPartPr>
+              <p14:xfrm>
+                <a:off x="2997162" y="5540970"/>
+                <a:ext cx="190440" cy="176400"/>
+              </p14:xfrm>
+            </p:contentPart>
+          </mc:Choice>
+          <mc:Fallback>
+            <p:pic>
+              <p:nvPicPr>
+                <p:cNvPr id="14" name="Ink 13">
+                  <a:extLst>
+                    <a:ext uri="{FF2B5EF4-FFF2-40B4-BE49-F238E27FC236}">
+                      <a16:creationId xmlns:a16="http://schemas.microsoft.com/office/drawing/2014/main" id="{B8343A6A-5B07-4A48-9F3C-54BD2317D8B0}"/>
+                    </a:ext>
+                  </a:extLst>
+                </p:cNvPr>
+                <p:cNvPicPr/>
+                <p:nvPr/>
+              </p:nvPicPr>
+              <p:blipFill>
+                <a:blip r:embed="rId8"/>
+                <a:stretch>
+                  <a:fillRect/>
+                </a:stretch>
+              </p:blipFill>
+              <p:spPr>
+                <a:xfrm>
+                  <a:off x="2979522" y="5523330"/>
+                  <a:ext cx="226080" cy="212040"/>
+                </a:xfrm>
+                <a:prstGeom prst="rect">
+                  <a:avLst/>
+                </a:prstGeom>
+              </p:spPr>
+            </p:pic>
+          </mc:Fallback>
+        </mc:AlternateContent>
+        <mc:AlternateContent xmlns:mc="http://schemas.openxmlformats.org/markup-compatibility/2006">
+          <mc:Choice xmlns:p14="http://schemas.microsoft.com/office/powerpoint/2010/main" Requires="p14">
+            <p:contentPart p14:bwMode="auto" r:id="rId9">
+              <p14:nvContentPartPr>
+                <p14:cNvPr id="15" name="Ink 14">
+                  <a:extLst>
+                    <a:ext uri="{FF2B5EF4-FFF2-40B4-BE49-F238E27FC236}">
+                      <a16:creationId xmlns:a16="http://schemas.microsoft.com/office/drawing/2014/main" id="{136A3443-3B6D-4F26-9161-4F40A7F31E85}"/>
+                    </a:ext>
+                  </a:extLst>
+                </p14:cNvPr>
+                <p14:cNvContentPartPr/>
+                <p14:nvPr/>
+              </p14:nvContentPartPr>
+              <p14:xfrm>
+                <a:off x="3285522" y="5596050"/>
+                <a:ext cx="7920" cy="104040"/>
+              </p14:xfrm>
+            </p:contentPart>
+          </mc:Choice>
+          <mc:Fallback>
+            <p:pic>
+              <p:nvPicPr>
+                <p:cNvPr id="15" name="Ink 14">
+                  <a:extLst>
+                    <a:ext uri="{FF2B5EF4-FFF2-40B4-BE49-F238E27FC236}">
+                      <a16:creationId xmlns:a16="http://schemas.microsoft.com/office/drawing/2014/main" id="{136A3443-3B6D-4F26-9161-4F40A7F31E85}"/>
+                    </a:ext>
+                  </a:extLst>
+                </p:cNvPr>
+                <p:cNvPicPr/>
+                <p:nvPr/>
+              </p:nvPicPr>
+              <p:blipFill>
+                <a:blip r:embed="rId10"/>
+                <a:stretch>
+                  <a:fillRect/>
+                </a:stretch>
+              </p:blipFill>
+              <p:spPr>
+                <a:xfrm>
+                  <a:off x="3267882" y="5578050"/>
+                  <a:ext cx="43560" cy="139680"/>
+                </a:xfrm>
+                <a:prstGeom prst="rect">
+                  <a:avLst/>
+                </a:prstGeom>
+              </p:spPr>
+            </p:pic>
+          </mc:Fallback>
+        </mc:AlternateContent>
+        <mc:AlternateContent xmlns:mc="http://schemas.openxmlformats.org/markup-compatibility/2006">
+          <mc:Choice xmlns:p14="http://schemas.microsoft.com/office/powerpoint/2010/main" Requires="p14">
+            <p:contentPart p14:bwMode="auto" r:id="rId11">
+              <p14:nvContentPartPr>
+                <p14:cNvPr id="16" name="Ink 15">
+                  <a:extLst>
+                    <a:ext uri="{FF2B5EF4-FFF2-40B4-BE49-F238E27FC236}">
+                      <a16:creationId xmlns:a16="http://schemas.microsoft.com/office/drawing/2014/main" id="{6DEF45CF-D74F-4EE7-A36B-BF064F0E01BF}"/>
+                    </a:ext>
+                  </a:extLst>
+                </p14:cNvPr>
+                <p14:cNvContentPartPr/>
+                <p14:nvPr/>
+              </p14:nvContentPartPr>
+              <p14:xfrm>
+                <a:off x="3295242" y="5458890"/>
+                <a:ext cx="360" cy="360"/>
+              </p14:xfrm>
+            </p:contentPart>
+          </mc:Choice>
+          <mc:Fallback>
+            <p:pic>
+              <p:nvPicPr>
+                <p:cNvPr id="16" name="Ink 15">
+                  <a:extLst>
+                    <a:ext uri="{FF2B5EF4-FFF2-40B4-BE49-F238E27FC236}">
+                      <a16:creationId xmlns:a16="http://schemas.microsoft.com/office/drawing/2014/main" id="{6DEF45CF-D74F-4EE7-A36B-BF064F0E01BF}"/>
+                    </a:ext>
+                  </a:extLst>
+                </p:cNvPr>
+                <p:cNvPicPr/>
+                <p:nvPr/>
+              </p:nvPicPr>
+              <p:blipFill>
+                <a:blip r:embed="rId12"/>
+                <a:stretch>
+                  <a:fillRect/>
+                </a:stretch>
+              </p:blipFill>
+              <p:spPr>
+                <a:xfrm>
+                  <a:off x="3277602" y="5440890"/>
+                  <a:ext cx="36000" cy="36000"/>
+                </a:xfrm>
+                <a:prstGeom prst="rect">
+                  <a:avLst/>
+                </a:prstGeom>
+              </p:spPr>
+            </p:pic>
+          </mc:Fallback>
+        </mc:AlternateContent>
+        <mc:AlternateContent xmlns:mc="http://schemas.openxmlformats.org/markup-compatibility/2006">
+          <mc:Choice xmlns:p14="http://schemas.microsoft.com/office/powerpoint/2010/main" Requires="p14">
+            <p:contentPart p14:bwMode="auto" r:id="rId13">
+              <p14:nvContentPartPr>
+                <p14:cNvPr id="17" name="Ink 16">
+                  <a:extLst>
+                    <a:ext uri="{FF2B5EF4-FFF2-40B4-BE49-F238E27FC236}">
+                      <a16:creationId xmlns:a16="http://schemas.microsoft.com/office/drawing/2014/main" id="{E05D6009-D2FC-4F04-BE26-E531DEA735DA}"/>
+                    </a:ext>
+                  </a:extLst>
+                </p14:cNvPr>
+                <p14:cNvContentPartPr/>
+                <p14:nvPr/>
+              </p14:nvContentPartPr>
+              <p14:xfrm>
+                <a:off x="3408642" y="5564730"/>
+                <a:ext cx="240480" cy="201600"/>
+              </p14:xfrm>
+            </p:contentPart>
+          </mc:Choice>
+          <mc:Fallback>
+            <p:pic>
+              <p:nvPicPr>
+                <p:cNvPr id="17" name="Ink 16">
+                  <a:extLst>
+                    <a:ext uri="{FF2B5EF4-FFF2-40B4-BE49-F238E27FC236}">
+                      <a16:creationId xmlns:a16="http://schemas.microsoft.com/office/drawing/2014/main" id="{E05D6009-D2FC-4F04-BE26-E531DEA735DA}"/>
+                    </a:ext>
+                  </a:extLst>
+                </p:cNvPr>
+                <p:cNvPicPr/>
+                <p:nvPr/>
+              </p:nvPicPr>
+              <p:blipFill>
+                <a:blip r:embed="rId14"/>
+                <a:stretch>
+                  <a:fillRect/>
+                </a:stretch>
+              </p:blipFill>
+              <p:spPr>
+                <a:xfrm>
+                  <a:off x="3390642" y="5547090"/>
+                  <a:ext cx="276120" cy="237240"/>
+                </a:xfrm>
+                <a:prstGeom prst="rect">
+                  <a:avLst/>
+                </a:prstGeom>
+              </p:spPr>
+            </p:pic>
+          </mc:Fallback>
+        </mc:AlternateContent>
+      </p:grpSp>
     </p:spTree>
     <p:extLst>
       <p:ext uri="{BB962C8B-B14F-4D97-AF65-F5344CB8AC3E}">
-        <p14:creationId xmlns:p14="http://schemas.microsoft.com/office/powerpoint/2010/main" val="1882495817"/>
+        <p14:creationId xmlns:p14="http://schemas.microsoft.com/office/powerpoint/2010/main" val="4089834529"/>
       </p:ext>
     </p:extLst>
   </p:cSld>
@@ -6313,47 +7349,605 @@
             </a:r>
             <a:r>
               <a:rPr lang="en-US" dirty="0"/>
-              <a:t>: Merge/Conflict</a:t>
-            </a:r>
-            <a:endParaRPr lang="es-419" dirty="0"/>
-          </a:p>
-        </p:txBody>
-      </p:sp>
-      <p:sp>
-        <p:nvSpPr>
-          <p:cNvPr id="3" name="Content Placeholder 2">
+              <a:t>: </a:t>
+            </a:r>
+            <a:r>
+              <a:rPr lang="en-US" dirty="0">
+                <a:solidFill>
+                  <a:srgbClr val="FFC000"/>
+                </a:solidFill>
+              </a:rPr>
+              <a:t>Branch</a:t>
+            </a:r>
+            <a:endParaRPr lang="es-419" dirty="0">
+              <a:solidFill>
+                <a:srgbClr val="FFC000"/>
+              </a:solidFill>
+            </a:endParaRPr>
+          </a:p>
+        </p:txBody>
+      </p:sp>
+      <p:sp>
+        <p:nvSpPr>
+          <p:cNvPr id="3" name="TextBox 5">
             <a:extLst>
               <a:ext uri="{FF2B5EF4-FFF2-40B4-BE49-F238E27FC236}">
-                <a16:creationId xmlns:a16="http://schemas.microsoft.com/office/drawing/2014/main" id="{4C8A22F4-750C-4E9A-B539-BC08DBA1AC78}"/>
+                <a16:creationId xmlns:a16="http://schemas.microsoft.com/office/drawing/2014/main" id="{A2403F36-6DD4-4B7D-B0D6-78464E57E76E}"/>
               </a:ext>
             </a:extLst>
           </p:cNvPr>
-          <p:cNvSpPr>
-            <a:spLocks noGrp="1"/>
-          </p:cNvSpPr>
-          <p:nvPr>
-            <p:ph idx="1"/>
-          </p:nvPr>
-        </p:nvSpPr>
-        <p:spPr/>
-        <p:txBody>
-          <a:bodyPr/>
-          <a:lstStyle/>
-          <a:p>
-            <a:pPr marL="0" indent="0">
-              <a:buNone/>
-            </a:pPr>
-            <a:r>
-              <a:rPr lang="es-419" dirty="0"/>
+          <p:cNvSpPr txBox="1"/>
+          <p:nvPr/>
+        </p:nvSpPr>
+        <p:spPr>
+          <a:xfrm>
+            <a:off x="1804887" y="2049555"/>
+            <a:ext cx="9655207" cy="369332"/>
+          </a:xfrm>
+          <a:prstGeom prst="rect">
+            <a:avLst/>
+          </a:prstGeom>
+          <a:noFill/>
+        </p:spPr>
+        <p:txBody>
+          <a:bodyPr wrap="none" rtlCol="0">
+            <a:spAutoFit/>
+          </a:bodyPr>
+          <a:lstStyle>
+            <a:defPPr>
+              <a:defRPr lang="en-US"/>
+            </a:defPPr>
+            <a:lvl1pPr marL="0" algn="l" defTabSz="457200" rtl="0" eaLnBrk="1" latinLnBrk="0" hangingPunct="1">
+              <a:defRPr sz="1800" kern="1200">
+                <a:solidFill>
+                  <a:schemeClr val="tx1"/>
+                </a:solidFill>
+                <a:latin typeface="+mn-lt"/>
+                <a:ea typeface="+mn-ea"/>
+                <a:cs typeface="+mn-cs"/>
+              </a:defRPr>
+            </a:lvl1pPr>
+            <a:lvl2pPr marL="457200" algn="l" defTabSz="457200" rtl="0" eaLnBrk="1" latinLnBrk="0" hangingPunct="1">
+              <a:defRPr sz="1800" kern="1200">
+                <a:solidFill>
+                  <a:schemeClr val="tx1"/>
+                </a:solidFill>
+                <a:latin typeface="+mn-lt"/>
+                <a:ea typeface="+mn-ea"/>
+                <a:cs typeface="+mn-cs"/>
+              </a:defRPr>
+            </a:lvl2pPr>
+            <a:lvl3pPr marL="914400" algn="l" defTabSz="457200" rtl="0" eaLnBrk="1" latinLnBrk="0" hangingPunct="1">
+              <a:defRPr sz="1800" kern="1200">
+                <a:solidFill>
+                  <a:schemeClr val="tx1"/>
+                </a:solidFill>
+                <a:latin typeface="+mn-lt"/>
+                <a:ea typeface="+mn-ea"/>
+                <a:cs typeface="+mn-cs"/>
+              </a:defRPr>
+            </a:lvl3pPr>
+            <a:lvl4pPr marL="1371600" algn="l" defTabSz="457200" rtl="0" eaLnBrk="1" latinLnBrk="0" hangingPunct="1">
+              <a:defRPr sz="1800" kern="1200">
+                <a:solidFill>
+                  <a:schemeClr val="tx1"/>
+                </a:solidFill>
+                <a:latin typeface="+mn-lt"/>
+                <a:ea typeface="+mn-ea"/>
+                <a:cs typeface="+mn-cs"/>
+              </a:defRPr>
+            </a:lvl4pPr>
+            <a:lvl5pPr marL="1828800" algn="l" defTabSz="457200" rtl="0" eaLnBrk="1" latinLnBrk="0" hangingPunct="1">
+              <a:defRPr sz="1800" kern="1200">
+                <a:solidFill>
+                  <a:schemeClr val="tx1"/>
+                </a:solidFill>
+                <a:latin typeface="+mn-lt"/>
+                <a:ea typeface="+mn-ea"/>
+                <a:cs typeface="+mn-cs"/>
+              </a:defRPr>
+            </a:lvl5pPr>
+            <a:lvl6pPr marL="2286000" algn="l" defTabSz="457200" rtl="0" eaLnBrk="1" latinLnBrk="0" hangingPunct="1">
+              <a:defRPr sz="1800" kern="1200">
+                <a:solidFill>
+                  <a:schemeClr val="tx1"/>
+                </a:solidFill>
+                <a:latin typeface="+mn-lt"/>
+                <a:ea typeface="+mn-ea"/>
+                <a:cs typeface="+mn-cs"/>
+              </a:defRPr>
+            </a:lvl6pPr>
+            <a:lvl7pPr marL="2743200" algn="l" defTabSz="457200" rtl="0" eaLnBrk="1" latinLnBrk="0" hangingPunct="1">
+              <a:defRPr sz="1800" kern="1200">
+                <a:solidFill>
+                  <a:schemeClr val="tx1"/>
+                </a:solidFill>
+                <a:latin typeface="+mn-lt"/>
+                <a:ea typeface="+mn-ea"/>
+                <a:cs typeface="+mn-cs"/>
+              </a:defRPr>
+            </a:lvl7pPr>
+            <a:lvl8pPr marL="3200400" algn="l" defTabSz="457200" rtl="0" eaLnBrk="1" latinLnBrk="0" hangingPunct="1">
+              <a:defRPr sz="1800" kern="1200">
+                <a:solidFill>
+                  <a:schemeClr val="tx1"/>
+                </a:solidFill>
+                <a:latin typeface="+mn-lt"/>
+                <a:ea typeface="+mn-ea"/>
+                <a:cs typeface="+mn-cs"/>
+              </a:defRPr>
+            </a:lvl8pPr>
+            <a:lvl9pPr marL="3657600" algn="l" defTabSz="457200" rtl="0" eaLnBrk="1" latinLnBrk="0" hangingPunct="1">
+              <a:defRPr sz="1800" kern="1200">
+                <a:solidFill>
+                  <a:schemeClr val="tx1"/>
+                </a:solidFill>
+                <a:latin typeface="+mn-lt"/>
+                <a:ea typeface="+mn-ea"/>
+                <a:cs typeface="+mn-cs"/>
+              </a:defRPr>
+            </a:lvl9pPr>
+          </a:lstStyle>
+          <a:p>
+            <a:r>
+              <a:rPr lang="en-US" dirty="0"/>
+              <a:t>El c</a:t>
+            </a:r>
+            <a:r>
+              <a:rPr lang="es-419" dirty="0" err="1"/>
+              <a:t>ó</a:t>
+            </a:r>
+            <a:r>
+              <a:rPr lang="en-US" dirty="0" err="1"/>
+              <a:t>digo</a:t>
+            </a:r>
+            <a:r>
+              <a:rPr lang="en-US" dirty="0"/>
               <a:t> </a:t>
             </a:r>
-          </a:p>
-        </p:txBody>
-      </p:sp>
+            <a:r>
+              <a:rPr lang="en-US" dirty="0" err="1"/>
+              <a:t>en</a:t>
+            </a:r>
+            <a:r>
+              <a:rPr lang="en-US" dirty="0"/>
+              <a:t> branches </a:t>
+            </a:r>
+            <a:r>
+              <a:rPr lang="en-US" dirty="0" err="1"/>
+              <a:t>distintas</a:t>
+            </a:r>
+            <a:r>
+              <a:rPr lang="en-US" dirty="0"/>
+              <a:t> </a:t>
+            </a:r>
+            <a:r>
+              <a:rPr lang="en-US" dirty="0">
+                <a:solidFill>
+                  <a:srgbClr val="FFC000"/>
+                </a:solidFill>
+              </a:rPr>
+              <a:t>no interact</a:t>
+            </a:r>
+            <a:r>
+              <a:rPr lang="es-419" dirty="0">
+                <a:solidFill>
+                  <a:srgbClr val="FFC000"/>
+                </a:solidFill>
+              </a:rPr>
+              <a:t>ú</a:t>
+            </a:r>
+            <a:r>
+              <a:rPr lang="en-US" dirty="0">
+                <a:solidFill>
+                  <a:srgbClr val="FFC000"/>
+                </a:solidFill>
+              </a:rPr>
+              <a:t>a </a:t>
+            </a:r>
+            <a:r>
+              <a:rPr lang="en-US" dirty="0"/>
+              <a:t>con </a:t>
+            </a:r>
+            <a:r>
+              <a:rPr lang="en-US" dirty="0" err="1"/>
+              <a:t>otras</a:t>
+            </a:r>
+            <a:r>
+              <a:rPr lang="en-US" dirty="0"/>
+              <a:t> branches </a:t>
+            </a:r>
+            <a:r>
+              <a:rPr lang="en-US" dirty="0" err="1"/>
+              <a:t>mientras</a:t>
+            </a:r>
+            <a:r>
+              <a:rPr lang="en-US" dirty="0"/>
+              <a:t> </a:t>
+            </a:r>
+            <a:r>
+              <a:rPr lang="en-US" dirty="0" err="1"/>
+              <a:t>estén</a:t>
+            </a:r>
+            <a:r>
+              <a:rPr lang="en-US" dirty="0"/>
+              <a:t> </a:t>
+            </a:r>
+            <a:r>
+              <a:rPr lang="en-US" dirty="0" err="1"/>
+              <a:t>separadas</a:t>
+            </a:r>
+            <a:endParaRPr lang="es-419" dirty="0"/>
+          </a:p>
+        </p:txBody>
+      </p:sp>
+      <p:pic>
+        <p:nvPicPr>
+          <p:cNvPr id="5" name="Picture 4" descr="Diagram, schematic&#10;&#10;Description automatically generated">
+            <a:extLst>
+              <a:ext uri="{FF2B5EF4-FFF2-40B4-BE49-F238E27FC236}">
+                <a16:creationId xmlns:a16="http://schemas.microsoft.com/office/drawing/2014/main" id="{54645C1F-B4E5-4DF2-B194-A7E6B9FA947F}"/>
+              </a:ext>
+            </a:extLst>
+          </p:cNvPr>
+          <p:cNvPicPr>
+            <a:picLocks noChangeAspect="1"/>
+          </p:cNvPicPr>
+          <p:nvPr/>
+        </p:nvPicPr>
+        <p:blipFill>
+          <a:blip r:embed="rId2">
+            <a:extLst>
+              <a:ext uri="{28A0092B-C50C-407E-A947-70E740481C1C}">
+                <a14:useLocalDpi xmlns:a14="http://schemas.microsoft.com/office/drawing/2010/main" val="0"/>
+              </a:ext>
+            </a:extLst>
+          </a:blip>
+          <a:stretch>
+            <a:fillRect/>
+          </a:stretch>
+        </p:blipFill>
+        <p:spPr>
+          <a:xfrm>
+            <a:off x="2400514" y="2702733"/>
+            <a:ext cx="7390971" cy="3787109"/>
+          </a:xfrm>
+          <a:prstGeom prst="rect">
+            <a:avLst/>
+          </a:prstGeom>
+        </p:spPr>
+      </p:pic>
+      <mc:AlternateContent xmlns:mc="http://schemas.openxmlformats.org/markup-compatibility/2006">
+        <mc:Choice xmlns:p14="http://schemas.microsoft.com/office/powerpoint/2010/main" Requires="p14">
+          <p:contentPart p14:bwMode="auto" r:id="rId3">
+            <p14:nvContentPartPr>
+              <p14:cNvPr id="6" name="Ink 5">
+                <a:extLst>
+                  <a:ext uri="{FF2B5EF4-FFF2-40B4-BE49-F238E27FC236}">
+                    <a16:creationId xmlns:a16="http://schemas.microsoft.com/office/drawing/2014/main" id="{960E235B-FB1E-4BEB-9D27-3C9C1DCA0971}"/>
+                  </a:ext>
+                </a:extLst>
+              </p14:cNvPr>
+              <p14:cNvContentPartPr/>
+              <p14:nvPr/>
+            </p14:nvContentPartPr>
+            <p14:xfrm>
+              <a:off x="2480562" y="5010330"/>
+              <a:ext cx="1083240" cy="332280"/>
+            </p14:xfrm>
+          </p:contentPart>
+        </mc:Choice>
+        <mc:Fallback>
+          <p:pic>
+            <p:nvPicPr>
+              <p:cNvPr id="6" name="Ink 5">
+                <a:extLst>
+                  <a:ext uri="{FF2B5EF4-FFF2-40B4-BE49-F238E27FC236}">
+                    <a16:creationId xmlns:a16="http://schemas.microsoft.com/office/drawing/2014/main" id="{960E235B-FB1E-4BEB-9D27-3C9C1DCA0971}"/>
+                  </a:ext>
+                </a:extLst>
+              </p:cNvPr>
+              <p:cNvPicPr/>
+              <p:nvPr/>
+            </p:nvPicPr>
+            <p:blipFill>
+              <a:blip r:embed="rId4"/>
+              <a:stretch>
+                <a:fillRect/>
+              </a:stretch>
+            </p:blipFill>
+            <p:spPr>
+              <a:xfrm>
+                <a:off x="2462922" y="4992690"/>
+                <a:ext cx="1118880" cy="367920"/>
+              </a:xfrm>
+              <a:prstGeom prst="rect">
+                <a:avLst/>
+              </a:prstGeom>
+            </p:spPr>
+          </p:pic>
+        </mc:Fallback>
+      </mc:AlternateContent>
+      <p:grpSp>
+        <p:nvGrpSpPr>
+          <p:cNvPr id="18" name="Group 17">
+            <a:extLst>
+              <a:ext uri="{FF2B5EF4-FFF2-40B4-BE49-F238E27FC236}">
+                <a16:creationId xmlns:a16="http://schemas.microsoft.com/office/drawing/2014/main" id="{5F35DFA2-5B0E-407E-9BC0-502768FCAACC}"/>
+              </a:ext>
+            </a:extLst>
+          </p:cNvPr>
+          <p:cNvGrpSpPr/>
+          <p:nvPr/>
+        </p:nvGrpSpPr>
+        <p:grpSpPr>
+          <a:xfrm>
+            <a:off x="2536722" y="5458890"/>
+            <a:ext cx="1112400" cy="307440"/>
+            <a:chOff x="2536722" y="5458890"/>
+            <a:chExt cx="1112400" cy="307440"/>
+          </a:xfrm>
+        </p:grpSpPr>
+        <mc:AlternateContent xmlns:mc="http://schemas.openxmlformats.org/markup-compatibility/2006">
+          <mc:Choice xmlns:p14="http://schemas.microsoft.com/office/powerpoint/2010/main" Requires="p14">
+            <p:contentPart p14:bwMode="auto" r:id="rId5">
+              <p14:nvContentPartPr>
+                <p14:cNvPr id="13" name="Ink 12">
+                  <a:extLst>
+                    <a:ext uri="{FF2B5EF4-FFF2-40B4-BE49-F238E27FC236}">
+                      <a16:creationId xmlns:a16="http://schemas.microsoft.com/office/drawing/2014/main" id="{1FCB7FDE-1666-4349-848E-2BD9D7B4B21A}"/>
+                    </a:ext>
+                  </a:extLst>
+                </p14:cNvPr>
+                <p14:cNvContentPartPr/>
+                <p14:nvPr/>
+              </p14:nvContentPartPr>
+              <p14:xfrm>
+                <a:off x="2536722" y="5465730"/>
+                <a:ext cx="393480" cy="292320"/>
+              </p14:xfrm>
+            </p:contentPart>
+          </mc:Choice>
+          <mc:Fallback>
+            <p:pic>
+              <p:nvPicPr>
+                <p:cNvPr id="13" name="Ink 12">
+                  <a:extLst>
+                    <a:ext uri="{FF2B5EF4-FFF2-40B4-BE49-F238E27FC236}">
+                      <a16:creationId xmlns:a16="http://schemas.microsoft.com/office/drawing/2014/main" id="{1FCB7FDE-1666-4349-848E-2BD9D7B4B21A}"/>
+                    </a:ext>
+                  </a:extLst>
+                </p:cNvPr>
+                <p:cNvPicPr/>
+                <p:nvPr/>
+              </p:nvPicPr>
+              <p:blipFill>
+                <a:blip r:embed="rId6"/>
+                <a:stretch>
+                  <a:fillRect/>
+                </a:stretch>
+              </p:blipFill>
+              <p:spPr>
+                <a:xfrm>
+                  <a:off x="2519082" y="5448090"/>
+                  <a:ext cx="429120" cy="327960"/>
+                </a:xfrm>
+                <a:prstGeom prst="rect">
+                  <a:avLst/>
+                </a:prstGeom>
+              </p:spPr>
+            </p:pic>
+          </mc:Fallback>
+        </mc:AlternateContent>
+        <mc:AlternateContent xmlns:mc="http://schemas.openxmlformats.org/markup-compatibility/2006">
+          <mc:Choice xmlns:p14="http://schemas.microsoft.com/office/powerpoint/2010/main" Requires="p14">
+            <p:contentPart p14:bwMode="auto" r:id="rId7">
+              <p14:nvContentPartPr>
+                <p14:cNvPr id="14" name="Ink 13">
+                  <a:extLst>
+                    <a:ext uri="{FF2B5EF4-FFF2-40B4-BE49-F238E27FC236}">
+                      <a16:creationId xmlns:a16="http://schemas.microsoft.com/office/drawing/2014/main" id="{B8343A6A-5B07-4A48-9F3C-54BD2317D8B0}"/>
+                    </a:ext>
+                  </a:extLst>
+                </p14:cNvPr>
+                <p14:cNvContentPartPr/>
+                <p14:nvPr/>
+              </p14:nvContentPartPr>
+              <p14:xfrm>
+                <a:off x="2997162" y="5540970"/>
+                <a:ext cx="190440" cy="176400"/>
+              </p14:xfrm>
+            </p:contentPart>
+          </mc:Choice>
+          <mc:Fallback>
+            <p:pic>
+              <p:nvPicPr>
+                <p:cNvPr id="14" name="Ink 13">
+                  <a:extLst>
+                    <a:ext uri="{FF2B5EF4-FFF2-40B4-BE49-F238E27FC236}">
+                      <a16:creationId xmlns:a16="http://schemas.microsoft.com/office/drawing/2014/main" id="{B8343A6A-5B07-4A48-9F3C-54BD2317D8B0}"/>
+                    </a:ext>
+                  </a:extLst>
+                </p:cNvPr>
+                <p:cNvPicPr/>
+                <p:nvPr/>
+              </p:nvPicPr>
+              <p:blipFill>
+                <a:blip r:embed="rId8"/>
+                <a:stretch>
+                  <a:fillRect/>
+                </a:stretch>
+              </p:blipFill>
+              <p:spPr>
+                <a:xfrm>
+                  <a:off x="2979522" y="5523330"/>
+                  <a:ext cx="226080" cy="212040"/>
+                </a:xfrm>
+                <a:prstGeom prst="rect">
+                  <a:avLst/>
+                </a:prstGeom>
+              </p:spPr>
+            </p:pic>
+          </mc:Fallback>
+        </mc:AlternateContent>
+        <mc:AlternateContent xmlns:mc="http://schemas.openxmlformats.org/markup-compatibility/2006">
+          <mc:Choice xmlns:p14="http://schemas.microsoft.com/office/powerpoint/2010/main" Requires="p14">
+            <p:contentPart p14:bwMode="auto" r:id="rId9">
+              <p14:nvContentPartPr>
+                <p14:cNvPr id="15" name="Ink 14">
+                  <a:extLst>
+                    <a:ext uri="{FF2B5EF4-FFF2-40B4-BE49-F238E27FC236}">
+                      <a16:creationId xmlns:a16="http://schemas.microsoft.com/office/drawing/2014/main" id="{136A3443-3B6D-4F26-9161-4F40A7F31E85}"/>
+                    </a:ext>
+                  </a:extLst>
+                </p14:cNvPr>
+                <p14:cNvContentPartPr/>
+                <p14:nvPr/>
+              </p14:nvContentPartPr>
+              <p14:xfrm>
+                <a:off x="3285522" y="5596050"/>
+                <a:ext cx="7920" cy="104040"/>
+              </p14:xfrm>
+            </p:contentPart>
+          </mc:Choice>
+          <mc:Fallback>
+            <p:pic>
+              <p:nvPicPr>
+                <p:cNvPr id="15" name="Ink 14">
+                  <a:extLst>
+                    <a:ext uri="{FF2B5EF4-FFF2-40B4-BE49-F238E27FC236}">
+                      <a16:creationId xmlns:a16="http://schemas.microsoft.com/office/drawing/2014/main" id="{136A3443-3B6D-4F26-9161-4F40A7F31E85}"/>
+                    </a:ext>
+                  </a:extLst>
+                </p:cNvPr>
+                <p:cNvPicPr/>
+                <p:nvPr/>
+              </p:nvPicPr>
+              <p:blipFill>
+                <a:blip r:embed="rId10"/>
+                <a:stretch>
+                  <a:fillRect/>
+                </a:stretch>
+              </p:blipFill>
+              <p:spPr>
+                <a:xfrm>
+                  <a:off x="3267882" y="5578050"/>
+                  <a:ext cx="43560" cy="139680"/>
+                </a:xfrm>
+                <a:prstGeom prst="rect">
+                  <a:avLst/>
+                </a:prstGeom>
+              </p:spPr>
+            </p:pic>
+          </mc:Fallback>
+        </mc:AlternateContent>
+        <mc:AlternateContent xmlns:mc="http://schemas.openxmlformats.org/markup-compatibility/2006">
+          <mc:Choice xmlns:p14="http://schemas.microsoft.com/office/powerpoint/2010/main" Requires="p14">
+            <p:contentPart p14:bwMode="auto" r:id="rId11">
+              <p14:nvContentPartPr>
+                <p14:cNvPr id="16" name="Ink 15">
+                  <a:extLst>
+                    <a:ext uri="{FF2B5EF4-FFF2-40B4-BE49-F238E27FC236}">
+                      <a16:creationId xmlns:a16="http://schemas.microsoft.com/office/drawing/2014/main" id="{6DEF45CF-D74F-4EE7-A36B-BF064F0E01BF}"/>
+                    </a:ext>
+                  </a:extLst>
+                </p14:cNvPr>
+                <p14:cNvContentPartPr/>
+                <p14:nvPr/>
+              </p14:nvContentPartPr>
+              <p14:xfrm>
+                <a:off x="3295242" y="5458890"/>
+                <a:ext cx="360" cy="360"/>
+              </p14:xfrm>
+            </p:contentPart>
+          </mc:Choice>
+          <mc:Fallback>
+            <p:pic>
+              <p:nvPicPr>
+                <p:cNvPr id="16" name="Ink 15">
+                  <a:extLst>
+                    <a:ext uri="{FF2B5EF4-FFF2-40B4-BE49-F238E27FC236}">
+                      <a16:creationId xmlns:a16="http://schemas.microsoft.com/office/drawing/2014/main" id="{6DEF45CF-D74F-4EE7-A36B-BF064F0E01BF}"/>
+                    </a:ext>
+                  </a:extLst>
+                </p:cNvPr>
+                <p:cNvPicPr/>
+                <p:nvPr/>
+              </p:nvPicPr>
+              <p:blipFill>
+                <a:blip r:embed="rId12"/>
+                <a:stretch>
+                  <a:fillRect/>
+                </a:stretch>
+              </p:blipFill>
+              <p:spPr>
+                <a:xfrm>
+                  <a:off x="3277602" y="5440890"/>
+                  <a:ext cx="36000" cy="36000"/>
+                </a:xfrm>
+                <a:prstGeom prst="rect">
+                  <a:avLst/>
+                </a:prstGeom>
+              </p:spPr>
+            </p:pic>
+          </mc:Fallback>
+        </mc:AlternateContent>
+        <mc:AlternateContent xmlns:mc="http://schemas.openxmlformats.org/markup-compatibility/2006">
+          <mc:Choice xmlns:p14="http://schemas.microsoft.com/office/powerpoint/2010/main" Requires="p14">
+            <p:contentPart p14:bwMode="auto" r:id="rId13">
+              <p14:nvContentPartPr>
+                <p14:cNvPr id="17" name="Ink 16">
+                  <a:extLst>
+                    <a:ext uri="{FF2B5EF4-FFF2-40B4-BE49-F238E27FC236}">
+                      <a16:creationId xmlns:a16="http://schemas.microsoft.com/office/drawing/2014/main" id="{E05D6009-D2FC-4F04-BE26-E531DEA735DA}"/>
+                    </a:ext>
+                  </a:extLst>
+                </p14:cNvPr>
+                <p14:cNvContentPartPr/>
+                <p14:nvPr/>
+              </p14:nvContentPartPr>
+              <p14:xfrm>
+                <a:off x="3408642" y="5564730"/>
+                <a:ext cx="240480" cy="201600"/>
+              </p14:xfrm>
+            </p:contentPart>
+          </mc:Choice>
+          <mc:Fallback>
+            <p:pic>
+              <p:nvPicPr>
+                <p:cNvPr id="17" name="Ink 16">
+                  <a:extLst>
+                    <a:ext uri="{FF2B5EF4-FFF2-40B4-BE49-F238E27FC236}">
+                      <a16:creationId xmlns:a16="http://schemas.microsoft.com/office/drawing/2014/main" id="{E05D6009-D2FC-4F04-BE26-E531DEA735DA}"/>
+                    </a:ext>
+                  </a:extLst>
+                </p:cNvPr>
+                <p:cNvPicPr/>
+                <p:nvPr/>
+              </p:nvPicPr>
+              <p:blipFill>
+                <a:blip r:embed="rId14"/>
+                <a:stretch>
+                  <a:fillRect/>
+                </a:stretch>
+              </p:blipFill>
+              <p:spPr>
+                <a:xfrm>
+                  <a:off x="3390642" y="5547090"/>
+                  <a:ext cx="276120" cy="237240"/>
+                </a:xfrm>
+                <a:prstGeom prst="rect">
+                  <a:avLst/>
+                </a:prstGeom>
+              </p:spPr>
+            </p:pic>
+          </mc:Fallback>
+        </mc:AlternateContent>
+      </p:grpSp>
     </p:spTree>
     <p:extLst>
       <p:ext uri="{BB962C8B-B14F-4D97-AF65-F5344CB8AC3E}">
-        <p14:creationId xmlns:p14="http://schemas.microsoft.com/office/powerpoint/2010/main" val="2859493164"/>
+        <p14:creationId xmlns:p14="http://schemas.microsoft.com/office/powerpoint/2010/main" val="1248744835"/>
       </p:ext>
     </p:extLst>
   </p:cSld>
@@ -6402,16 +7996,12 @@
           <a:lstStyle/>
           <a:p>
             <a:r>
-              <a:rPr lang="en-US" dirty="0" err="1"/>
-              <a:t>Estructura</a:t>
+              <a:rPr lang="es-419" dirty="0"/>
+              <a:t>Conceptos clave</a:t>
             </a:r>
             <a:r>
               <a:rPr lang="en-US" dirty="0"/>
-              <a:t> de un </a:t>
-            </a:r>
-            <a:r>
-              <a:rPr lang="en-US" dirty="0" err="1"/>
-              <a:t>Repositorio</a:t>
+              <a:t>: Merge/Conflict</a:t>
             </a:r>
             <a:endParaRPr lang="es-419" dirty="0"/>
           </a:p>
@@ -6448,91 +8038,10 @@
           </a:p>
         </p:txBody>
       </p:sp>
-      <p:sp>
-        <p:nvSpPr>
-          <p:cNvPr id="4" name="TextBox 3">
-            <a:extLst>
-              <a:ext uri="{FF2B5EF4-FFF2-40B4-BE49-F238E27FC236}">
-                <a16:creationId xmlns:a16="http://schemas.microsoft.com/office/drawing/2014/main" id="{2DCECD34-2AA5-41A0-80E6-B33058206DCA}"/>
-              </a:ext>
-            </a:extLst>
-          </p:cNvPr>
-          <p:cNvSpPr txBox="1"/>
-          <p:nvPr/>
-        </p:nvSpPr>
-        <p:spPr>
-          <a:xfrm>
-            <a:off x="952901" y="2531444"/>
-            <a:ext cx="2470163" cy="1754326"/>
-          </a:xfrm>
-          <a:prstGeom prst="rect">
-            <a:avLst/>
-          </a:prstGeom>
-          <a:noFill/>
-        </p:spPr>
-        <p:txBody>
-          <a:bodyPr wrap="none" rtlCol="0">
-            <a:spAutoFit/>
-          </a:bodyPr>
-          <a:lstStyle/>
-          <a:p>
-            <a:pPr marL="285750" indent="-285750">
-              <a:buFontTx/>
-              <a:buChar char="-"/>
-            </a:pPr>
-            <a:r>
-              <a:rPr lang="en-US" dirty="0"/>
-              <a:t>Branches por </a:t>
-            </a:r>
-            <a:r>
-              <a:rPr lang="en-US" dirty="0" err="1"/>
-              <a:t>defecto</a:t>
-            </a:r>
-            <a:endParaRPr lang="en-US" dirty="0"/>
-          </a:p>
-          <a:p>
-            <a:pPr marL="285750" indent="-285750">
-              <a:buFontTx/>
-              <a:buChar char="-"/>
-            </a:pPr>
-            <a:r>
-              <a:rPr lang="en-US" dirty="0" err="1"/>
-              <a:t>Gitignore</a:t>
-            </a:r>
-            <a:endParaRPr lang="en-US" dirty="0"/>
-          </a:p>
-          <a:p>
-            <a:pPr marL="285750" indent="-285750">
-              <a:buFontTx/>
-              <a:buChar char="-"/>
-            </a:pPr>
-            <a:r>
-              <a:rPr lang="en-US" dirty="0"/>
-              <a:t>License</a:t>
-            </a:r>
-          </a:p>
-          <a:p>
-            <a:pPr marL="285750" indent="-285750">
-              <a:buFontTx/>
-              <a:buChar char="-"/>
-            </a:pPr>
-            <a:r>
-              <a:rPr lang="en-US" dirty="0"/>
-              <a:t>Readme</a:t>
-            </a:r>
-          </a:p>
-          <a:p>
-            <a:endParaRPr lang="en-US" dirty="0"/>
-          </a:p>
-          <a:p>
-            <a:endParaRPr lang="es-419" dirty="0"/>
-          </a:p>
-        </p:txBody>
-      </p:sp>
     </p:spTree>
     <p:extLst>
       <p:ext uri="{BB962C8B-B14F-4D97-AF65-F5344CB8AC3E}">
-        <p14:creationId xmlns:p14="http://schemas.microsoft.com/office/powerpoint/2010/main" val="4210234373"/>
+        <p14:creationId xmlns:p14="http://schemas.microsoft.com/office/powerpoint/2010/main" val="1882495817"/>
       </p:ext>
     </p:extLst>
   </p:cSld>
@@ -6581,12 +8090,12 @@
           <a:lstStyle/>
           <a:p>
             <a:r>
+              <a:rPr lang="es-419" dirty="0"/>
+              <a:t>Conceptos clave</a:t>
+            </a:r>
+            <a:r>
               <a:rPr lang="en-US" dirty="0"/>
-              <a:t>Git/Github/</a:t>
-            </a:r>
-            <a:r>
-              <a:rPr lang="en-US" dirty="0" err="1"/>
-              <a:t>GitKraken</a:t>
+              <a:t>: Merge/Conflict</a:t>
             </a:r>
             <a:endParaRPr lang="es-419" dirty="0"/>
           </a:p>
@@ -6626,7 +8135,7 @@
     </p:spTree>
     <p:extLst>
       <p:ext uri="{BB962C8B-B14F-4D97-AF65-F5344CB8AC3E}">
-        <p14:creationId xmlns:p14="http://schemas.microsoft.com/office/powerpoint/2010/main" val="4223982895"/>
+        <p14:creationId xmlns:p14="http://schemas.microsoft.com/office/powerpoint/2010/main" val="2859493164"/>
       </p:ext>
     </p:extLst>
   </p:cSld>
@@ -6676,11 +8185,15 @@
           <a:p>
             <a:r>
               <a:rPr lang="en-US" dirty="0" err="1"/>
-              <a:t>Esquema</a:t>
+              <a:t>Estructura</a:t>
             </a:r>
             <a:r>
               <a:rPr lang="en-US" dirty="0"/>
-              <a:t> de Branches</a:t>
+              <a:t> de un </a:t>
+            </a:r>
+            <a:r>
+              <a:rPr lang="en-US" dirty="0" err="1"/>
+              <a:t>Repositorio</a:t>
             </a:r>
             <a:endParaRPr lang="es-419" dirty="0"/>
           </a:p>
@@ -6717,10 +8230,91 @@
           </a:p>
         </p:txBody>
       </p:sp>
+      <p:sp>
+        <p:nvSpPr>
+          <p:cNvPr id="4" name="TextBox 3">
+            <a:extLst>
+              <a:ext uri="{FF2B5EF4-FFF2-40B4-BE49-F238E27FC236}">
+                <a16:creationId xmlns:a16="http://schemas.microsoft.com/office/drawing/2014/main" id="{2DCECD34-2AA5-41A0-80E6-B33058206DCA}"/>
+              </a:ext>
+            </a:extLst>
+          </p:cNvPr>
+          <p:cNvSpPr txBox="1"/>
+          <p:nvPr/>
+        </p:nvSpPr>
+        <p:spPr>
+          <a:xfrm>
+            <a:off x="952901" y="2531444"/>
+            <a:ext cx="2470163" cy="1754326"/>
+          </a:xfrm>
+          <a:prstGeom prst="rect">
+            <a:avLst/>
+          </a:prstGeom>
+          <a:noFill/>
+        </p:spPr>
+        <p:txBody>
+          <a:bodyPr wrap="none" rtlCol="0">
+            <a:spAutoFit/>
+          </a:bodyPr>
+          <a:lstStyle/>
+          <a:p>
+            <a:pPr marL="285750" indent="-285750">
+              <a:buFontTx/>
+              <a:buChar char="-"/>
+            </a:pPr>
+            <a:r>
+              <a:rPr lang="en-US" dirty="0"/>
+              <a:t>Branches por </a:t>
+            </a:r>
+            <a:r>
+              <a:rPr lang="en-US" dirty="0" err="1"/>
+              <a:t>defecto</a:t>
+            </a:r>
+            <a:endParaRPr lang="en-US" dirty="0"/>
+          </a:p>
+          <a:p>
+            <a:pPr marL="285750" indent="-285750">
+              <a:buFontTx/>
+              <a:buChar char="-"/>
+            </a:pPr>
+            <a:r>
+              <a:rPr lang="en-US" dirty="0" err="1"/>
+              <a:t>Gitignore</a:t>
+            </a:r>
+            <a:endParaRPr lang="en-US" dirty="0"/>
+          </a:p>
+          <a:p>
+            <a:pPr marL="285750" indent="-285750">
+              <a:buFontTx/>
+              <a:buChar char="-"/>
+            </a:pPr>
+            <a:r>
+              <a:rPr lang="en-US" dirty="0"/>
+              <a:t>License</a:t>
+            </a:r>
+          </a:p>
+          <a:p>
+            <a:pPr marL="285750" indent="-285750">
+              <a:buFontTx/>
+              <a:buChar char="-"/>
+            </a:pPr>
+            <a:r>
+              <a:rPr lang="en-US" dirty="0"/>
+              <a:t>Readme</a:t>
+            </a:r>
+          </a:p>
+          <a:p>
+            <a:endParaRPr lang="en-US" dirty="0"/>
+          </a:p>
+          <a:p>
+            <a:endParaRPr lang="es-419" dirty="0"/>
+          </a:p>
+        </p:txBody>
+      </p:sp>
     </p:spTree>
     <p:extLst>
       <p:ext uri="{BB962C8B-B14F-4D97-AF65-F5344CB8AC3E}">
-        <p14:creationId xmlns:p14="http://schemas.microsoft.com/office/powerpoint/2010/main" val="1981387030"/>
+        <p14:creationId xmlns:p14="http://schemas.microsoft.com/office/powerpoint/2010/main" val="4210234373"/>
       </p:ext>
     </p:extLst>
   </p:cSld>
@@ -6769,16 +8363,12 @@
           <a:lstStyle/>
           <a:p>
             <a:r>
+              <a:rPr lang="en-US" dirty="0"/>
+              <a:t>Git/Github/</a:t>
+            </a:r>
+            <a:r>
               <a:rPr lang="en-US" dirty="0" err="1"/>
-              <a:t>Comunicaci</a:t>
-            </a:r>
-            <a:r>
-              <a:rPr lang="es-419" dirty="0" err="1"/>
-              <a:t>ó</a:t>
-            </a:r>
-            <a:r>
-              <a:rPr lang="en-US" dirty="0"/>
-              <a:t>n</a:t>
+              <a:t>GitKraken</a:t>
             </a:r>
             <a:endParaRPr lang="es-419" dirty="0"/>
           </a:p>
@@ -6818,7 +8408,7 @@
     </p:spTree>
     <p:extLst>
       <p:ext uri="{BB962C8B-B14F-4D97-AF65-F5344CB8AC3E}">
-        <p14:creationId xmlns:p14="http://schemas.microsoft.com/office/powerpoint/2010/main" val="3740971148"/>
+        <p14:creationId xmlns:p14="http://schemas.microsoft.com/office/powerpoint/2010/main" val="4223982895"/>
       </p:ext>
     </p:extLst>
   </p:cSld>
@@ -6867,8 +8457,12 @@
           <a:lstStyle/>
           <a:p>
             <a:r>
+              <a:rPr lang="en-US" dirty="0" err="1"/>
+              <a:t>Esquema</a:t>
+            </a:r>
+            <a:r>
               <a:rPr lang="en-US" dirty="0"/>
-              <a:t>Trello/Boards</a:t>
+              <a:t> de Branches</a:t>
             </a:r>
             <a:endParaRPr lang="es-419" dirty="0"/>
           </a:p>
@@ -6908,7 +8502,7 @@
     </p:spTree>
     <p:extLst>
       <p:ext uri="{BB962C8B-B14F-4D97-AF65-F5344CB8AC3E}">
-        <p14:creationId xmlns:p14="http://schemas.microsoft.com/office/powerpoint/2010/main" val="3387504599"/>
+        <p14:creationId xmlns:p14="http://schemas.microsoft.com/office/powerpoint/2010/main" val="1981387030"/>
       </p:ext>
     </p:extLst>
   </p:cSld>
@@ -6957,12 +8551,16 @@
           <a:lstStyle/>
           <a:p>
             <a:r>
+              <a:rPr lang="en-US" dirty="0" err="1"/>
+              <a:t>Comunicaci</a:t>
+            </a:r>
+            <a:r>
+              <a:rPr lang="es-419" dirty="0" err="1"/>
+              <a:t>ó</a:t>
+            </a:r>
+            <a:r>
               <a:rPr lang="en-US" dirty="0"/>
-              <a:t>Conflicts: </a:t>
-            </a:r>
-            <a:r>
-              <a:rPr lang="en-US" dirty="0" err="1"/>
-              <a:t>Prevenir</a:t>
+              <a:t>n</a:t>
             </a:r>
             <a:endParaRPr lang="es-419" dirty="0"/>
           </a:p>
@@ -6999,70 +8597,10 @@
           </a:p>
         </p:txBody>
       </p:sp>
-      <p:sp>
-        <p:nvSpPr>
-          <p:cNvPr id="4" name="TextBox 3">
-            <a:extLst>
-              <a:ext uri="{FF2B5EF4-FFF2-40B4-BE49-F238E27FC236}">
-                <a16:creationId xmlns:a16="http://schemas.microsoft.com/office/drawing/2014/main" id="{D38FAB16-376C-468C-A3E6-F4486C832DE7}"/>
-              </a:ext>
-            </a:extLst>
-          </p:cNvPr>
-          <p:cNvSpPr txBox="1"/>
-          <p:nvPr/>
-        </p:nvSpPr>
-        <p:spPr>
-          <a:xfrm>
-            <a:off x="838200" y="3301465"/>
-            <a:ext cx="2910284" cy="1200329"/>
-          </a:xfrm>
-          <a:prstGeom prst="rect">
-            <a:avLst/>
-          </a:prstGeom>
-          <a:noFill/>
-        </p:spPr>
-        <p:txBody>
-          <a:bodyPr wrap="none" rtlCol="0">
-            <a:spAutoFit/>
-          </a:bodyPr>
-          <a:lstStyle/>
-          <a:p>
-            <a:r>
-              <a:rPr lang="en-US" dirty="0" err="1"/>
-              <a:t>Separacion</a:t>
-            </a:r>
-            <a:r>
-              <a:rPr lang="en-US" dirty="0"/>
-              <a:t> de </a:t>
-            </a:r>
-            <a:r>
-              <a:rPr lang="en-US" dirty="0" err="1"/>
-              <a:t>código</a:t>
-            </a:r>
-            <a:endParaRPr lang="es-419" dirty="0"/>
-          </a:p>
-          <a:p>
-            <a:r>
-              <a:rPr lang="es-419" dirty="0"/>
-              <a:t>Actualizar mi Branch primero</a:t>
-            </a:r>
-          </a:p>
-          <a:p>
-            <a:r>
-              <a:rPr lang="en-US" dirty="0" err="1"/>
-              <a:t>Comunicacion</a:t>
-            </a:r>
-            <a:endParaRPr lang="en-US" dirty="0"/>
-          </a:p>
-          <a:p>
-            <a:endParaRPr lang="en-US" dirty="0"/>
-          </a:p>
-        </p:txBody>
-      </p:sp>
     </p:spTree>
     <p:extLst>
       <p:ext uri="{BB962C8B-B14F-4D97-AF65-F5344CB8AC3E}">
-        <p14:creationId xmlns:p14="http://schemas.microsoft.com/office/powerpoint/2010/main" val="718397276"/>
+        <p14:creationId xmlns:p14="http://schemas.microsoft.com/office/powerpoint/2010/main" val="3740971148"/>
       </p:ext>
     </p:extLst>
   </p:cSld>
@@ -7111,16 +8649,8 @@
           <a:lstStyle/>
           <a:p>
             <a:r>
-              <a:rPr lang="en-US" dirty="0" err="1"/>
-              <a:t>Separar</a:t>
-            </a:r>
-            <a:r>
               <a:rPr lang="en-US" dirty="0"/>
-              <a:t> </a:t>
-            </a:r>
-            <a:r>
-              <a:rPr lang="en-US" dirty="0" err="1"/>
-              <a:t>codigo</a:t>
+              <a:t>Trello/Boards</a:t>
             </a:r>
             <a:endParaRPr lang="es-419" dirty="0"/>
           </a:p>
@@ -7128,82 +8658,39 @@
       </p:sp>
       <p:sp>
         <p:nvSpPr>
-          <p:cNvPr id="4" name="TextBox 3">
+          <p:cNvPr id="3" name="Content Placeholder 2">
             <a:extLst>
               <a:ext uri="{FF2B5EF4-FFF2-40B4-BE49-F238E27FC236}">
-                <a16:creationId xmlns:a16="http://schemas.microsoft.com/office/drawing/2014/main" id="{D38FAB16-376C-468C-A3E6-F4486C832DE7}"/>
+                <a16:creationId xmlns:a16="http://schemas.microsoft.com/office/drawing/2014/main" id="{4C8A22F4-750C-4E9A-B539-BC08DBA1AC78}"/>
               </a:ext>
             </a:extLst>
           </p:cNvPr>
-          <p:cNvSpPr txBox="1"/>
-          <p:nvPr/>
-        </p:nvSpPr>
-        <p:spPr>
-          <a:xfrm>
-            <a:off x="838200" y="3301465"/>
-            <a:ext cx="3591240" cy="1200329"/>
-          </a:xfrm>
-          <a:prstGeom prst="rect">
-            <a:avLst/>
-          </a:prstGeom>
-          <a:noFill/>
-        </p:spPr>
-        <p:txBody>
-          <a:bodyPr wrap="none" rtlCol="0">
-            <a:spAutoFit/>
-          </a:bodyPr>
+          <p:cNvSpPr>
+            <a:spLocks noGrp="1"/>
+          </p:cNvSpPr>
+          <p:nvPr>
+            <p:ph idx="1"/>
+          </p:nvPr>
+        </p:nvSpPr>
+        <p:spPr/>
+        <p:txBody>
+          <a:bodyPr/>
           <a:lstStyle/>
           <a:p>
-            <a:r>
-              <a:rPr lang="en-US" dirty="0" err="1"/>
-              <a:t>Principios</a:t>
-            </a:r>
-            <a:r>
-              <a:rPr lang="en-US" dirty="0"/>
-              <a:t> de </a:t>
-            </a:r>
-            <a:r>
-              <a:rPr lang="en-US" dirty="0" err="1"/>
-              <a:t>responsabilidad</a:t>
-            </a:r>
-            <a:r>
-              <a:rPr lang="en-US" dirty="0"/>
-              <a:t> simple</a:t>
-            </a:r>
-          </a:p>
-          <a:p>
-            <a:r>
-              <a:rPr lang="en-US" dirty="0"/>
-              <a:t>Interfaces</a:t>
-            </a:r>
-          </a:p>
-          <a:p>
-            <a:r>
-              <a:rPr lang="en-US" dirty="0" err="1"/>
-              <a:t>Caja</a:t>
-            </a:r>
-            <a:r>
-              <a:rPr lang="en-US" dirty="0"/>
+            <a:pPr marL="0" indent="0">
+              <a:buNone/>
+            </a:pPr>
+            <a:r>
+              <a:rPr lang="es-419" dirty="0"/>
               <a:t> </a:t>
             </a:r>
-            <a:r>
-              <a:rPr lang="en-US" dirty="0" err="1"/>
-              <a:t>negra</a:t>
-            </a:r>
-            <a:r>
-              <a:rPr lang="en-US" dirty="0"/>
-              <a:t>/ley de Demeter</a:t>
-            </a:r>
-          </a:p>
-          <a:p>
-            <a:endParaRPr lang="en-US" dirty="0"/>
           </a:p>
         </p:txBody>
       </p:sp>
     </p:spTree>
     <p:extLst>
       <p:ext uri="{BB962C8B-B14F-4D97-AF65-F5344CB8AC3E}">
-        <p14:creationId xmlns:p14="http://schemas.microsoft.com/office/powerpoint/2010/main" val="1768428990"/>
+        <p14:creationId xmlns:p14="http://schemas.microsoft.com/office/powerpoint/2010/main" val="3387504599"/>
       </p:ext>
     </p:extLst>
   </p:cSld>
@@ -7257,11 +8744,7 @@
             </a:r>
             <a:r>
               <a:rPr lang="en-US" dirty="0" err="1"/>
-              <a:t>Lamentar</a:t>
-            </a:r>
-            <a:r>
-              <a:rPr lang="en-US" dirty="0"/>
-              <a:t> (resolver merge)</a:t>
+              <a:t>Prevenir</a:t>
             </a:r>
             <a:endParaRPr lang="es-419" dirty="0"/>
           </a:p>
@@ -7298,10 +8781,70 @@
           </a:p>
         </p:txBody>
       </p:sp>
+      <p:sp>
+        <p:nvSpPr>
+          <p:cNvPr id="4" name="TextBox 3">
+            <a:extLst>
+              <a:ext uri="{FF2B5EF4-FFF2-40B4-BE49-F238E27FC236}">
+                <a16:creationId xmlns:a16="http://schemas.microsoft.com/office/drawing/2014/main" id="{D38FAB16-376C-468C-A3E6-F4486C832DE7}"/>
+              </a:ext>
+            </a:extLst>
+          </p:cNvPr>
+          <p:cNvSpPr txBox="1"/>
+          <p:nvPr/>
+        </p:nvSpPr>
+        <p:spPr>
+          <a:xfrm>
+            <a:off x="838200" y="3301465"/>
+            <a:ext cx="2910284" cy="1200329"/>
+          </a:xfrm>
+          <a:prstGeom prst="rect">
+            <a:avLst/>
+          </a:prstGeom>
+          <a:noFill/>
+        </p:spPr>
+        <p:txBody>
+          <a:bodyPr wrap="none" rtlCol="0">
+            <a:spAutoFit/>
+          </a:bodyPr>
+          <a:lstStyle/>
+          <a:p>
+            <a:r>
+              <a:rPr lang="en-US" dirty="0" err="1"/>
+              <a:t>Separacion</a:t>
+            </a:r>
+            <a:r>
+              <a:rPr lang="en-US" dirty="0"/>
+              <a:t> de </a:t>
+            </a:r>
+            <a:r>
+              <a:rPr lang="en-US" dirty="0" err="1"/>
+              <a:t>código</a:t>
+            </a:r>
+            <a:endParaRPr lang="es-419" dirty="0"/>
+          </a:p>
+          <a:p>
+            <a:r>
+              <a:rPr lang="es-419" dirty="0"/>
+              <a:t>Actualizar mi Branch primero</a:t>
+            </a:r>
+          </a:p>
+          <a:p>
+            <a:r>
+              <a:rPr lang="en-US" dirty="0" err="1"/>
+              <a:t>Comunicacion</a:t>
+            </a:r>
+            <a:endParaRPr lang="en-US" dirty="0"/>
+          </a:p>
+          <a:p>
+            <a:endParaRPr lang="en-US" dirty="0"/>
+          </a:p>
+        </p:txBody>
+      </p:sp>
     </p:spTree>
     <p:extLst>
       <p:ext uri="{BB962C8B-B14F-4D97-AF65-F5344CB8AC3E}">
-        <p14:creationId xmlns:p14="http://schemas.microsoft.com/office/powerpoint/2010/main" val="3331826155"/>
+        <p14:creationId xmlns:p14="http://schemas.microsoft.com/office/powerpoint/2010/main" val="718397276"/>
       </p:ext>
     </p:extLst>
   </p:cSld>
@@ -7539,6 +9082,245 @@
     <p:extLst>
       <p:ext uri="{BB962C8B-B14F-4D97-AF65-F5344CB8AC3E}">
         <p14:creationId xmlns:p14="http://schemas.microsoft.com/office/powerpoint/2010/main" val="2936865913"/>
+      </p:ext>
+    </p:extLst>
+  </p:cSld>
+  <p:clrMapOvr>
+    <a:masterClrMapping/>
+  </p:clrMapOvr>
+</p:sld>
+</file>
+
+<file path=ppt/slides/slide20.xml><?xml version="1.0" encoding="utf-8"?>
+<p:sld xmlns:a="http://schemas.openxmlformats.org/drawingml/2006/main" xmlns:r="http://schemas.openxmlformats.org/officeDocument/2006/relationships" xmlns:p="http://schemas.openxmlformats.org/presentationml/2006/main">
+  <p:cSld>
+    <p:spTree>
+      <p:nvGrpSpPr>
+        <p:cNvPr id="1" name=""/>
+        <p:cNvGrpSpPr/>
+        <p:nvPr/>
+      </p:nvGrpSpPr>
+      <p:grpSpPr>
+        <a:xfrm>
+          <a:off x="0" y="0"/>
+          <a:ext cx="0" cy="0"/>
+          <a:chOff x="0" y="0"/>
+          <a:chExt cx="0" cy="0"/>
+        </a:xfrm>
+      </p:grpSpPr>
+      <p:sp>
+        <p:nvSpPr>
+          <p:cNvPr id="2" name="Title 1">
+            <a:extLst>
+              <a:ext uri="{FF2B5EF4-FFF2-40B4-BE49-F238E27FC236}">
+                <a16:creationId xmlns:a16="http://schemas.microsoft.com/office/drawing/2014/main" id="{E94C24EB-7ECC-4ECF-9E67-D3422B6EC4F8}"/>
+              </a:ext>
+            </a:extLst>
+          </p:cNvPr>
+          <p:cNvSpPr>
+            <a:spLocks noGrp="1"/>
+          </p:cNvSpPr>
+          <p:nvPr>
+            <p:ph type="title"/>
+          </p:nvPr>
+        </p:nvSpPr>
+        <p:spPr/>
+        <p:txBody>
+          <a:bodyPr/>
+          <a:lstStyle/>
+          <a:p>
+            <a:r>
+              <a:rPr lang="en-US" dirty="0" err="1"/>
+              <a:t>Separar</a:t>
+            </a:r>
+            <a:r>
+              <a:rPr lang="en-US" dirty="0"/>
+              <a:t> </a:t>
+            </a:r>
+            <a:r>
+              <a:rPr lang="en-US" dirty="0" err="1"/>
+              <a:t>codigo</a:t>
+            </a:r>
+            <a:endParaRPr lang="es-419" dirty="0"/>
+          </a:p>
+        </p:txBody>
+      </p:sp>
+      <p:sp>
+        <p:nvSpPr>
+          <p:cNvPr id="4" name="TextBox 3">
+            <a:extLst>
+              <a:ext uri="{FF2B5EF4-FFF2-40B4-BE49-F238E27FC236}">
+                <a16:creationId xmlns:a16="http://schemas.microsoft.com/office/drawing/2014/main" id="{D38FAB16-376C-468C-A3E6-F4486C832DE7}"/>
+              </a:ext>
+            </a:extLst>
+          </p:cNvPr>
+          <p:cNvSpPr txBox="1"/>
+          <p:nvPr/>
+        </p:nvSpPr>
+        <p:spPr>
+          <a:xfrm>
+            <a:off x="838200" y="3301465"/>
+            <a:ext cx="3591240" cy="1200329"/>
+          </a:xfrm>
+          <a:prstGeom prst="rect">
+            <a:avLst/>
+          </a:prstGeom>
+          <a:noFill/>
+        </p:spPr>
+        <p:txBody>
+          <a:bodyPr wrap="none" rtlCol="0">
+            <a:spAutoFit/>
+          </a:bodyPr>
+          <a:lstStyle/>
+          <a:p>
+            <a:r>
+              <a:rPr lang="en-US" dirty="0" err="1"/>
+              <a:t>Principios</a:t>
+            </a:r>
+            <a:r>
+              <a:rPr lang="en-US" dirty="0"/>
+              <a:t> de </a:t>
+            </a:r>
+            <a:r>
+              <a:rPr lang="en-US" dirty="0" err="1"/>
+              <a:t>responsabilidad</a:t>
+            </a:r>
+            <a:r>
+              <a:rPr lang="en-US" dirty="0"/>
+              <a:t> simple</a:t>
+            </a:r>
+          </a:p>
+          <a:p>
+            <a:r>
+              <a:rPr lang="en-US" dirty="0"/>
+              <a:t>Interfaces</a:t>
+            </a:r>
+          </a:p>
+          <a:p>
+            <a:r>
+              <a:rPr lang="en-US" dirty="0" err="1"/>
+              <a:t>Caja</a:t>
+            </a:r>
+            <a:r>
+              <a:rPr lang="en-US" dirty="0"/>
+              <a:t> </a:t>
+            </a:r>
+            <a:r>
+              <a:rPr lang="en-US" dirty="0" err="1"/>
+              <a:t>negra</a:t>
+            </a:r>
+            <a:r>
+              <a:rPr lang="en-US" dirty="0"/>
+              <a:t>/ley de Demeter</a:t>
+            </a:r>
+          </a:p>
+          <a:p>
+            <a:endParaRPr lang="en-US" dirty="0"/>
+          </a:p>
+        </p:txBody>
+      </p:sp>
+    </p:spTree>
+    <p:extLst>
+      <p:ext uri="{BB962C8B-B14F-4D97-AF65-F5344CB8AC3E}">
+        <p14:creationId xmlns:p14="http://schemas.microsoft.com/office/powerpoint/2010/main" val="1768428990"/>
+      </p:ext>
+    </p:extLst>
+  </p:cSld>
+  <p:clrMapOvr>
+    <a:masterClrMapping/>
+  </p:clrMapOvr>
+</p:sld>
+</file>
+
+<file path=ppt/slides/slide21.xml><?xml version="1.0" encoding="utf-8"?>
+<p:sld xmlns:a="http://schemas.openxmlformats.org/drawingml/2006/main" xmlns:r="http://schemas.openxmlformats.org/officeDocument/2006/relationships" xmlns:p="http://schemas.openxmlformats.org/presentationml/2006/main">
+  <p:cSld>
+    <p:spTree>
+      <p:nvGrpSpPr>
+        <p:cNvPr id="1" name=""/>
+        <p:cNvGrpSpPr/>
+        <p:nvPr/>
+      </p:nvGrpSpPr>
+      <p:grpSpPr>
+        <a:xfrm>
+          <a:off x="0" y="0"/>
+          <a:ext cx="0" cy="0"/>
+          <a:chOff x="0" y="0"/>
+          <a:chExt cx="0" cy="0"/>
+        </a:xfrm>
+      </p:grpSpPr>
+      <p:sp>
+        <p:nvSpPr>
+          <p:cNvPr id="2" name="Title 1">
+            <a:extLst>
+              <a:ext uri="{FF2B5EF4-FFF2-40B4-BE49-F238E27FC236}">
+                <a16:creationId xmlns:a16="http://schemas.microsoft.com/office/drawing/2014/main" id="{E94C24EB-7ECC-4ECF-9E67-D3422B6EC4F8}"/>
+              </a:ext>
+            </a:extLst>
+          </p:cNvPr>
+          <p:cNvSpPr>
+            <a:spLocks noGrp="1"/>
+          </p:cNvSpPr>
+          <p:nvPr>
+            <p:ph type="title"/>
+          </p:nvPr>
+        </p:nvSpPr>
+        <p:spPr/>
+        <p:txBody>
+          <a:bodyPr/>
+          <a:lstStyle/>
+          <a:p>
+            <a:r>
+              <a:rPr lang="en-US" dirty="0"/>
+              <a:t>Conflicts: </a:t>
+            </a:r>
+            <a:r>
+              <a:rPr lang="en-US" dirty="0" err="1"/>
+              <a:t>Lamentar</a:t>
+            </a:r>
+            <a:r>
+              <a:rPr lang="en-US" dirty="0"/>
+              <a:t> (resolver merge)</a:t>
+            </a:r>
+            <a:endParaRPr lang="es-419" dirty="0"/>
+          </a:p>
+        </p:txBody>
+      </p:sp>
+      <p:sp>
+        <p:nvSpPr>
+          <p:cNvPr id="3" name="Content Placeholder 2">
+            <a:extLst>
+              <a:ext uri="{FF2B5EF4-FFF2-40B4-BE49-F238E27FC236}">
+                <a16:creationId xmlns:a16="http://schemas.microsoft.com/office/drawing/2014/main" id="{4C8A22F4-750C-4E9A-B539-BC08DBA1AC78}"/>
+              </a:ext>
+            </a:extLst>
+          </p:cNvPr>
+          <p:cNvSpPr>
+            <a:spLocks noGrp="1"/>
+          </p:cNvSpPr>
+          <p:nvPr>
+            <p:ph idx="1"/>
+          </p:nvPr>
+        </p:nvSpPr>
+        <p:spPr/>
+        <p:txBody>
+          <a:bodyPr/>
+          <a:lstStyle/>
+          <a:p>
+            <a:pPr marL="0" indent="0">
+              <a:buNone/>
+            </a:pPr>
+            <a:r>
+              <a:rPr lang="es-419" dirty="0"/>
+              <a:t> </a:t>
+            </a:r>
+          </a:p>
+        </p:txBody>
+      </p:sp>
+    </p:spTree>
+    <p:extLst>
+      <p:ext uri="{BB962C8B-B14F-4D97-AF65-F5344CB8AC3E}">
+        <p14:creationId xmlns:p14="http://schemas.microsoft.com/office/powerpoint/2010/main" val="3331826155"/>
       </p:ext>
     </p:extLst>
   </p:cSld>
@@ -9216,6 +10998,547 @@
           </a:p>
         </p:txBody>
       </p:sp>
+      <p:sp>
+        <p:nvSpPr>
+          <p:cNvPr id="3" name="TextBox 5">
+            <a:extLst>
+              <a:ext uri="{FF2B5EF4-FFF2-40B4-BE49-F238E27FC236}">
+                <a16:creationId xmlns:a16="http://schemas.microsoft.com/office/drawing/2014/main" id="{A2403F36-6DD4-4B7D-B0D6-78464E57E76E}"/>
+              </a:ext>
+            </a:extLst>
+          </p:cNvPr>
+          <p:cNvSpPr txBox="1"/>
+          <p:nvPr/>
+        </p:nvSpPr>
+        <p:spPr>
+          <a:xfrm>
+            <a:off x="2683333" y="2079677"/>
+            <a:ext cx="6814686" cy="369332"/>
+          </a:xfrm>
+          <a:prstGeom prst="rect">
+            <a:avLst/>
+          </a:prstGeom>
+          <a:noFill/>
+        </p:spPr>
+        <p:txBody>
+          <a:bodyPr wrap="none" rtlCol="0">
+            <a:spAutoFit/>
+          </a:bodyPr>
+          <a:lstStyle>
+            <a:defPPr>
+              <a:defRPr lang="en-US"/>
+            </a:defPPr>
+            <a:lvl1pPr marL="0" algn="l" defTabSz="457200" rtl="0" eaLnBrk="1" latinLnBrk="0" hangingPunct="1">
+              <a:defRPr sz="1800" kern="1200">
+                <a:solidFill>
+                  <a:schemeClr val="tx1"/>
+                </a:solidFill>
+                <a:latin typeface="+mn-lt"/>
+                <a:ea typeface="+mn-ea"/>
+                <a:cs typeface="+mn-cs"/>
+              </a:defRPr>
+            </a:lvl1pPr>
+            <a:lvl2pPr marL="457200" algn="l" defTabSz="457200" rtl="0" eaLnBrk="1" latinLnBrk="0" hangingPunct="1">
+              <a:defRPr sz="1800" kern="1200">
+                <a:solidFill>
+                  <a:schemeClr val="tx1"/>
+                </a:solidFill>
+                <a:latin typeface="+mn-lt"/>
+                <a:ea typeface="+mn-ea"/>
+                <a:cs typeface="+mn-cs"/>
+              </a:defRPr>
+            </a:lvl2pPr>
+            <a:lvl3pPr marL="914400" algn="l" defTabSz="457200" rtl="0" eaLnBrk="1" latinLnBrk="0" hangingPunct="1">
+              <a:defRPr sz="1800" kern="1200">
+                <a:solidFill>
+                  <a:schemeClr val="tx1"/>
+                </a:solidFill>
+                <a:latin typeface="+mn-lt"/>
+                <a:ea typeface="+mn-ea"/>
+                <a:cs typeface="+mn-cs"/>
+              </a:defRPr>
+            </a:lvl3pPr>
+            <a:lvl4pPr marL="1371600" algn="l" defTabSz="457200" rtl="0" eaLnBrk="1" latinLnBrk="0" hangingPunct="1">
+              <a:defRPr sz="1800" kern="1200">
+                <a:solidFill>
+                  <a:schemeClr val="tx1"/>
+                </a:solidFill>
+                <a:latin typeface="+mn-lt"/>
+                <a:ea typeface="+mn-ea"/>
+                <a:cs typeface="+mn-cs"/>
+              </a:defRPr>
+            </a:lvl4pPr>
+            <a:lvl5pPr marL="1828800" algn="l" defTabSz="457200" rtl="0" eaLnBrk="1" latinLnBrk="0" hangingPunct="1">
+              <a:defRPr sz="1800" kern="1200">
+                <a:solidFill>
+                  <a:schemeClr val="tx1"/>
+                </a:solidFill>
+                <a:latin typeface="+mn-lt"/>
+                <a:ea typeface="+mn-ea"/>
+                <a:cs typeface="+mn-cs"/>
+              </a:defRPr>
+            </a:lvl5pPr>
+            <a:lvl6pPr marL="2286000" algn="l" defTabSz="457200" rtl="0" eaLnBrk="1" latinLnBrk="0" hangingPunct="1">
+              <a:defRPr sz="1800" kern="1200">
+                <a:solidFill>
+                  <a:schemeClr val="tx1"/>
+                </a:solidFill>
+                <a:latin typeface="+mn-lt"/>
+                <a:ea typeface="+mn-ea"/>
+                <a:cs typeface="+mn-cs"/>
+              </a:defRPr>
+            </a:lvl6pPr>
+            <a:lvl7pPr marL="2743200" algn="l" defTabSz="457200" rtl="0" eaLnBrk="1" latinLnBrk="0" hangingPunct="1">
+              <a:defRPr sz="1800" kern="1200">
+                <a:solidFill>
+                  <a:schemeClr val="tx1"/>
+                </a:solidFill>
+                <a:latin typeface="+mn-lt"/>
+                <a:ea typeface="+mn-ea"/>
+                <a:cs typeface="+mn-cs"/>
+              </a:defRPr>
+            </a:lvl7pPr>
+            <a:lvl8pPr marL="3200400" algn="l" defTabSz="457200" rtl="0" eaLnBrk="1" latinLnBrk="0" hangingPunct="1">
+              <a:defRPr sz="1800" kern="1200">
+                <a:solidFill>
+                  <a:schemeClr val="tx1"/>
+                </a:solidFill>
+                <a:latin typeface="+mn-lt"/>
+                <a:ea typeface="+mn-ea"/>
+                <a:cs typeface="+mn-cs"/>
+              </a:defRPr>
+            </a:lvl8pPr>
+            <a:lvl9pPr marL="3657600" algn="l" defTabSz="457200" rtl="0" eaLnBrk="1" latinLnBrk="0" hangingPunct="1">
+              <a:defRPr sz="1800" kern="1200">
+                <a:solidFill>
+                  <a:schemeClr val="tx1"/>
+                </a:solidFill>
+                <a:latin typeface="+mn-lt"/>
+                <a:ea typeface="+mn-ea"/>
+                <a:cs typeface="+mn-cs"/>
+              </a:defRPr>
+            </a:lvl9pPr>
+          </a:lstStyle>
+          <a:p>
+            <a:r>
+              <a:rPr lang="en-US" dirty="0"/>
+              <a:t>Es una </a:t>
+            </a:r>
+            <a:r>
+              <a:rPr lang="en-US" dirty="0" err="1"/>
+              <a:t>separación</a:t>
+            </a:r>
+            <a:r>
+              <a:rPr lang="en-US" dirty="0"/>
+              <a:t> </a:t>
+            </a:r>
+            <a:r>
+              <a:rPr lang="en-US" dirty="0" err="1"/>
+              <a:t>en</a:t>
+            </a:r>
+            <a:r>
+              <a:rPr lang="en-US" dirty="0"/>
+              <a:t> </a:t>
+            </a:r>
+            <a:r>
+              <a:rPr lang="en-US" dirty="0" err="1">
+                <a:solidFill>
+                  <a:srgbClr val="FFC000"/>
+                </a:solidFill>
+              </a:rPr>
+              <a:t>paralelo</a:t>
+            </a:r>
+            <a:r>
+              <a:rPr lang="en-US" dirty="0"/>
+              <a:t> de las </a:t>
+            </a:r>
+            <a:r>
+              <a:rPr lang="en-US" dirty="0" err="1"/>
+              <a:t>versiones</a:t>
+            </a:r>
+            <a:r>
+              <a:rPr lang="en-US" dirty="0"/>
+              <a:t> </a:t>
+            </a:r>
+            <a:r>
+              <a:rPr lang="en-US" dirty="0" err="1"/>
+              <a:t>en</a:t>
+            </a:r>
+            <a:r>
+              <a:rPr lang="en-US" dirty="0"/>
+              <a:t> un </a:t>
+            </a:r>
+            <a:r>
+              <a:rPr lang="en-US" dirty="0" err="1"/>
+              <a:t>repositorio</a:t>
+            </a:r>
+            <a:endParaRPr lang="es-419" dirty="0"/>
+          </a:p>
+        </p:txBody>
+      </p:sp>
+      <p:pic>
+        <p:nvPicPr>
+          <p:cNvPr id="5" name="Picture 4" descr="Diagram, schematic&#10;&#10;Description automatically generated">
+            <a:extLst>
+              <a:ext uri="{FF2B5EF4-FFF2-40B4-BE49-F238E27FC236}">
+                <a16:creationId xmlns:a16="http://schemas.microsoft.com/office/drawing/2014/main" id="{54645C1F-B4E5-4DF2-B194-A7E6B9FA947F}"/>
+              </a:ext>
+            </a:extLst>
+          </p:cNvPr>
+          <p:cNvPicPr>
+            <a:picLocks noChangeAspect="1"/>
+          </p:cNvPicPr>
+          <p:nvPr/>
+        </p:nvPicPr>
+        <p:blipFill>
+          <a:blip r:embed="rId2">
+            <a:extLst>
+              <a:ext uri="{28A0092B-C50C-407E-A947-70E740481C1C}">
+                <a14:useLocalDpi xmlns:a14="http://schemas.microsoft.com/office/drawing/2010/main" val="0"/>
+              </a:ext>
+            </a:extLst>
+          </a:blip>
+          <a:stretch>
+            <a:fillRect/>
+          </a:stretch>
+        </p:blipFill>
+        <p:spPr>
+          <a:xfrm>
+            <a:off x="2400514" y="2702733"/>
+            <a:ext cx="7390971" cy="3787109"/>
+          </a:xfrm>
+          <a:prstGeom prst="rect">
+            <a:avLst/>
+          </a:prstGeom>
+        </p:spPr>
+      </p:pic>
+      <mc:AlternateContent xmlns:mc="http://schemas.openxmlformats.org/markup-compatibility/2006">
+        <mc:Choice xmlns:p14="http://schemas.microsoft.com/office/powerpoint/2010/main" Requires="p14">
+          <p:contentPart p14:bwMode="auto" r:id="rId3">
+            <p14:nvContentPartPr>
+              <p14:cNvPr id="6" name="Ink 5">
+                <a:extLst>
+                  <a:ext uri="{FF2B5EF4-FFF2-40B4-BE49-F238E27FC236}">
+                    <a16:creationId xmlns:a16="http://schemas.microsoft.com/office/drawing/2014/main" id="{960E235B-FB1E-4BEB-9D27-3C9C1DCA0971}"/>
+                  </a:ext>
+                </a:extLst>
+              </p14:cNvPr>
+              <p14:cNvContentPartPr/>
+              <p14:nvPr/>
+            </p14:nvContentPartPr>
+            <p14:xfrm>
+              <a:off x="2480562" y="5010330"/>
+              <a:ext cx="1083240" cy="332280"/>
+            </p14:xfrm>
+          </p:contentPart>
+        </mc:Choice>
+        <mc:Fallback>
+          <p:pic>
+            <p:nvPicPr>
+              <p:cNvPr id="6" name="Ink 5">
+                <a:extLst>
+                  <a:ext uri="{FF2B5EF4-FFF2-40B4-BE49-F238E27FC236}">
+                    <a16:creationId xmlns:a16="http://schemas.microsoft.com/office/drawing/2014/main" id="{960E235B-FB1E-4BEB-9D27-3C9C1DCA0971}"/>
+                  </a:ext>
+                </a:extLst>
+              </p:cNvPr>
+              <p:cNvPicPr/>
+              <p:nvPr/>
+            </p:nvPicPr>
+            <p:blipFill>
+              <a:blip r:embed="rId4"/>
+              <a:stretch>
+                <a:fillRect/>
+              </a:stretch>
+            </p:blipFill>
+            <p:spPr>
+              <a:xfrm>
+                <a:off x="2462922" y="4992690"/>
+                <a:ext cx="1118880" cy="367920"/>
+              </a:xfrm>
+              <a:prstGeom prst="rect">
+                <a:avLst/>
+              </a:prstGeom>
+            </p:spPr>
+          </p:pic>
+        </mc:Fallback>
+      </mc:AlternateContent>
+      <p:grpSp>
+        <p:nvGrpSpPr>
+          <p:cNvPr id="18" name="Group 17">
+            <a:extLst>
+              <a:ext uri="{FF2B5EF4-FFF2-40B4-BE49-F238E27FC236}">
+                <a16:creationId xmlns:a16="http://schemas.microsoft.com/office/drawing/2014/main" id="{5F35DFA2-5B0E-407E-9BC0-502768FCAACC}"/>
+              </a:ext>
+            </a:extLst>
+          </p:cNvPr>
+          <p:cNvGrpSpPr/>
+          <p:nvPr/>
+        </p:nvGrpSpPr>
+        <p:grpSpPr>
+          <a:xfrm>
+            <a:off x="2536722" y="5458890"/>
+            <a:ext cx="1112400" cy="307440"/>
+            <a:chOff x="2536722" y="5458890"/>
+            <a:chExt cx="1112400" cy="307440"/>
+          </a:xfrm>
+        </p:grpSpPr>
+        <mc:AlternateContent xmlns:mc="http://schemas.openxmlformats.org/markup-compatibility/2006">
+          <mc:Choice xmlns:p14="http://schemas.microsoft.com/office/powerpoint/2010/main" Requires="p14">
+            <p:contentPart p14:bwMode="auto" r:id="rId5">
+              <p14:nvContentPartPr>
+                <p14:cNvPr id="13" name="Ink 12">
+                  <a:extLst>
+                    <a:ext uri="{FF2B5EF4-FFF2-40B4-BE49-F238E27FC236}">
+                      <a16:creationId xmlns:a16="http://schemas.microsoft.com/office/drawing/2014/main" id="{1FCB7FDE-1666-4349-848E-2BD9D7B4B21A}"/>
+                    </a:ext>
+                  </a:extLst>
+                </p14:cNvPr>
+                <p14:cNvContentPartPr/>
+                <p14:nvPr/>
+              </p14:nvContentPartPr>
+              <p14:xfrm>
+                <a:off x="2536722" y="5465730"/>
+                <a:ext cx="393480" cy="292320"/>
+              </p14:xfrm>
+            </p:contentPart>
+          </mc:Choice>
+          <mc:Fallback>
+            <p:pic>
+              <p:nvPicPr>
+                <p:cNvPr id="13" name="Ink 12">
+                  <a:extLst>
+                    <a:ext uri="{FF2B5EF4-FFF2-40B4-BE49-F238E27FC236}">
+                      <a16:creationId xmlns:a16="http://schemas.microsoft.com/office/drawing/2014/main" id="{1FCB7FDE-1666-4349-848E-2BD9D7B4B21A}"/>
+                    </a:ext>
+                  </a:extLst>
+                </p:cNvPr>
+                <p:cNvPicPr/>
+                <p:nvPr/>
+              </p:nvPicPr>
+              <p:blipFill>
+                <a:blip r:embed="rId6"/>
+                <a:stretch>
+                  <a:fillRect/>
+                </a:stretch>
+              </p:blipFill>
+              <p:spPr>
+                <a:xfrm>
+                  <a:off x="2519082" y="5448090"/>
+                  <a:ext cx="429120" cy="327960"/>
+                </a:xfrm>
+                <a:prstGeom prst="rect">
+                  <a:avLst/>
+                </a:prstGeom>
+              </p:spPr>
+            </p:pic>
+          </mc:Fallback>
+        </mc:AlternateContent>
+        <mc:AlternateContent xmlns:mc="http://schemas.openxmlformats.org/markup-compatibility/2006">
+          <mc:Choice xmlns:p14="http://schemas.microsoft.com/office/powerpoint/2010/main" Requires="p14">
+            <p:contentPart p14:bwMode="auto" r:id="rId7">
+              <p14:nvContentPartPr>
+                <p14:cNvPr id="14" name="Ink 13">
+                  <a:extLst>
+                    <a:ext uri="{FF2B5EF4-FFF2-40B4-BE49-F238E27FC236}">
+                      <a16:creationId xmlns:a16="http://schemas.microsoft.com/office/drawing/2014/main" id="{B8343A6A-5B07-4A48-9F3C-54BD2317D8B0}"/>
+                    </a:ext>
+                  </a:extLst>
+                </p14:cNvPr>
+                <p14:cNvContentPartPr/>
+                <p14:nvPr/>
+              </p14:nvContentPartPr>
+              <p14:xfrm>
+                <a:off x="2997162" y="5540970"/>
+                <a:ext cx="190440" cy="176400"/>
+              </p14:xfrm>
+            </p:contentPart>
+          </mc:Choice>
+          <mc:Fallback>
+            <p:pic>
+              <p:nvPicPr>
+                <p:cNvPr id="14" name="Ink 13">
+                  <a:extLst>
+                    <a:ext uri="{FF2B5EF4-FFF2-40B4-BE49-F238E27FC236}">
+                      <a16:creationId xmlns:a16="http://schemas.microsoft.com/office/drawing/2014/main" id="{B8343A6A-5B07-4A48-9F3C-54BD2317D8B0}"/>
+                    </a:ext>
+                  </a:extLst>
+                </p:cNvPr>
+                <p:cNvPicPr/>
+                <p:nvPr/>
+              </p:nvPicPr>
+              <p:blipFill>
+                <a:blip r:embed="rId8"/>
+                <a:stretch>
+                  <a:fillRect/>
+                </a:stretch>
+              </p:blipFill>
+              <p:spPr>
+                <a:xfrm>
+                  <a:off x="2979522" y="5523330"/>
+                  <a:ext cx="226080" cy="212040"/>
+                </a:xfrm>
+                <a:prstGeom prst="rect">
+                  <a:avLst/>
+                </a:prstGeom>
+              </p:spPr>
+            </p:pic>
+          </mc:Fallback>
+        </mc:AlternateContent>
+        <mc:AlternateContent xmlns:mc="http://schemas.openxmlformats.org/markup-compatibility/2006">
+          <mc:Choice xmlns:p14="http://schemas.microsoft.com/office/powerpoint/2010/main" Requires="p14">
+            <p:contentPart p14:bwMode="auto" r:id="rId9">
+              <p14:nvContentPartPr>
+                <p14:cNvPr id="15" name="Ink 14">
+                  <a:extLst>
+                    <a:ext uri="{FF2B5EF4-FFF2-40B4-BE49-F238E27FC236}">
+                      <a16:creationId xmlns:a16="http://schemas.microsoft.com/office/drawing/2014/main" id="{136A3443-3B6D-4F26-9161-4F40A7F31E85}"/>
+                    </a:ext>
+                  </a:extLst>
+                </p14:cNvPr>
+                <p14:cNvContentPartPr/>
+                <p14:nvPr/>
+              </p14:nvContentPartPr>
+              <p14:xfrm>
+                <a:off x="3285522" y="5596050"/>
+                <a:ext cx="7920" cy="104040"/>
+              </p14:xfrm>
+            </p:contentPart>
+          </mc:Choice>
+          <mc:Fallback>
+            <p:pic>
+              <p:nvPicPr>
+                <p:cNvPr id="15" name="Ink 14">
+                  <a:extLst>
+                    <a:ext uri="{FF2B5EF4-FFF2-40B4-BE49-F238E27FC236}">
+                      <a16:creationId xmlns:a16="http://schemas.microsoft.com/office/drawing/2014/main" id="{136A3443-3B6D-4F26-9161-4F40A7F31E85}"/>
+                    </a:ext>
+                  </a:extLst>
+                </p:cNvPr>
+                <p:cNvPicPr/>
+                <p:nvPr/>
+              </p:nvPicPr>
+              <p:blipFill>
+                <a:blip r:embed="rId10"/>
+                <a:stretch>
+                  <a:fillRect/>
+                </a:stretch>
+              </p:blipFill>
+              <p:spPr>
+                <a:xfrm>
+                  <a:off x="3267882" y="5578050"/>
+                  <a:ext cx="43560" cy="139680"/>
+                </a:xfrm>
+                <a:prstGeom prst="rect">
+                  <a:avLst/>
+                </a:prstGeom>
+              </p:spPr>
+            </p:pic>
+          </mc:Fallback>
+        </mc:AlternateContent>
+        <mc:AlternateContent xmlns:mc="http://schemas.openxmlformats.org/markup-compatibility/2006">
+          <mc:Choice xmlns:p14="http://schemas.microsoft.com/office/powerpoint/2010/main" Requires="p14">
+            <p:contentPart p14:bwMode="auto" r:id="rId11">
+              <p14:nvContentPartPr>
+                <p14:cNvPr id="16" name="Ink 15">
+                  <a:extLst>
+                    <a:ext uri="{FF2B5EF4-FFF2-40B4-BE49-F238E27FC236}">
+                      <a16:creationId xmlns:a16="http://schemas.microsoft.com/office/drawing/2014/main" id="{6DEF45CF-D74F-4EE7-A36B-BF064F0E01BF}"/>
+                    </a:ext>
+                  </a:extLst>
+                </p14:cNvPr>
+                <p14:cNvContentPartPr/>
+                <p14:nvPr/>
+              </p14:nvContentPartPr>
+              <p14:xfrm>
+                <a:off x="3295242" y="5458890"/>
+                <a:ext cx="360" cy="360"/>
+              </p14:xfrm>
+            </p:contentPart>
+          </mc:Choice>
+          <mc:Fallback>
+            <p:pic>
+              <p:nvPicPr>
+                <p:cNvPr id="16" name="Ink 15">
+                  <a:extLst>
+                    <a:ext uri="{FF2B5EF4-FFF2-40B4-BE49-F238E27FC236}">
+                      <a16:creationId xmlns:a16="http://schemas.microsoft.com/office/drawing/2014/main" id="{6DEF45CF-D74F-4EE7-A36B-BF064F0E01BF}"/>
+                    </a:ext>
+                  </a:extLst>
+                </p:cNvPr>
+                <p:cNvPicPr/>
+                <p:nvPr/>
+              </p:nvPicPr>
+              <p:blipFill>
+                <a:blip r:embed="rId12"/>
+                <a:stretch>
+                  <a:fillRect/>
+                </a:stretch>
+              </p:blipFill>
+              <p:spPr>
+                <a:xfrm>
+                  <a:off x="3277602" y="5440890"/>
+                  <a:ext cx="36000" cy="36000"/>
+                </a:xfrm>
+                <a:prstGeom prst="rect">
+                  <a:avLst/>
+                </a:prstGeom>
+              </p:spPr>
+            </p:pic>
+          </mc:Fallback>
+        </mc:AlternateContent>
+        <mc:AlternateContent xmlns:mc="http://schemas.openxmlformats.org/markup-compatibility/2006">
+          <mc:Choice xmlns:p14="http://schemas.microsoft.com/office/powerpoint/2010/main" Requires="p14">
+            <p:contentPart p14:bwMode="auto" r:id="rId13">
+              <p14:nvContentPartPr>
+                <p14:cNvPr id="17" name="Ink 16">
+                  <a:extLst>
+                    <a:ext uri="{FF2B5EF4-FFF2-40B4-BE49-F238E27FC236}">
+                      <a16:creationId xmlns:a16="http://schemas.microsoft.com/office/drawing/2014/main" id="{E05D6009-D2FC-4F04-BE26-E531DEA735DA}"/>
+                    </a:ext>
+                  </a:extLst>
+                </p14:cNvPr>
+                <p14:cNvContentPartPr/>
+                <p14:nvPr/>
+              </p14:nvContentPartPr>
+              <p14:xfrm>
+                <a:off x="3408642" y="5564730"/>
+                <a:ext cx="240480" cy="201600"/>
+              </p14:xfrm>
+            </p:contentPart>
+          </mc:Choice>
+          <mc:Fallback>
+            <p:pic>
+              <p:nvPicPr>
+                <p:cNvPr id="17" name="Ink 16">
+                  <a:extLst>
+                    <a:ext uri="{FF2B5EF4-FFF2-40B4-BE49-F238E27FC236}">
+                      <a16:creationId xmlns:a16="http://schemas.microsoft.com/office/drawing/2014/main" id="{E05D6009-D2FC-4F04-BE26-E531DEA735DA}"/>
+                    </a:ext>
+                  </a:extLst>
+                </p:cNvPr>
+                <p:cNvPicPr/>
+                <p:nvPr/>
+              </p:nvPicPr>
+              <p:blipFill>
+                <a:blip r:embed="rId14"/>
+                <a:stretch>
+                  <a:fillRect/>
+                </a:stretch>
+              </p:blipFill>
+              <p:spPr>
+                <a:xfrm>
+                  <a:off x="3390642" y="5547090"/>
+                  <a:ext cx="276120" cy="237240"/>
+                </a:xfrm>
+                <a:prstGeom prst="rect">
+                  <a:avLst/>
+                </a:prstGeom>
+              </p:spPr>
+            </p:pic>
+          </mc:Fallback>
+        </mc:AlternateContent>
+      </p:grpSp>
     </p:spTree>
     <p:extLst>
       <p:ext uri="{BB962C8B-B14F-4D97-AF65-F5344CB8AC3E}">

</xml_diff>